<commit_message>
Aula 01 Microcontroladores .... atualizado
</commit_message>
<xml_diff>
--- a/01 Classes/Aula 01 - Programação Microcontroladores.pptx
+++ b/01 Classes/Aula 01 - Programação Microcontroladores.pptx
@@ -5,7 +5,7 @@
     <p:sldMasterId id="2147483648" r:id="rId1"/>
   </p:sldMasterIdLst>
   <p:notesMasterIdLst>
-    <p:notesMasterId r:id="rId26"/>
+    <p:notesMasterId r:id="rId30"/>
   </p:notesMasterIdLst>
   <p:sldIdLst>
     <p:sldId id="256" r:id="rId2"/>
@@ -23,15 +23,19 @@
     <p:sldId id="341" r:id="rId14"/>
     <p:sldId id="351" r:id="rId15"/>
     <p:sldId id="342" r:id="rId16"/>
-    <p:sldId id="343" r:id="rId17"/>
-    <p:sldId id="349" r:id="rId18"/>
-    <p:sldId id="350" r:id="rId19"/>
-    <p:sldId id="344" r:id="rId20"/>
-    <p:sldId id="333" r:id="rId21"/>
-    <p:sldId id="323" r:id="rId22"/>
-    <p:sldId id="334" r:id="rId23"/>
-    <p:sldId id="337" r:id="rId24"/>
-    <p:sldId id="309" r:id="rId25"/>
+    <p:sldId id="357" r:id="rId17"/>
+    <p:sldId id="358" r:id="rId18"/>
+    <p:sldId id="359" r:id="rId19"/>
+    <p:sldId id="343" r:id="rId20"/>
+    <p:sldId id="349" r:id="rId21"/>
+    <p:sldId id="350" r:id="rId22"/>
+    <p:sldId id="344" r:id="rId23"/>
+    <p:sldId id="360" r:id="rId24"/>
+    <p:sldId id="333" r:id="rId25"/>
+    <p:sldId id="323" r:id="rId26"/>
+    <p:sldId id="334" r:id="rId27"/>
+    <p:sldId id="337" r:id="rId28"/>
+    <p:sldId id="309" r:id="rId29"/>
   </p:sldIdLst>
   <p:sldSz cx="9144000" cy="5143500" type="screen16x9"/>
   <p:notesSz cx="6858000" cy="9144000"/>
@@ -964,7 +968,7 @@
     </p:spTree>
     <p:extLst>
       <p:ext uri="{BB962C8B-B14F-4D97-AF65-F5344CB8AC3E}">
-        <p14:creationId xmlns:p14="http://schemas.microsoft.com/office/powerpoint/2010/main" val="2134089166"/>
+        <p14:creationId xmlns:p14="http://schemas.microsoft.com/office/powerpoint/2010/main" val="18134656"/>
       </p:ext>
     </p:extLst>
   </p:cSld>
@@ -1030,7 +1034,7 @@
     </p:spTree>
     <p:extLst>
       <p:ext uri="{BB962C8B-B14F-4D97-AF65-F5344CB8AC3E}">
-        <p14:creationId xmlns:p14="http://schemas.microsoft.com/office/powerpoint/2010/main" val="1610828421"/>
+        <p14:creationId xmlns:p14="http://schemas.microsoft.com/office/powerpoint/2010/main" val="3918990181"/>
       </p:ext>
     </p:extLst>
   </p:cSld>
@@ -1096,7 +1100,7 @@
     </p:spTree>
     <p:extLst>
       <p:ext uri="{BB962C8B-B14F-4D97-AF65-F5344CB8AC3E}">
-        <p14:creationId xmlns:p14="http://schemas.microsoft.com/office/powerpoint/2010/main" val="1541501313"/>
+        <p14:creationId xmlns:p14="http://schemas.microsoft.com/office/powerpoint/2010/main" val="128331629"/>
       </p:ext>
     </p:extLst>
   </p:cSld>
@@ -1162,7 +1166,7 @@
     </p:spTree>
     <p:extLst>
       <p:ext uri="{BB962C8B-B14F-4D97-AF65-F5344CB8AC3E}">
-        <p14:creationId xmlns:p14="http://schemas.microsoft.com/office/powerpoint/2010/main" val="765462347"/>
+        <p14:creationId xmlns:p14="http://schemas.microsoft.com/office/powerpoint/2010/main" val="2134089166"/>
       </p:ext>
     </p:extLst>
   </p:cSld>
@@ -1228,7 +1232,7 @@
     </p:spTree>
     <p:extLst>
       <p:ext uri="{BB962C8B-B14F-4D97-AF65-F5344CB8AC3E}">
-        <p14:creationId xmlns:p14="http://schemas.microsoft.com/office/powerpoint/2010/main" val="585304384"/>
+        <p14:creationId xmlns:p14="http://schemas.microsoft.com/office/powerpoint/2010/main" val="1610828421"/>
       </p:ext>
     </p:extLst>
   </p:cSld>
@@ -1360,7 +1364,7 @@
     </p:spTree>
     <p:extLst>
       <p:ext uri="{BB962C8B-B14F-4D97-AF65-F5344CB8AC3E}">
-        <p14:creationId xmlns:p14="http://schemas.microsoft.com/office/powerpoint/2010/main" val="2709569597"/>
+        <p14:creationId xmlns:p14="http://schemas.microsoft.com/office/powerpoint/2010/main" val="1541501313"/>
       </p:ext>
     </p:extLst>
   </p:cSld>
@@ -1426,6 +1430,270 @@
     </p:spTree>
     <p:extLst>
       <p:ext uri="{BB962C8B-B14F-4D97-AF65-F5344CB8AC3E}">
+        <p14:creationId xmlns:p14="http://schemas.microsoft.com/office/powerpoint/2010/main" val="765462347"/>
+      </p:ext>
+    </p:extLst>
+  </p:cSld>
+  <p:clrMapOvr>
+    <a:masterClrMapping/>
+  </p:clrMapOvr>
+</p:notes>
+</file>
+
+<file path=ppt/notesSlides/notesSlide22.xml><?xml version="1.0" encoding="utf-8"?>
+<p:notes xmlns:a="http://schemas.openxmlformats.org/drawingml/2006/main" xmlns:r="http://schemas.openxmlformats.org/officeDocument/2006/relationships" xmlns:p="http://schemas.openxmlformats.org/presentationml/2006/main">
+  <p:cSld>
+    <p:spTree>
+      <p:nvGrpSpPr>
+        <p:cNvPr id="1" name=""/>
+        <p:cNvGrpSpPr/>
+        <p:nvPr/>
+      </p:nvGrpSpPr>
+      <p:grpSpPr>
+        <a:xfrm>
+          <a:off x="0" y="0"/>
+          <a:ext cx="0" cy="0"/>
+          <a:chOff x="0" y="0"/>
+          <a:chExt cx="0" cy="0"/>
+        </a:xfrm>
+      </p:grpSpPr>
+      <p:sp>
+        <p:nvSpPr>
+          <p:cNvPr id="2" name="Espaço Reservado para Imagem de Slide 1"/>
+          <p:cNvSpPr>
+            <a:spLocks noGrp="1" noRot="1" noChangeAspect="1"/>
+          </p:cNvSpPr>
+          <p:nvPr>
+            <p:ph type="sldImg"/>
+          </p:nvPr>
+        </p:nvSpPr>
+        <p:spPr>
+          <a:xfrm>
+            <a:off x="381000" y="685800"/>
+            <a:ext cx="6096000" cy="3429000"/>
+          </a:xfrm>
+        </p:spPr>
+      </p:sp>
+      <p:sp>
+        <p:nvSpPr>
+          <p:cNvPr id="3" name="Espaço Reservado para Anotações 2"/>
+          <p:cNvSpPr>
+            <a:spLocks noGrp="1"/>
+          </p:cNvSpPr>
+          <p:nvPr>
+            <p:ph type="body" idx="1"/>
+          </p:nvPr>
+        </p:nvSpPr>
+        <p:spPr/>
+        <p:txBody>
+          <a:bodyPr/>
+          <a:lstStyle/>
+          <a:p>
+            <a:endParaRPr lang="pt-BR" dirty="0"/>
+          </a:p>
+        </p:txBody>
+      </p:sp>
+    </p:spTree>
+    <p:extLst>
+      <p:ext uri="{BB962C8B-B14F-4D97-AF65-F5344CB8AC3E}">
+        <p14:creationId xmlns:p14="http://schemas.microsoft.com/office/powerpoint/2010/main" val="2004196001"/>
+      </p:ext>
+    </p:extLst>
+  </p:cSld>
+  <p:clrMapOvr>
+    <a:masterClrMapping/>
+  </p:clrMapOvr>
+</p:notes>
+</file>
+
+<file path=ppt/notesSlides/notesSlide23.xml><?xml version="1.0" encoding="utf-8"?>
+<p:notes xmlns:a="http://schemas.openxmlformats.org/drawingml/2006/main" xmlns:r="http://schemas.openxmlformats.org/officeDocument/2006/relationships" xmlns:p="http://schemas.openxmlformats.org/presentationml/2006/main">
+  <p:cSld>
+    <p:spTree>
+      <p:nvGrpSpPr>
+        <p:cNvPr id="1" name=""/>
+        <p:cNvGrpSpPr/>
+        <p:nvPr/>
+      </p:nvGrpSpPr>
+      <p:grpSpPr>
+        <a:xfrm>
+          <a:off x="0" y="0"/>
+          <a:ext cx="0" cy="0"/>
+          <a:chOff x="0" y="0"/>
+          <a:chExt cx="0" cy="0"/>
+        </a:xfrm>
+      </p:grpSpPr>
+      <p:sp>
+        <p:nvSpPr>
+          <p:cNvPr id="2" name="Espaço Reservado para Imagem de Slide 1"/>
+          <p:cNvSpPr>
+            <a:spLocks noGrp="1" noRot="1" noChangeAspect="1"/>
+          </p:cNvSpPr>
+          <p:nvPr>
+            <p:ph type="sldImg"/>
+          </p:nvPr>
+        </p:nvSpPr>
+        <p:spPr>
+          <a:xfrm>
+            <a:off x="381000" y="685800"/>
+            <a:ext cx="6096000" cy="3429000"/>
+          </a:xfrm>
+        </p:spPr>
+      </p:sp>
+      <p:sp>
+        <p:nvSpPr>
+          <p:cNvPr id="3" name="Espaço Reservado para Anotações 2"/>
+          <p:cNvSpPr>
+            <a:spLocks noGrp="1"/>
+          </p:cNvSpPr>
+          <p:nvPr>
+            <p:ph type="body" idx="1"/>
+          </p:nvPr>
+        </p:nvSpPr>
+        <p:spPr/>
+        <p:txBody>
+          <a:bodyPr/>
+          <a:lstStyle/>
+          <a:p>
+            <a:endParaRPr lang="pt-BR" dirty="0"/>
+          </a:p>
+        </p:txBody>
+      </p:sp>
+    </p:spTree>
+    <p:extLst>
+      <p:ext uri="{BB962C8B-B14F-4D97-AF65-F5344CB8AC3E}">
+        <p14:creationId xmlns:p14="http://schemas.microsoft.com/office/powerpoint/2010/main" val="585304384"/>
+      </p:ext>
+    </p:extLst>
+  </p:cSld>
+  <p:clrMapOvr>
+    <a:masterClrMapping/>
+  </p:clrMapOvr>
+</p:notes>
+</file>
+
+<file path=ppt/notesSlides/notesSlide24.xml><?xml version="1.0" encoding="utf-8"?>
+<p:notes xmlns:a="http://schemas.openxmlformats.org/drawingml/2006/main" xmlns:r="http://schemas.openxmlformats.org/officeDocument/2006/relationships" xmlns:p="http://schemas.openxmlformats.org/presentationml/2006/main">
+  <p:cSld>
+    <p:spTree>
+      <p:nvGrpSpPr>
+        <p:cNvPr id="1" name=""/>
+        <p:cNvGrpSpPr/>
+        <p:nvPr/>
+      </p:nvGrpSpPr>
+      <p:grpSpPr>
+        <a:xfrm>
+          <a:off x="0" y="0"/>
+          <a:ext cx="0" cy="0"/>
+          <a:chOff x="0" y="0"/>
+          <a:chExt cx="0" cy="0"/>
+        </a:xfrm>
+      </p:grpSpPr>
+      <p:sp>
+        <p:nvSpPr>
+          <p:cNvPr id="2" name="Espaço Reservado para Imagem de Slide 1"/>
+          <p:cNvSpPr>
+            <a:spLocks noGrp="1" noRot="1" noChangeAspect="1"/>
+          </p:cNvSpPr>
+          <p:nvPr>
+            <p:ph type="sldImg"/>
+          </p:nvPr>
+        </p:nvSpPr>
+        <p:spPr>
+          <a:xfrm>
+            <a:off x="381000" y="685800"/>
+            <a:ext cx="6096000" cy="3429000"/>
+          </a:xfrm>
+        </p:spPr>
+      </p:sp>
+      <p:sp>
+        <p:nvSpPr>
+          <p:cNvPr id="3" name="Espaço Reservado para Anotações 2"/>
+          <p:cNvSpPr>
+            <a:spLocks noGrp="1"/>
+          </p:cNvSpPr>
+          <p:nvPr>
+            <p:ph type="body" idx="1"/>
+          </p:nvPr>
+        </p:nvSpPr>
+        <p:spPr/>
+        <p:txBody>
+          <a:bodyPr/>
+          <a:lstStyle/>
+          <a:p>
+            <a:endParaRPr lang="pt-BR" dirty="0"/>
+          </a:p>
+        </p:txBody>
+      </p:sp>
+    </p:spTree>
+    <p:extLst>
+      <p:ext uri="{BB962C8B-B14F-4D97-AF65-F5344CB8AC3E}">
+        <p14:creationId xmlns:p14="http://schemas.microsoft.com/office/powerpoint/2010/main" val="2709569597"/>
+      </p:ext>
+    </p:extLst>
+  </p:cSld>
+  <p:clrMapOvr>
+    <a:masterClrMapping/>
+  </p:clrMapOvr>
+</p:notes>
+</file>
+
+<file path=ppt/notesSlides/notesSlide25.xml><?xml version="1.0" encoding="utf-8"?>
+<p:notes xmlns:a="http://schemas.openxmlformats.org/drawingml/2006/main" xmlns:r="http://schemas.openxmlformats.org/officeDocument/2006/relationships" xmlns:p="http://schemas.openxmlformats.org/presentationml/2006/main">
+  <p:cSld>
+    <p:spTree>
+      <p:nvGrpSpPr>
+        <p:cNvPr id="1" name=""/>
+        <p:cNvGrpSpPr/>
+        <p:nvPr/>
+      </p:nvGrpSpPr>
+      <p:grpSpPr>
+        <a:xfrm>
+          <a:off x="0" y="0"/>
+          <a:ext cx="0" cy="0"/>
+          <a:chOff x="0" y="0"/>
+          <a:chExt cx="0" cy="0"/>
+        </a:xfrm>
+      </p:grpSpPr>
+      <p:sp>
+        <p:nvSpPr>
+          <p:cNvPr id="2" name="Espaço Reservado para Imagem de Slide 1"/>
+          <p:cNvSpPr>
+            <a:spLocks noGrp="1" noRot="1" noChangeAspect="1"/>
+          </p:cNvSpPr>
+          <p:nvPr>
+            <p:ph type="sldImg"/>
+          </p:nvPr>
+        </p:nvSpPr>
+        <p:spPr>
+          <a:xfrm>
+            <a:off x="381000" y="685800"/>
+            <a:ext cx="6096000" cy="3429000"/>
+          </a:xfrm>
+        </p:spPr>
+      </p:sp>
+      <p:sp>
+        <p:nvSpPr>
+          <p:cNvPr id="3" name="Espaço Reservado para Anotações 2"/>
+          <p:cNvSpPr>
+            <a:spLocks noGrp="1"/>
+          </p:cNvSpPr>
+          <p:nvPr>
+            <p:ph type="body" idx="1"/>
+          </p:nvPr>
+        </p:nvSpPr>
+        <p:spPr/>
+        <p:txBody>
+          <a:bodyPr/>
+          <a:lstStyle/>
+          <a:p>
+            <a:endParaRPr lang="pt-BR" dirty="0"/>
+          </a:p>
+        </p:txBody>
+      </p:sp>
+    </p:spTree>
+    <p:extLst>
+      <p:ext uri="{BB962C8B-B14F-4D97-AF65-F5344CB8AC3E}">
         <p14:creationId xmlns:p14="http://schemas.microsoft.com/office/powerpoint/2010/main" val="2296249050"/>
       </p:ext>
     </p:extLst>
@@ -1436,7 +1704,7 @@
 </p:notes>
 </file>
 
-<file path=ppt/notesSlides/notesSlide22.xml><?xml version="1.0" encoding="utf-8"?>
+<file path=ppt/notesSlides/notesSlide26.xml><?xml version="1.0" encoding="utf-8"?>
 <p:notes xmlns:a="http://schemas.openxmlformats.org/drawingml/2006/main" xmlns:r="http://schemas.openxmlformats.org/officeDocument/2006/relationships" xmlns:p="http://schemas.openxmlformats.org/presentationml/2006/main">
   <p:cSld>
     <p:spTree>
@@ -6009,7 +6277,7 @@
                   <a:srgbClr val="0070C0"/>
                 </a:solidFill>
               </a:rPr>
-              <a:t>Componentes Básicos - Chip</a:t>
+              <a:t>Características de uma CPU</a:t>
             </a:r>
             <a:endParaRPr lang="en-US" b="1" dirty="0">
               <a:solidFill>
@@ -6032,7 +6300,7 @@
         <p:spPr>
           <a:xfrm>
             <a:off x="142865" y="1200150"/>
-            <a:ext cx="8865056" cy="3737370"/>
+            <a:ext cx="8865056" cy="3786378"/>
           </a:xfrm>
         </p:spPr>
         <p:txBody>
@@ -6046,32 +6314,15 @@
               <a:buChar char="§"/>
             </a:pPr>
             <a:r>
-              <a:rPr lang="pt-BR" sz="2000" dirty="0">
+              <a:rPr lang="pt-BR" sz="2400" dirty="0">
                 <a:solidFill>
                   <a:schemeClr val="tx1"/>
                 </a:solidFill>
                 <a:latin typeface="Times New Roman" panose="02020603050405020304" pitchFamily="18" charset="0"/>
                 <a:cs typeface="Times New Roman" panose="02020603050405020304" pitchFamily="18" charset="0"/>
               </a:rPr>
-              <a:t>Processador </a:t>
-            </a:r>
-            <a:r>
-              <a:rPr lang="pt-BR" sz="2000">
-                <a:solidFill>
-                  <a:schemeClr val="tx1"/>
-                </a:solidFill>
-                <a:latin typeface="Times New Roman" panose="02020603050405020304" pitchFamily="18" charset="0"/>
-                <a:cs typeface="Times New Roman" panose="02020603050405020304" pitchFamily="18" charset="0"/>
-              </a:rPr>
-              <a:t>(ULA e UC)</a:t>
-            </a:r>
-            <a:endParaRPr lang="pt-BR" sz="2000" dirty="0">
-              <a:solidFill>
-                <a:schemeClr val="tx1"/>
-              </a:solidFill>
-              <a:latin typeface="Times New Roman" panose="02020603050405020304" pitchFamily="18" charset="0"/>
-              <a:cs typeface="Times New Roman" panose="02020603050405020304" pitchFamily="18" charset="0"/>
-            </a:endParaRPr>
+              <a:t>Baseado em registradores internos</a:t>
+            </a:r>
           </a:p>
           <a:p>
             <a:pPr algn="just">
@@ -6079,14 +6330,14 @@
               <a:buChar char="§"/>
             </a:pPr>
             <a:r>
-              <a:rPr lang="pt-BR" sz="2000" dirty="0">
+              <a:rPr lang="pt-BR" sz="2400" dirty="0">
                 <a:solidFill>
                   <a:schemeClr val="tx1"/>
                 </a:solidFill>
                 <a:latin typeface="Times New Roman" panose="02020603050405020304" pitchFamily="18" charset="0"/>
                 <a:cs typeface="Times New Roman" panose="02020603050405020304" pitchFamily="18" charset="0"/>
               </a:rPr>
-              <a:t>Memória</a:t>
+              <a:t>Dados binários como entrada</a:t>
             </a:r>
           </a:p>
           <a:p>
@@ -6095,14 +6346,14 @@
               <a:buChar char="§"/>
             </a:pPr>
             <a:r>
-              <a:rPr lang="pt-BR" sz="2000" dirty="0">
+              <a:rPr lang="pt-BR" sz="2400" dirty="0">
                 <a:solidFill>
                   <a:schemeClr val="tx1"/>
                 </a:solidFill>
                 <a:latin typeface="Times New Roman" panose="02020603050405020304" pitchFamily="18" charset="0"/>
                 <a:cs typeface="Times New Roman" panose="02020603050405020304" pitchFamily="18" charset="0"/>
               </a:rPr>
-              <a:t>Periféricos de Entrada e de Saída</a:t>
+              <a:t>Processa-os de acordo com um conjunto de instruções</a:t>
             </a:r>
           </a:p>
           <a:p>
@@ -6111,14 +6362,14 @@
               <a:buChar char="§"/>
             </a:pPr>
             <a:r>
-              <a:rPr lang="pt-BR" sz="2000" dirty="0">
+              <a:rPr lang="pt-BR" sz="2400" dirty="0">
                 <a:solidFill>
                   <a:schemeClr val="tx1"/>
                 </a:solidFill>
                 <a:latin typeface="Times New Roman" panose="02020603050405020304" pitchFamily="18" charset="0"/>
                 <a:cs typeface="Times New Roman" panose="02020603050405020304" pitchFamily="18" charset="0"/>
               </a:rPr>
-              <a:t>Temporizadores</a:t>
+              <a:t>Armazena as instruções na memoria</a:t>
             </a:r>
           </a:p>
           <a:p>
@@ -6127,94 +6378,14 @@
               <a:buChar char="§"/>
             </a:pPr>
             <a:r>
-              <a:rPr lang="pt-BR" sz="2000" dirty="0">
+              <a:rPr lang="pt-BR" sz="2400" dirty="0">
                 <a:solidFill>
                   <a:schemeClr val="tx1"/>
                 </a:solidFill>
                 <a:latin typeface="Times New Roman" panose="02020603050405020304" pitchFamily="18" charset="0"/>
                 <a:cs typeface="Times New Roman" panose="02020603050405020304" pitchFamily="18" charset="0"/>
               </a:rPr>
-              <a:t>Dispositivos de Comunicação Serial</a:t>
-            </a:r>
-          </a:p>
-          <a:p>
-            <a:pPr algn="just">
-              <a:buFont typeface="Wingdings" panose="05000000000000000000" pitchFamily="2" charset="2"/>
-              <a:buChar char="§"/>
-            </a:pPr>
-            <a:r>
-              <a:rPr lang="pt-BR" sz="2000" dirty="0">
-                <a:solidFill>
-                  <a:schemeClr val="tx1"/>
-                </a:solidFill>
-                <a:latin typeface="Times New Roman" panose="02020603050405020304" pitchFamily="18" charset="0"/>
-                <a:cs typeface="Times New Roman" panose="02020603050405020304" pitchFamily="18" charset="0"/>
-              </a:rPr>
-              <a:t>Sensores</a:t>
-            </a:r>
-          </a:p>
-          <a:p>
-            <a:pPr algn="just">
-              <a:buFont typeface="Wingdings" panose="05000000000000000000" pitchFamily="2" charset="2"/>
-              <a:buChar char="§"/>
-            </a:pPr>
-            <a:r>
-              <a:rPr lang="pt-BR" sz="2000" dirty="0">
-                <a:solidFill>
-                  <a:schemeClr val="tx1"/>
-                </a:solidFill>
-                <a:latin typeface="Times New Roman" panose="02020603050405020304" pitchFamily="18" charset="0"/>
-                <a:cs typeface="Times New Roman" panose="02020603050405020304" pitchFamily="18" charset="0"/>
-              </a:rPr>
-              <a:t>PWM</a:t>
-            </a:r>
-          </a:p>
-          <a:p>
-            <a:pPr algn="just">
-              <a:buFont typeface="Wingdings" panose="05000000000000000000" pitchFamily="2" charset="2"/>
-              <a:buChar char="§"/>
-            </a:pPr>
-            <a:r>
-              <a:rPr lang="pt-BR" sz="2000" dirty="0">
-                <a:solidFill>
-                  <a:schemeClr val="tx1"/>
-                </a:solidFill>
-                <a:latin typeface="Times New Roman" panose="02020603050405020304" pitchFamily="18" charset="0"/>
-                <a:cs typeface="Times New Roman" panose="02020603050405020304" pitchFamily="18" charset="0"/>
-              </a:rPr>
-              <a:t>Conversores</a:t>
-            </a:r>
-          </a:p>
-          <a:p>
-            <a:pPr algn="just">
-              <a:buFont typeface="Wingdings" panose="05000000000000000000" pitchFamily="2" charset="2"/>
-              <a:buChar char="§"/>
-            </a:pPr>
-            <a:r>
-              <a:rPr lang="pt-BR" sz="2000" dirty="0">
-                <a:solidFill>
-                  <a:schemeClr val="tx1"/>
-                </a:solidFill>
-                <a:latin typeface="Times New Roman" panose="02020603050405020304" pitchFamily="18" charset="0"/>
-                <a:cs typeface="Times New Roman" panose="02020603050405020304" pitchFamily="18" charset="0"/>
-              </a:rPr>
-              <a:t>Pinos I/O</a:t>
-            </a:r>
-          </a:p>
-          <a:p>
-            <a:pPr algn="just">
-              <a:buFont typeface="Wingdings" panose="05000000000000000000" pitchFamily="2" charset="2"/>
-              <a:buChar char="§"/>
-            </a:pPr>
-            <a:r>
-              <a:rPr lang="pt-BR" sz="2000" dirty="0">
-                <a:solidFill>
-                  <a:schemeClr val="tx1"/>
-                </a:solidFill>
-                <a:latin typeface="Times New Roman" panose="02020603050405020304" pitchFamily="18" charset="0"/>
-                <a:cs typeface="Times New Roman" panose="02020603050405020304" pitchFamily="18" charset="0"/>
-              </a:rPr>
-              <a:t>Controle de Sistemas Lógicos</a:t>
+              <a:t>Fornece uma saída</a:t>
             </a:r>
           </a:p>
         </p:txBody>
@@ -6268,7 +6439,7 @@
         </p:spPr>
         <p:txBody>
           <a:bodyPr>
-            <a:normAutofit fontScale="90000"/>
+            <a:normAutofit/>
           </a:bodyPr>
           <a:lstStyle/>
           <a:p>
@@ -6278,7 +6449,7 @@
                   <a:srgbClr val="0070C0"/>
                 </a:solidFill>
               </a:rPr>
-              <a:t>Distinção Entre Microcontroladores</a:t>
+              <a:t>Componentes Básicos - Chip</a:t>
             </a:r>
             <a:endParaRPr lang="en-US" b="1" dirty="0">
               <a:solidFill>
@@ -6301,7 +6472,7 @@
         <p:spPr>
           <a:xfrm>
             <a:off x="142865" y="1200150"/>
-            <a:ext cx="8865056" cy="3737370"/>
+            <a:ext cx="8865056" cy="3786378"/>
           </a:xfrm>
         </p:spPr>
         <p:txBody>
@@ -6310,8 +6481,9 @@
           </a:bodyPr>
           <a:lstStyle/>
           <a:p>
-            <a:pPr marL="0" indent="0" algn="just">
-              <a:buNone/>
+            <a:pPr algn="just">
+              <a:buFont typeface="Wingdings" panose="05000000000000000000" pitchFamily="2" charset="2"/>
+              <a:buChar char="§"/>
             </a:pPr>
             <a:r>
               <a:rPr lang="pt-BR" sz="2000" dirty="0">
@@ -6321,24 +6493,13 @@
                 <a:latin typeface="Times New Roman" panose="02020603050405020304" pitchFamily="18" charset="0"/>
                 <a:cs typeface="Times New Roman" panose="02020603050405020304" pitchFamily="18" charset="0"/>
               </a:rPr>
-              <a:t>As famílias são identificadas principalmente pelos dois primeiros dígitos do código do dispositivo. </a:t>
-            </a:r>
-          </a:p>
-          <a:p>
-            <a:pPr marL="0" indent="0" algn="just">
-              <a:buNone/>
-            </a:pPr>
-            <a:endParaRPr lang="pt-BR" sz="2000" dirty="0">
-              <a:solidFill>
-                <a:schemeClr val="tx1"/>
-              </a:solidFill>
-              <a:latin typeface="Times New Roman" panose="02020603050405020304" pitchFamily="18" charset="0"/>
-              <a:cs typeface="Times New Roman" panose="02020603050405020304" pitchFamily="18" charset="0"/>
-            </a:endParaRPr>
-          </a:p>
-          <a:p>
-            <a:pPr marL="0" indent="0" algn="just">
-              <a:buNone/>
+              <a:t>Processador (ULA e UC)</a:t>
+            </a:r>
+          </a:p>
+          <a:p>
+            <a:pPr algn="just">
+              <a:buFont typeface="Wingdings" panose="05000000000000000000" pitchFamily="2" charset="2"/>
+              <a:buChar char="§"/>
             </a:pPr>
             <a:r>
               <a:rPr lang="pt-BR" sz="2000" dirty="0">
@@ -6348,24 +6509,13 @@
                 <a:latin typeface="Times New Roman" panose="02020603050405020304" pitchFamily="18" charset="0"/>
                 <a:cs typeface="Times New Roman" panose="02020603050405020304" pitchFamily="18" charset="0"/>
               </a:rPr>
-              <a:t>O caractere alfabético a seguir fornece alguma indicação da tecnologia usada. </a:t>
-            </a:r>
-          </a:p>
-          <a:p>
-            <a:pPr marL="0" indent="0" algn="just">
-              <a:buNone/>
-            </a:pPr>
-            <a:endParaRPr lang="pt-BR" sz="2000" dirty="0">
-              <a:solidFill>
-                <a:schemeClr val="tx1"/>
-              </a:solidFill>
-              <a:latin typeface="Times New Roman" panose="02020603050405020304" pitchFamily="18" charset="0"/>
-              <a:cs typeface="Times New Roman" panose="02020603050405020304" pitchFamily="18" charset="0"/>
-            </a:endParaRPr>
-          </a:p>
-          <a:p>
-            <a:pPr marL="0" indent="0" algn="just">
-              <a:buNone/>
+              <a:t>Memória</a:t>
+            </a:r>
+          </a:p>
+          <a:p>
+            <a:pPr algn="just">
+              <a:buFont typeface="Wingdings" panose="05000000000000000000" pitchFamily="2" charset="2"/>
+              <a:buChar char="§"/>
             </a:pPr>
             <a:r>
               <a:rPr lang="pt-BR" sz="2000" dirty="0">
@@ -6375,15 +6525,157 @@
                 <a:latin typeface="Times New Roman" panose="02020603050405020304" pitchFamily="18" charset="0"/>
                 <a:cs typeface="Times New Roman" panose="02020603050405020304" pitchFamily="18" charset="0"/>
               </a:rPr>
-              <a:t>O caractere 'C' entre os números IC indica tecnologia CMOS, e a inserção 'F' indica incorporação de tecnologia de memória Flash, um 'A' após o número indica uma atualização tecnológica no primeiro dispositivo de emissão. </a:t>
+              <a:t>Periféricos de Entrada e de Saída</a:t>
+            </a:r>
+          </a:p>
+          <a:p>
+            <a:pPr algn="just">
+              <a:buFont typeface="Wingdings" panose="05000000000000000000" pitchFamily="2" charset="2"/>
+              <a:buChar char="§"/>
+            </a:pPr>
+            <a:r>
+              <a:rPr lang="pt-BR" sz="2000" dirty="0">
+                <a:solidFill>
+                  <a:schemeClr val="tx1"/>
+                </a:solidFill>
+                <a:latin typeface="Times New Roman" panose="02020603050405020304" pitchFamily="18" charset="0"/>
+                <a:cs typeface="Times New Roman" panose="02020603050405020304" pitchFamily="18" charset="0"/>
+              </a:rPr>
+              <a:t>Temporizadores</a:t>
+            </a:r>
+          </a:p>
+          <a:p>
+            <a:pPr algn="just">
+              <a:buFont typeface="Wingdings" panose="05000000000000000000" pitchFamily="2" charset="2"/>
+              <a:buChar char="§"/>
+            </a:pPr>
+            <a:r>
+              <a:rPr lang="pt-BR" sz="2000" dirty="0">
+                <a:solidFill>
+                  <a:schemeClr val="tx1"/>
+                </a:solidFill>
+                <a:latin typeface="Times New Roman" panose="02020603050405020304" pitchFamily="18" charset="0"/>
+                <a:cs typeface="Times New Roman" panose="02020603050405020304" pitchFamily="18" charset="0"/>
+              </a:rPr>
+              <a:t>Dispositivos de Comunicação Serial</a:t>
+            </a:r>
+          </a:p>
+          <a:p>
+            <a:pPr algn="just">
+              <a:buFont typeface="Wingdings" panose="05000000000000000000" pitchFamily="2" charset="2"/>
+              <a:buChar char="§"/>
+            </a:pPr>
+            <a:r>
+              <a:rPr lang="pt-BR" sz="2000" dirty="0">
+                <a:solidFill>
+                  <a:schemeClr val="tx1"/>
+                </a:solidFill>
+                <a:latin typeface="Times New Roman" panose="02020603050405020304" pitchFamily="18" charset="0"/>
+                <a:cs typeface="Times New Roman" panose="02020603050405020304" pitchFamily="18" charset="0"/>
+              </a:rPr>
+              <a:t>Sensores</a:t>
+            </a:r>
+          </a:p>
+          <a:p>
+            <a:pPr algn="just">
+              <a:buFont typeface="Wingdings" panose="05000000000000000000" pitchFamily="2" charset="2"/>
+              <a:buChar char="§"/>
+            </a:pPr>
+            <a:r>
+              <a:rPr lang="pt-BR" sz="2000" dirty="0">
+                <a:solidFill>
+                  <a:schemeClr val="tx1"/>
+                </a:solidFill>
+                <a:latin typeface="Times New Roman" panose="02020603050405020304" pitchFamily="18" charset="0"/>
+                <a:cs typeface="Times New Roman" panose="02020603050405020304" pitchFamily="18" charset="0"/>
+              </a:rPr>
+              <a:t>PWM</a:t>
+            </a:r>
+          </a:p>
+          <a:p>
+            <a:pPr algn="just">
+              <a:buFont typeface="Wingdings" panose="05000000000000000000" pitchFamily="2" charset="2"/>
+              <a:buChar char="§"/>
+            </a:pPr>
+            <a:r>
+              <a:rPr lang="pt-BR" sz="2000" dirty="0">
+                <a:solidFill>
+                  <a:schemeClr val="tx1"/>
+                </a:solidFill>
+                <a:latin typeface="Times New Roman" panose="02020603050405020304" pitchFamily="18" charset="0"/>
+                <a:cs typeface="Times New Roman" panose="02020603050405020304" pitchFamily="18" charset="0"/>
+              </a:rPr>
+              <a:t>Conversores</a:t>
+            </a:r>
+          </a:p>
+          <a:p>
+            <a:pPr algn="just">
+              <a:buFont typeface="Wingdings" panose="05000000000000000000" pitchFamily="2" charset="2"/>
+              <a:buChar char="§"/>
+            </a:pPr>
+            <a:r>
+              <a:rPr lang="pt-BR" sz="2000" dirty="0">
+                <a:solidFill>
+                  <a:schemeClr val="tx1"/>
+                </a:solidFill>
+                <a:latin typeface="Times New Roman" panose="02020603050405020304" pitchFamily="18" charset="0"/>
+                <a:cs typeface="Times New Roman" panose="02020603050405020304" pitchFamily="18" charset="0"/>
+              </a:rPr>
+              <a:t>Pinos I/O</a:t>
+            </a:r>
+          </a:p>
+          <a:p>
+            <a:pPr algn="just">
+              <a:buFont typeface="Wingdings" panose="05000000000000000000" pitchFamily="2" charset="2"/>
+              <a:buChar char="§"/>
+            </a:pPr>
+            <a:r>
+              <a:rPr lang="pt-BR" sz="2000" dirty="0">
+                <a:solidFill>
+                  <a:schemeClr val="tx1"/>
+                </a:solidFill>
+                <a:latin typeface="Times New Roman" panose="02020603050405020304" pitchFamily="18" charset="0"/>
+                <a:cs typeface="Times New Roman" panose="02020603050405020304" pitchFamily="18" charset="0"/>
+              </a:rPr>
+              <a:t>Controle de Sistemas Lógicos, Relés, Interruptores, etc.</a:t>
             </a:r>
           </a:p>
         </p:txBody>
       </p:sp>
+      <p:pic>
+        <p:nvPicPr>
+          <p:cNvPr id="3" name="Imagem 2">
+            <a:extLst>
+              <a:ext uri="{FF2B5EF4-FFF2-40B4-BE49-F238E27FC236}">
+                <a16:creationId xmlns:a16="http://schemas.microsoft.com/office/drawing/2014/main" id="{ED480386-32CC-5368-939B-FF6AD3DB3AF5}"/>
+              </a:ext>
+            </a:extLst>
+          </p:cNvPr>
+          <p:cNvPicPr>
+            <a:picLocks noChangeAspect="1"/>
+          </p:cNvPicPr>
+          <p:nvPr/>
+        </p:nvPicPr>
+        <p:blipFill>
+          <a:blip r:embed="rId3"/>
+          <a:stretch>
+            <a:fillRect/>
+          </a:stretch>
+        </p:blipFill>
+        <p:spPr>
+          <a:xfrm>
+            <a:off x="1643062" y="990600"/>
+            <a:ext cx="5857875" cy="3162300"/>
+          </a:xfrm>
+          <a:prstGeom prst="rect">
+            <a:avLst/>
+          </a:prstGeom>
+        </p:spPr>
+      </p:pic>
     </p:spTree>
     <p:extLst>
       <p:ext uri="{BB962C8B-B14F-4D97-AF65-F5344CB8AC3E}">
-        <p14:creationId xmlns:p14="http://schemas.microsoft.com/office/powerpoint/2010/main" val="3402074443"/>
+        <p14:creationId xmlns:p14="http://schemas.microsoft.com/office/powerpoint/2010/main" val="3645892762"/>
       </p:ext>
     </p:extLst>
   </p:cSld>
@@ -6429,6 +6721,274 @@
         </p:spPr>
         <p:txBody>
           <a:bodyPr>
+            <a:normAutofit/>
+          </a:bodyPr>
+          <a:lstStyle/>
+          <a:p>
+            <a:r>
+              <a:rPr lang="pt-BR" b="1" dirty="0">
+                <a:solidFill>
+                  <a:srgbClr val="0070C0"/>
+                </a:solidFill>
+              </a:rPr>
+              <a:t>Componentes Básicos - Chip</a:t>
+            </a:r>
+            <a:endParaRPr lang="en-US" b="1" dirty="0">
+              <a:solidFill>
+                <a:srgbClr val="0070C0"/>
+              </a:solidFill>
+            </a:endParaRPr>
+          </a:p>
+        </p:txBody>
+      </p:sp>
+      <p:sp>
+        <p:nvSpPr>
+          <p:cNvPr id="8" name="Text Placeholder 2"/>
+          <p:cNvSpPr>
+            <a:spLocks noGrp="1"/>
+          </p:cNvSpPr>
+          <p:nvPr>
+            <p:ph type="body" sz="half" idx="1"/>
+          </p:nvPr>
+        </p:nvSpPr>
+        <p:spPr>
+          <a:xfrm>
+            <a:off x="142865" y="1200150"/>
+            <a:ext cx="8865056" cy="3786378"/>
+          </a:xfrm>
+        </p:spPr>
+        <p:txBody>
+          <a:bodyPr>
+            <a:noAutofit/>
+          </a:bodyPr>
+          <a:lstStyle/>
+          <a:p>
+            <a:pPr marL="0" indent="0" algn="just">
+              <a:buNone/>
+            </a:pPr>
+            <a:endParaRPr lang="pt-BR" sz="2000" dirty="0">
+              <a:solidFill>
+                <a:schemeClr val="tx1"/>
+              </a:solidFill>
+              <a:latin typeface="Times New Roman" panose="02020603050405020304" pitchFamily="18" charset="0"/>
+              <a:cs typeface="Times New Roman" panose="02020603050405020304" pitchFamily="18" charset="0"/>
+            </a:endParaRPr>
+          </a:p>
+        </p:txBody>
+      </p:sp>
+      <p:pic>
+        <p:nvPicPr>
+          <p:cNvPr id="3" name="Imagem 2">
+            <a:extLst>
+              <a:ext uri="{FF2B5EF4-FFF2-40B4-BE49-F238E27FC236}">
+                <a16:creationId xmlns:a16="http://schemas.microsoft.com/office/drawing/2014/main" id="{ED480386-32CC-5368-939B-FF6AD3DB3AF5}"/>
+              </a:ext>
+            </a:extLst>
+          </p:cNvPr>
+          <p:cNvPicPr>
+            <a:picLocks noChangeAspect="1"/>
+          </p:cNvPicPr>
+          <p:nvPr/>
+        </p:nvPicPr>
+        <p:blipFill>
+          <a:blip r:embed="rId3"/>
+          <a:stretch>
+            <a:fillRect/>
+          </a:stretch>
+        </p:blipFill>
+        <p:spPr>
+          <a:xfrm>
+            <a:off x="457200" y="1248918"/>
+            <a:ext cx="6504432" cy="3511336"/>
+          </a:xfrm>
+          <a:prstGeom prst="rect">
+            <a:avLst/>
+          </a:prstGeom>
+        </p:spPr>
+      </p:pic>
+    </p:spTree>
+    <p:extLst>
+      <p:ext uri="{BB962C8B-B14F-4D97-AF65-F5344CB8AC3E}">
+        <p14:creationId xmlns:p14="http://schemas.microsoft.com/office/powerpoint/2010/main" val="760795358"/>
+      </p:ext>
+    </p:extLst>
+  </p:cSld>
+  <p:clrMapOvr>
+    <a:masterClrMapping/>
+  </p:clrMapOvr>
+  <p:transition spd="med"/>
+</p:sld>
+</file>
+
+<file path=ppt/slides/slide18.xml><?xml version="1.0" encoding="utf-8"?>
+<p:sld xmlns:a="http://schemas.openxmlformats.org/drawingml/2006/main" xmlns:r="http://schemas.openxmlformats.org/officeDocument/2006/relationships" xmlns:p="http://schemas.openxmlformats.org/presentationml/2006/main">
+  <p:cSld>
+    <p:spTree>
+      <p:nvGrpSpPr>
+        <p:cNvPr id="1" name=""/>
+        <p:cNvGrpSpPr/>
+        <p:nvPr/>
+      </p:nvGrpSpPr>
+      <p:grpSpPr>
+        <a:xfrm>
+          <a:off x="0" y="0"/>
+          <a:ext cx="0" cy="0"/>
+          <a:chOff x="0" y="0"/>
+          <a:chExt cx="0" cy="0"/>
+        </a:xfrm>
+      </p:grpSpPr>
+      <p:sp>
+        <p:nvSpPr>
+          <p:cNvPr id="6" name="Title 1"/>
+          <p:cNvSpPr>
+            <a:spLocks noGrp="1"/>
+          </p:cNvSpPr>
+          <p:nvPr>
+            <p:ph type="title"/>
+          </p:nvPr>
+        </p:nvSpPr>
+        <p:spPr>
+          <a:xfrm>
+            <a:off x="457200" y="205980"/>
+            <a:ext cx="8229600" cy="857251"/>
+          </a:xfrm>
+        </p:spPr>
+        <p:txBody>
+          <a:bodyPr>
+            <a:normAutofit/>
+          </a:bodyPr>
+          <a:lstStyle/>
+          <a:p>
+            <a:r>
+              <a:rPr lang="pt-BR" b="1" dirty="0">
+                <a:solidFill>
+                  <a:srgbClr val="0070C0"/>
+                </a:solidFill>
+              </a:rPr>
+              <a:t>Componentes Básicos - Chip</a:t>
+            </a:r>
+            <a:endParaRPr lang="en-US" b="1" dirty="0">
+              <a:solidFill>
+                <a:srgbClr val="0070C0"/>
+              </a:solidFill>
+            </a:endParaRPr>
+          </a:p>
+        </p:txBody>
+      </p:sp>
+      <p:sp>
+        <p:nvSpPr>
+          <p:cNvPr id="8" name="Text Placeholder 2"/>
+          <p:cNvSpPr>
+            <a:spLocks noGrp="1"/>
+          </p:cNvSpPr>
+          <p:nvPr>
+            <p:ph type="body" sz="half" idx="1"/>
+          </p:nvPr>
+        </p:nvSpPr>
+        <p:spPr>
+          <a:xfrm>
+            <a:off x="142865" y="1200150"/>
+            <a:ext cx="8865056" cy="3786378"/>
+          </a:xfrm>
+        </p:spPr>
+        <p:txBody>
+          <a:bodyPr>
+            <a:noAutofit/>
+          </a:bodyPr>
+          <a:lstStyle/>
+          <a:p>
+            <a:pPr marL="0" indent="0" algn="just">
+              <a:buNone/>
+            </a:pPr>
+            <a:endParaRPr lang="pt-BR" sz="2000" dirty="0">
+              <a:solidFill>
+                <a:schemeClr val="tx1"/>
+              </a:solidFill>
+              <a:latin typeface="Times New Roman" panose="02020603050405020304" pitchFamily="18" charset="0"/>
+              <a:cs typeface="Times New Roman" panose="02020603050405020304" pitchFamily="18" charset="0"/>
+            </a:endParaRPr>
+          </a:p>
+        </p:txBody>
+      </p:sp>
+      <p:pic>
+        <p:nvPicPr>
+          <p:cNvPr id="4" name="Imagem 3">
+            <a:extLst>
+              <a:ext uri="{FF2B5EF4-FFF2-40B4-BE49-F238E27FC236}">
+                <a16:creationId xmlns:a16="http://schemas.microsoft.com/office/drawing/2014/main" id="{B88AE5CF-0908-4862-65C1-D46BBE50E98D}"/>
+              </a:ext>
+            </a:extLst>
+          </p:cNvPr>
+          <p:cNvPicPr>
+            <a:picLocks noChangeAspect="1"/>
+          </p:cNvPicPr>
+          <p:nvPr/>
+        </p:nvPicPr>
+        <p:blipFill>
+          <a:blip r:embed="rId3"/>
+          <a:stretch>
+            <a:fillRect/>
+          </a:stretch>
+        </p:blipFill>
+        <p:spPr>
+          <a:xfrm>
+            <a:off x="142865" y="1266959"/>
+            <a:ext cx="6859830" cy="3575497"/>
+          </a:xfrm>
+          <a:prstGeom prst="rect">
+            <a:avLst/>
+          </a:prstGeom>
+        </p:spPr>
+      </p:pic>
+    </p:spTree>
+    <p:extLst>
+      <p:ext uri="{BB962C8B-B14F-4D97-AF65-F5344CB8AC3E}">
+        <p14:creationId xmlns:p14="http://schemas.microsoft.com/office/powerpoint/2010/main" val="2725091902"/>
+      </p:ext>
+    </p:extLst>
+  </p:cSld>
+  <p:clrMapOvr>
+    <a:masterClrMapping/>
+  </p:clrMapOvr>
+  <p:transition spd="med"/>
+</p:sld>
+</file>
+
+<file path=ppt/slides/slide19.xml><?xml version="1.0" encoding="utf-8"?>
+<p:sld xmlns:a="http://schemas.openxmlformats.org/drawingml/2006/main" xmlns:r="http://schemas.openxmlformats.org/officeDocument/2006/relationships" xmlns:p="http://schemas.openxmlformats.org/presentationml/2006/main">
+  <p:cSld>
+    <p:spTree>
+      <p:nvGrpSpPr>
+        <p:cNvPr id="1" name=""/>
+        <p:cNvGrpSpPr/>
+        <p:nvPr/>
+      </p:nvGrpSpPr>
+      <p:grpSpPr>
+        <a:xfrm>
+          <a:off x="0" y="0"/>
+          <a:ext cx="0" cy="0"/>
+          <a:chOff x="0" y="0"/>
+          <a:chExt cx="0" cy="0"/>
+        </a:xfrm>
+      </p:grpSpPr>
+      <p:sp>
+        <p:nvSpPr>
+          <p:cNvPr id="6" name="Title 1"/>
+          <p:cNvSpPr>
+            <a:spLocks noGrp="1"/>
+          </p:cNvSpPr>
+          <p:nvPr>
+            <p:ph type="title"/>
+          </p:nvPr>
+        </p:nvSpPr>
+        <p:spPr>
+          <a:xfrm>
+            <a:off x="457200" y="205980"/>
+            <a:ext cx="8229600" cy="857251"/>
+          </a:xfrm>
+        </p:spPr>
+        <p:txBody>
+          <a:bodyPr>
             <a:normAutofit fontScale="90000"/>
           </a:bodyPr>
           <a:lstStyle/>
@@ -6482,6 +7042,653 @@
                 <a:latin typeface="Times New Roman" panose="02020603050405020304" pitchFamily="18" charset="0"/>
                 <a:cs typeface="Times New Roman" panose="02020603050405020304" pitchFamily="18" charset="0"/>
               </a:rPr>
+              <a:t>As famílias são identificadas principalmente pelos dois primeiros dígitos do código do dispositivo. </a:t>
+            </a:r>
+          </a:p>
+          <a:p>
+            <a:pPr marL="0" indent="0" algn="just">
+              <a:buNone/>
+            </a:pPr>
+            <a:endParaRPr lang="pt-BR" sz="2000" dirty="0">
+              <a:solidFill>
+                <a:schemeClr val="tx1"/>
+              </a:solidFill>
+              <a:latin typeface="Times New Roman" panose="02020603050405020304" pitchFamily="18" charset="0"/>
+              <a:cs typeface="Times New Roman" panose="02020603050405020304" pitchFamily="18" charset="0"/>
+            </a:endParaRPr>
+          </a:p>
+          <a:p>
+            <a:pPr marL="0" indent="0" algn="just">
+              <a:buNone/>
+            </a:pPr>
+            <a:r>
+              <a:rPr lang="pt-BR" sz="2000" dirty="0">
+                <a:solidFill>
+                  <a:schemeClr val="tx1"/>
+                </a:solidFill>
+                <a:latin typeface="Times New Roman" panose="02020603050405020304" pitchFamily="18" charset="0"/>
+                <a:cs typeface="Times New Roman" panose="02020603050405020304" pitchFamily="18" charset="0"/>
+              </a:rPr>
+              <a:t>O caractere alfabético a seguir fornece alguma indicação da tecnologia usada. </a:t>
+            </a:r>
+          </a:p>
+          <a:p>
+            <a:pPr marL="0" indent="0" algn="just">
+              <a:buNone/>
+            </a:pPr>
+            <a:endParaRPr lang="pt-BR" sz="2000" dirty="0">
+              <a:solidFill>
+                <a:schemeClr val="tx1"/>
+              </a:solidFill>
+              <a:latin typeface="Times New Roman" panose="02020603050405020304" pitchFamily="18" charset="0"/>
+              <a:cs typeface="Times New Roman" panose="02020603050405020304" pitchFamily="18" charset="0"/>
+            </a:endParaRPr>
+          </a:p>
+          <a:p>
+            <a:pPr marL="0" indent="0" algn="just">
+              <a:buNone/>
+            </a:pPr>
+            <a:r>
+              <a:rPr lang="pt-BR" sz="2000" dirty="0">
+                <a:solidFill>
+                  <a:schemeClr val="tx1"/>
+                </a:solidFill>
+                <a:latin typeface="Times New Roman" panose="02020603050405020304" pitchFamily="18" charset="0"/>
+                <a:cs typeface="Times New Roman" panose="02020603050405020304" pitchFamily="18" charset="0"/>
+              </a:rPr>
+              <a:t>O caractere 'C' entre os números IC indica tecnologia CMOS, e a inserção 'F' indica incorporação de tecnologia de memória Flash, um 'A' após o número indica uma atualização tecnológica no primeiro dispositivo de emissão. </a:t>
+            </a:r>
+          </a:p>
+        </p:txBody>
+      </p:sp>
+    </p:spTree>
+    <p:extLst>
+      <p:ext uri="{BB962C8B-B14F-4D97-AF65-F5344CB8AC3E}">
+        <p14:creationId xmlns:p14="http://schemas.microsoft.com/office/powerpoint/2010/main" val="3402074443"/>
+      </p:ext>
+    </p:extLst>
+  </p:cSld>
+  <p:clrMapOvr>
+    <a:masterClrMapping/>
+  </p:clrMapOvr>
+  <p:transition spd="med"/>
+</p:sld>
+</file>
+
+<file path=ppt/slides/slide2.xml><?xml version="1.0" encoding="utf-8"?>
+<p:sld xmlns:a="http://schemas.openxmlformats.org/drawingml/2006/main" xmlns:r="http://schemas.openxmlformats.org/officeDocument/2006/relationships" xmlns:p="http://schemas.openxmlformats.org/presentationml/2006/main">
+  <p:cSld>
+    <p:spTree>
+      <p:nvGrpSpPr>
+        <p:cNvPr id="1" name=""/>
+        <p:cNvGrpSpPr/>
+        <p:nvPr/>
+      </p:nvGrpSpPr>
+      <p:grpSpPr>
+        <a:xfrm>
+          <a:off x="0" y="0"/>
+          <a:ext cx="0" cy="0"/>
+          <a:chOff x="0" y="0"/>
+          <a:chExt cx="0" cy="0"/>
+        </a:xfrm>
+      </p:grpSpPr>
+      <p:pic>
+        <p:nvPicPr>
+          <p:cNvPr id="112" name="Picture 6" descr="Picture 6"/>
+          <p:cNvPicPr>
+            <a:picLocks noChangeAspect="1"/>
+          </p:cNvPicPr>
+          <p:nvPr/>
+        </p:nvPicPr>
+        <p:blipFill>
+          <a:blip r:embed="rId3"/>
+          <a:stretch>
+            <a:fillRect/>
+          </a:stretch>
+        </p:blipFill>
+        <p:spPr>
+          <a:xfrm>
+            <a:off x="0" y="0"/>
+            <a:ext cx="9144000" cy="5143500"/>
+          </a:xfrm>
+          <a:prstGeom prst="rect">
+            <a:avLst/>
+          </a:prstGeom>
+          <a:ln w="12700">
+            <a:miter lim="400000"/>
+            <a:headEnd/>
+            <a:tailEnd/>
+          </a:ln>
+        </p:spPr>
+      </p:pic>
+      <p:pic>
+        <p:nvPicPr>
+          <p:cNvPr id="114" name="Picture 5" descr="Picture 5"/>
+          <p:cNvPicPr>
+            <a:picLocks noChangeAspect="1"/>
+          </p:cNvPicPr>
+          <p:nvPr/>
+        </p:nvPicPr>
+        <p:blipFill>
+          <a:blip r:embed="rId4"/>
+          <a:stretch>
+            <a:fillRect/>
+          </a:stretch>
+        </p:blipFill>
+        <p:spPr>
+          <a:xfrm>
+            <a:off x="469900" y="0"/>
+            <a:ext cx="4391984" cy="171450"/>
+          </a:xfrm>
+          <a:prstGeom prst="rect">
+            <a:avLst/>
+          </a:prstGeom>
+          <a:ln w="12700">
+            <a:miter lim="400000"/>
+            <a:headEnd/>
+            <a:tailEnd/>
+          </a:ln>
+        </p:spPr>
+      </p:pic>
+      <p:sp>
+        <p:nvSpPr>
+          <p:cNvPr id="3" name="Título 2"/>
+          <p:cNvSpPr>
+            <a:spLocks noGrp="1"/>
+          </p:cNvSpPr>
+          <p:nvPr>
+            <p:ph type="title"/>
+          </p:nvPr>
+        </p:nvSpPr>
+        <p:spPr>
+          <a:xfrm>
+            <a:off x="348258" y="2277667"/>
+            <a:ext cx="8681444" cy="1102519"/>
+          </a:xfrm>
+        </p:spPr>
+        <p:txBody>
+          <a:bodyPr>
+            <a:noAutofit/>
+          </a:bodyPr>
+          <a:lstStyle/>
+          <a:p>
+            <a:pPr algn="l"/>
+            <a:br>
+              <a:rPr lang="pt-BR" b="1" dirty="0">
+                <a:solidFill>
+                  <a:schemeClr val="bg1"/>
+                </a:solidFill>
+              </a:rPr>
+            </a:br>
+            <a:r>
+              <a:rPr lang="pt-BR" b="1" dirty="0">
+                <a:solidFill>
+                  <a:schemeClr val="bg1"/>
+                </a:solidFill>
+              </a:rPr>
+              <a:t>Aula 01</a:t>
+            </a:r>
+            <a:br>
+              <a:rPr lang="pt-BR" b="1" dirty="0">
+                <a:solidFill>
+                  <a:schemeClr val="bg1"/>
+                </a:solidFill>
+              </a:rPr>
+            </a:br>
+            <a:r>
+              <a:rPr lang="pt-BR" b="1" dirty="0">
+                <a:solidFill>
+                  <a:schemeClr val="bg1"/>
+                </a:solidFill>
+              </a:rPr>
+              <a:t>	</a:t>
+            </a:r>
+            <a:r>
+              <a:rPr lang="pt-BR" sz="3600" b="1" dirty="0">
+                <a:solidFill>
+                  <a:schemeClr val="bg1"/>
+                </a:solidFill>
+              </a:rPr>
+              <a:t>Microcontroladores</a:t>
+            </a:r>
+          </a:p>
+        </p:txBody>
+      </p:sp>
+      <p:sp>
+        <p:nvSpPr>
+          <p:cNvPr id="6" name="Título 2"/>
+          <p:cNvSpPr txBox="1"/>
+          <p:nvPr/>
+        </p:nvSpPr>
+        <p:spPr>
+          <a:xfrm>
+            <a:off x="975683" y="3866663"/>
+            <a:ext cx="7772400" cy="1102519"/>
+          </a:xfrm>
+          <a:prstGeom prst="rect">
+            <a:avLst/>
+          </a:prstGeom>
+          <a:ln w="12700">
+            <a:miter lim="400000"/>
+          </a:ln>
+        </p:spPr>
+        <p:txBody>
+          <a:bodyPr lIns="45718" tIns="45718" rIns="45718" bIns="45718" anchor="ctr">
+            <a:noAutofit/>
+          </a:bodyPr>
+          <a:lstStyle>
+            <a:lvl1pPr marL="0" marR="0" indent="0" algn="ctr" defTabSz="457200" rtl="0" latinLnBrk="0">
+              <a:lnSpc>
+                <a:spcPct val="100000"/>
+              </a:lnSpc>
+              <a:spcBef>
+                <a:spcPts val="0"/>
+              </a:spcBef>
+              <a:spcAft>
+                <a:spcPts val="0"/>
+              </a:spcAft>
+              <a:buClrTx/>
+              <a:buSzTx/>
+              <a:buFontTx/>
+              <a:buNone/>
+              <a:defRPr sz="4400" b="0" i="0" u="none" strike="noStrike" cap="none" spc="0" baseline="0">
+                <a:ln>
+                  <a:noFill/>
+                </a:ln>
+                <a:solidFill>
+                  <a:srgbClr val="000000"/>
+                </a:solidFill>
+                <a:uFillTx/>
+                <a:latin typeface="+mj-lt"/>
+                <a:ea typeface="+mj-ea"/>
+                <a:cs typeface="+mj-cs"/>
+                <a:sym typeface="Calibri"/>
+              </a:defRPr>
+            </a:lvl1pPr>
+            <a:lvl2pPr marL="0" marR="0" indent="0" algn="ctr" defTabSz="457200" rtl="0" latinLnBrk="0">
+              <a:lnSpc>
+                <a:spcPct val="100000"/>
+              </a:lnSpc>
+              <a:spcBef>
+                <a:spcPts val="0"/>
+              </a:spcBef>
+              <a:spcAft>
+                <a:spcPts val="0"/>
+              </a:spcAft>
+              <a:buClrTx/>
+              <a:buSzTx/>
+              <a:buFontTx/>
+              <a:buNone/>
+              <a:defRPr sz="4400" b="0" i="0" u="none" strike="noStrike" cap="none" spc="0" baseline="0">
+                <a:ln>
+                  <a:noFill/>
+                </a:ln>
+                <a:solidFill>
+                  <a:srgbClr val="000000"/>
+                </a:solidFill>
+                <a:uFillTx/>
+                <a:latin typeface="+mj-lt"/>
+                <a:ea typeface="+mj-ea"/>
+                <a:cs typeface="+mj-cs"/>
+                <a:sym typeface="Calibri"/>
+              </a:defRPr>
+            </a:lvl2pPr>
+            <a:lvl3pPr marL="0" marR="0" indent="0" algn="ctr" defTabSz="457200" rtl="0" latinLnBrk="0">
+              <a:lnSpc>
+                <a:spcPct val="100000"/>
+              </a:lnSpc>
+              <a:spcBef>
+                <a:spcPts val="0"/>
+              </a:spcBef>
+              <a:spcAft>
+                <a:spcPts val="0"/>
+              </a:spcAft>
+              <a:buClrTx/>
+              <a:buSzTx/>
+              <a:buFontTx/>
+              <a:buNone/>
+              <a:defRPr sz="4400" b="0" i="0" u="none" strike="noStrike" cap="none" spc="0" baseline="0">
+                <a:ln>
+                  <a:noFill/>
+                </a:ln>
+                <a:solidFill>
+                  <a:srgbClr val="000000"/>
+                </a:solidFill>
+                <a:uFillTx/>
+                <a:latin typeface="+mj-lt"/>
+                <a:ea typeface="+mj-ea"/>
+                <a:cs typeface="+mj-cs"/>
+                <a:sym typeface="Calibri"/>
+              </a:defRPr>
+            </a:lvl3pPr>
+            <a:lvl4pPr marL="0" marR="0" indent="0" algn="ctr" defTabSz="457200" rtl="0" latinLnBrk="0">
+              <a:lnSpc>
+                <a:spcPct val="100000"/>
+              </a:lnSpc>
+              <a:spcBef>
+                <a:spcPts val="0"/>
+              </a:spcBef>
+              <a:spcAft>
+                <a:spcPts val="0"/>
+              </a:spcAft>
+              <a:buClrTx/>
+              <a:buSzTx/>
+              <a:buFontTx/>
+              <a:buNone/>
+              <a:defRPr sz="4400" b="0" i="0" u="none" strike="noStrike" cap="none" spc="0" baseline="0">
+                <a:ln>
+                  <a:noFill/>
+                </a:ln>
+                <a:solidFill>
+                  <a:srgbClr val="000000"/>
+                </a:solidFill>
+                <a:uFillTx/>
+                <a:latin typeface="+mj-lt"/>
+                <a:ea typeface="+mj-ea"/>
+                <a:cs typeface="+mj-cs"/>
+                <a:sym typeface="Calibri"/>
+              </a:defRPr>
+            </a:lvl4pPr>
+            <a:lvl5pPr marL="0" marR="0" indent="0" algn="ctr" defTabSz="457200" rtl="0" latinLnBrk="0">
+              <a:lnSpc>
+                <a:spcPct val="100000"/>
+              </a:lnSpc>
+              <a:spcBef>
+                <a:spcPts val="0"/>
+              </a:spcBef>
+              <a:spcAft>
+                <a:spcPts val="0"/>
+              </a:spcAft>
+              <a:buClrTx/>
+              <a:buSzTx/>
+              <a:buFontTx/>
+              <a:buNone/>
+              <a:defRPr sz="4400" b="0" i="0" u="none" strike="noStrike" cap="none" spc="0" baseline="0">
+                <a:ln>
+                  <a:noFill/>
+                </a:ln>
+                <a:solidFill>
+                  <a:srgbClr val="000000"/>
+                </a:solidFill>
+                <a:uFillTx/>
+                <a:latin typeface="+mj-lt"/>
+                <a:ea typeface="+mj-ea"/>
+                <a:cs typeface="+mj-cs"/>
+                <a:sym typeface="Calibri"/>
+              </a:defRPr>
+            </a:lvl5pPr>
+            <a:lvl6pPr marL="0" marR="0" indent="0" algn="ctr" defTabSz="457200" rtl="0" latinLnBrk="0">
+              <a:lnSpc>
+                <a:spcPct val="100000"/>
+              </a:lnSpc>
+              <a:spcBef>
+                <a:spcPts val="0"/>
+              </a:spcBef>
+              <a:spcAft>
+                <a:spcPts val="0"/>
+              </a:spcAft>
+              <a:buClrTx/>
+              <a:buSzTx/>
+              <a:buFontTx/>
+              <a:buNone/>
+              <a:defRPr sz="4400" b="0" i="0" u="none" strike="noStrike" cap="none" spc="0" baseline="0">
+                <a:ln>
+                  <a:noFill/>
+                </a:ln>
+                <a:solidFill>
+                  <a:srgbClr val="000000"/>
+                </a:solidFill>
+                <a:uFillTx/>
+                <a:latin typeface="+mj-lt"/>
+                <a:ea typeface="+mj-ea"/>
+                <a:cs typeface="+mj-cs"/>
+                <a:sym typeface="Calibri"/>
+              </a:defRPr>
+            </a:lvl6pPr>
+            <a:lvl7pPr marL="0" marR="0" indent="0" algn="ctr" defTabSz="457200" rtl="0" latinLnBrk="0">
+              <a:lnSpc>
+                <a:spcPct val="100000"/>
+              </a:lnSpc>
+              <a:spcBef>
+                <a:spcPts val="0"/>
+              </a:spcBef>
+              <a:spcAft>
+                <a:spcPts val="0"/>
+              </a:spcAft>
+              <a:buClrTx/>
+              <a:buSzTx/>
+              <a:buFontTx/>
+              <a:buNone/>
+              <a:defRPr sz="4400" b="0" i="0" u="none" strike="noStrike" cap="none" spc="0" baseline="0">
+                <a:ln>
+                  <a:noFill/>
+                </a:ln>
+                <a:solidFill>
+                  <a:srgbClr val="000000"/>
+                </a:solidFill>
+                <a:uFillTx/>
+                <a:latin typeface="+mj-lt"/>
+                <a:ea typeface="+mj-ea"/>
+                <a:cs typeface="+mj-cs"/>
+                <a:sym typeface="Calibri"/>
+              </a:defRPr>
+            </a:lvl7pPr>
+            <a:lvl8pPr marL="0" marR="0" indent="0" algn="ctr" defTabSz="457200" rtl="0" latinLnBrk="0">
+              <a:lnSpc>
+                <a:spcPct val="100000"/>
+              </a:lnSpc>
+              <a:spcBef>
+                <a:spcPts val="0"/>
+              </a:spcBef>
+              <a:spcAft>
+                <a:spcPts val="0"/>
+              </a:spcAft>
+              <a:buClrTx/>
+              <a:buSzTx/>
+              <a:buFontTx/>
+              <a:buNone/>
+              <a:defRPr sz="4400" b="0" i="0" u="none" strike="noStrike" cap="none" spc="0" baseline="0">
+                <a:ln>
+                  <a:noFill/>
+                </a:ln>
+                <a:solidFill>
+                  <a:srgbClr val="000000"/>
+                </a:solidFill>
+                <a:uFillTx/>
+                <a:latin typeface="+mj-lt"/>
+                <a:ea typeface="+mj-ea"/>
+                <a:cs typeface="+mj-cs"/>
+                <a:sym typeface="Calibri"/>
+              </a:defRPr>
+            </a:lvl8pPr>
+            <a:lvl9pPr marL="0" marR="0" indent="0" algn="ctr" defTabSz="457200" rtl="0" latinLnBrk="0">
+              <a:lnSpc>
+                <a:spcPct val="100000"/>
+              </a:lnSpc>
+              <a:spcBef>
+                <a:spcPts val="0"/>
+              </a:spcBef>
+              <a:spcAft>
+                <a:spcPts val="0"/>
+              </a:spcAft>
+              <a:buClrTx/>
+              <a:buSzTx/>
+              <a:buFontTx/>
+              <a:buNone/>
+              <a:defRPr sz="4400" b="0" i="0" u="none" strike="noStrike" cap="none" spc="0" baseline="0">
+                <a:ln>
+                  <a:noFill/>
+                </a:ln>
+                <a:solidFill>
+                  <a:srgbClr val="000000"/>
+                </a:solidFill>
+                <a:uFillTx/>
+                <a:latin typeface="+mj-lt"/>
+                <a:ea typeface="+mj-ea"/>
+                <a:cs typeface="+mj-cs"/>
+                <a:sym typeface="Calibri"/>
+              </a:defRPr>
+            </a:lvl9pPr>
+          </a:lstStyle>
+          <a:p>
+            <a:pPr algn="r" hangingPunct="1"/>
+            <a:r>
+              <a:rPr lang="pt-BR" sz="2000" b="1" dirty="0">
+                <a:solidFill>
+                  <a:schemeClr val="bg1"/>
+                </a:solidFill>
+              </a:rPr>
+              <a:t>Professor </a:t>
+            </a:r>
+            <a:r>
+              <a:rPr lang="pt-BR" sz="2000" b="1" dirty="0" err="1">
+                <a:solidFill>
+                  <a:schemeClr val="bg1"/>
+                </a:solidFill>
+              </a:rPr>
+              <a:t>MSc</a:t>
+            </a:r>
+            <a:r>
+              <a:rPr lang="pt-BR" sz="2000" b="1" dirty="0">
+                <a:solidFill>
+                  <a:schemeClr val="bg1"/>
+                </a:solidFill>
+              </a:rPr>
+              <a:t>. Heleno Cardoso</a:t>
+            </a:r>
+          </a:p>
+        </p:txBody>
+      </p:sp>
+      <p:pic>
+        <p:nvPicPr>
+          <p:cNvPr id="4" name="Google Shape;62;p1" descr="Imagem">
+            <a:extLst>
+              <a:ext uri="{FF2B5EF4-FFF2-40B4-BE49-F238E27FC236}">
+                <a16:creationId xmlns:a16="http://schemas.microsoft.com/office/drawing/2014/main" id="{652F850C-6AD9-5CD4-839F-152858F13612}"/>
+              </a:ext>
+            </a:extLst>
+          </p:cNvPr>
+          <p:cNvPicPr preferRelativeResize="0"/>
+          <p:nvPr/>
+        </p:nvPicPr>
+        <p:blipFill rotWithShape="1">
+          <a:blip r:embed="rId5">
+            <a:alphaModFix/>
+          </a:blip>
+          <a:srcRect/>
+          <a:stretch/>
+        </p:blipFill>
+        <p:spPr>
+          <a:xfrm>
+            <a:off x="469898" y="343798"/>
+            <a:ext cx="2858518" cy="1338697"/>
+          </a:xfrm>
+          <a:prstGeom prst="rect">
+            <a:avLst/>
+          </a:prstGeom>
+          <a:noFill/>
+          <a:ln>
+            <a:noFill/>
+          </a:ln>
+        </p:spPr>
+      </p:pic>
+    </p:spTree>
+  </p:cSld>
+  <p:clrMapOvr>
+    <a:masterClrMapping/>
+  </p:clrMapOvr>
+  <p:transition spd="med"/>
+</p:sld>
+</file>
+
+<file path=ppt/slides/slide20.xml><?xml version="1.0" encoding="utf-8"?>
+<p:sld xmlns:a="http://schemas.openxmlformats.org/drawingml/2006/main" xmlns:r="http://schemas.openxmlformats.org/officeDocument/2006/relationships" xmlns:p="http://schemas.openxmlformats.org/presentationml/2006/main">
+  <p:cSld>
+    <p:spTree>
+      <p:nvGrpSpPr>
+        <p:cNvPr id="1" name=""/>
+        <p:cNvGrpSpPr/>
+        <p:nvPr/>
+      </p:nvGrpSpPr>
+      <p:grpSpPr>
+        <a:xfrm>
+          <a:off x="0" y="0"/>
+          <a:ext cx="0" cy="0"/>
+          <a:chOff x="0" y="0"/>
+          <a:chExt cx="0" cy="0"/>
+        </a:xfrm>
+      </p:grpSpPr>
+      <p:sp>
+        <p:nvSpPr>
+          <p:cNvPr id="6" name="Title 1"/>
+          <p:cNvSpPr>
+            <a:spLocks noGrp="1"/>
+          </p:cNvSpPr>
+          <p:nvPr>
+            <p:ph type="title"/>
+          </p:nvPr>
+        </p:nvSpPr>
+        <p:spPr>
+          <a:xfrm>
+            <a:off x="457200" y="205980"/>
+            <a:ext cx="8229600" cy="857251"/>
+          </a:xfrm>
+        </p:spPr>
+        <p:txBody>
+          <a:bodyPr>
+            <a:normAutofit fontScale="90000"/>
+          </a:bodyPr>
+          <a:lstStyle/>
+          <a:p>
+            <a:r>
+              <a:rPr lang="pt-BR" b="1" dirty="0">
+                <a:solidFill>
+                  <a:srgbClr val="0070C0"/>
+                </a:solidFill>
+              </a:rPr>
+              <a:t>Distinção Entre Microcontroladores</a:t>
+            </a:r>
+            <a:endParaRPr lang="en-US" b="1" dirty="0">
+              <a:solidFill>
+                <a:srgbClr val="0070C0"/>
+              </a:solidFill>
+            </a:endParaRPr>
+          </a:p>
+        </p:txBody>
+      </p:sp>
+      <p:sp>
+        <p:nvSpPr>
+          <p:cNvPr id="8" name="Text Placeholder 2"/>
+          <p:cNvSpPr>
+            <a:spLocks noGrp="1"/>
+          </p:cNvSpPr>
+          <p:nvPr>
+            <p:ph type="body" sz="half" idx="1"/>
+          </p:nvPr>
+        </p:nvSpPr>
+        <p:spPr>
+          <a:xfrm>
+            <a:off x="142865" y="1200150"/>
+            <a:ext cx="8865056" cy="3737370"/>
+          </a:xfrm>
+        </p:spPr>
+        <p:txBody>
+          <a:bodyPr>
+            <a:noAutofit/>
+          </a:bodyPr>
+          <a:lstStyle/>
+          <a:p>
+            <a:pPr marL="0" indent="0" algn="just">
+              <a:buNone/>
+            </a:pPr>
+            <a:r>
+              <a:rPr lang="pt-BR" sz="2000" dirty="0">
+                <a:solidFill>
+                  <a:schemeClr val="tx1"/>
+                </a:solidFill>
+                <a:latin typeface="Times New Roman" panose="02020603050405020304" pitchFamily="18" charset="0"/>
+                <a:cs typeface="Times New Roman" panose="02020603050405020304" pitchFamily="18" charset="0"/>
+              </a:rPr>
               <a:t>Essas cinco famílias são dadas abaixo.</a:t>
             </a:r>
           </a:p>
@@ -6593,7 +7800,7 @@
 </p:sld>
 </file>
 
-<file path=ppt/slides/slide18.xml><?xml version="1.0" encoding="utf-8"?>
+<file path=ppt/slides/slide21.xml><?xml version="1.0" encoding="utf-8"?>
 <p:sld xmlns:a="http://schemas.openxmlformats.org/drawingml/2006/main" xmlns:r="http://schemas.openxmlformats.org/officeDocument/2006/relationships" xmlns:p="http://schemas.openxmlformats.org/presentationml/2006/main">
   <p:cSld>
     <p:spTree>
@@ -7383,7 +8590,7 @@
 </p:sld>
 </file>
 
-<file path=ppt/slides/slide19.xml><?xml version="1.0" encoding="utf-8"?>
+<file path=ppt/slides/slide22.xml><?xml version="1.0" encoding="utf-8"?>
 <p:sld xmlns:a="http://schemas.openxmlformats.org/drawingml/2006/main" xmlns:r="http://schemas.openxmlformats.org/officeDocument/2006/relationships" xmlns:p="http://schemas.openxmlformats.org/presentationml/2006/main">
   <p:cSld>
     <p:spTree>
@@ -7460,18 +8667,19 @@
           </a:bodyPr>
           <a:lstStyle/>
           <a:p>
-            <a:pPr marL="0" indent="0" algn="just">
-              <a:buNone/>
+            <a:pPr algn="just">
+              <a:buFont typeface="Wingdings" panose="05000000000000000000" pitchFamily="2" charset="2"/>
+              <a:buChar char="§"/>
             </a:pPr>
             <a:r>
-              <a:rPr lang="pt-BR" sz="2000" b="1" dirty="0">
+              <a:rPr lang="pt-BR" sz="2000" dirty="0" err="1">
                 <a:solidFill>
                   <a:schemeClr val="tx1"/>
                 </a:solidFill>
                 <a:latin typeface="Times New Roman" panose="02020603050405020304" pitchFamily="18" charset="0"/>
                 <a:cs typeface="Times New Roman" panose="02020603050405020304" pitchFamily="18" charset="0"/>
               </a:rPr>
-              <a:t>G</a:t>
+              <a:t>NodeMCU</a:t>
             </a:r>
             <a:endParaRPr lang="pt-BR" sz="2000" dirty="0">
               <a:solidFill>
@@ -7481,1092 +8689,227 @@
               <a:cs typeface="Times New Roman" panose="02020603050405020304" pitchFamily="18" charset="0"/>
             </a:endParaRPr>
           </a:p>
+          <a:p>
+            <a:pPr algn="just">
+              <a:buFont typeface="Wingdings" panose="05000000000000000000" pitchFamily="2" charset="2"/>
+              <a:buChar char="§"/>
+            </a:pPr>
+            <a:r>
+              <a:rPr lang="pt-BR" sz="2000" dirty="0">
+                <a:solidFill>
+                  <a:schemeClr val="tx1"/>
+                </a:solidFill>
+                <a:latin typeface="Times New Roman" panose="02020603050405020304" pitchFamily="18" charset="0"/>
+                <a:cs typeface="Times New Roman" panose="02020603050405020304" pitchFamily="18" charset="0"/>
+              </a:rPr>
+              <a:t>ARM </a:t>
+            </a:r>
+            <a:r>
+              <a:rPr lang="pt-BR" sz="2000" dirty="0" err="1">
+                <a:solidFill>
+                  <a:schemeClr val="tx1"/>
+                </a:solidFill>
+                <a:latin typeface="Times New Roman" panose="02020603050405020304" pitchFamily="18" charset="0"/>
+                <a:cs typeface="Times New Roman" panose="02020603050405020304" pitchFamily="18" charset="0"/>
+              </a:rPr>
+              <a:t>Cortex</a:t>
+            </a:r>
+            <a:r>
+              <a:rPr lang="pt-BR" sz="2000" dirty="0">
+                <a:solidFill>
+                  <a:schemeClr val="tx1"/>
+                </a:solidFill>
+                <a:latin typeface="Times New Roman" panose="02020603050405020304" pitchFamily="18" charset="0"/>
+                <a:cs typeface="Times New Roman" panose="02020603050405020304" pitchFamily="18" charset="0"/>
+              </a:rPr>
+              <a:t>-M</a:t>
+            </a:r>
+          </a:p>
+          <a:p>
+            <a:pPr algn="just">
+              <a:buFont typeface="Wingdings" panose="05000000000000000000" pitchFamily="2" charset="2"/>
+              <a:buChar char="§"/>
+            </a:pPr>
+            <a:r>
+              <a:rPr lang="pt-BR" sz="2000" dirty="0">
+                <a:solidFill>
+                  <a:schemeClr val="tx1"/>
+                </a:solidFill>
+                <a:latin typeface="Times New Roman" panose="02020603050405020304" pitchFamily="18" charset="0"/>
+                <a:cs typeface="Times New Roman" panose="02020603050405020304" pitchFamily="18" charset="0"/>
+              </a:rPr>
+              <a:t>ESP8266, ESP32 (</a:t>
+            </a:r>
+            <a:r>
+              <a:rPr lang="pt-BR" sz="2000" b="1" dirty="0" err="1">
+                <a:solidFill>
+                  <a:srgbClr val="FF0000"/>
+                </a:solidFill>
+                <a:latin typeface="Times New Roman" panose="02020603050405020304" pitchFamily="18" charset="0"/>
+                <a:cs typeface="Times New Roman" panose="02020603050405020304" pitchFamily="18" charset="0"/>
+              </a:rPr>
+              <a:t>Espressif</a:t>
+            </a:r>
+            <a:r>
+              <a:rPr lang="pt-BR" sz="2000" dirty="0">
+                <a:solidFill>
+                  <a:schemeClr val="tx1"/>
+                </a:solidFill>
+                <a:latin typeface="Times New Roman" panose="02020603050405020304" pitchFamily="18" charset="0"/>
+                <a:cs typeface="Times New Roman" panose="02020603050405020304" pitchFamily="18" charset="0"/>
+              </a:rPr>
+              <a:t>)</a:t>
+            </a:r>
+          </a:p>
+          <a:p>
+            <a:pPr algn="just">
+              <a:buFont typeface="Wingdings" panose="05000000000000000000" pitchFamily="2" charset="2"/>
+              <a:buChar char="§"/>
+            </a:pPr>
+            <a:r>
+              <a:rPr lang="pt-BR" sz="2000" dirty="0">
+                <a:solidFill>
+                  <a:schemeClr val="tx1"/>
+                </a:solidFill>
+                <a:latin typeface="Times New Roman" panose="02020603050405020304" pitchFamily="18" charset="0"/>
+                <a:cs typeface="Times New Roman" panose="02020603050405020304" pitchFamily="18" charset="0"/>
+              </a:rPr>
+              <a:t>Atmel AVR / AVR 32</a:t>
+            </a:r>
+          </a:p>
+          <a:p>
+            <a:pPr algn="just">
+              <a:buFont typeface="Wingdings" panose="05000000000000000000" pitchFamily="2" charset="2"/>
+              <a:buChar char="§"/>
+            </a:pPr>
+            <a:r>
+              <a:rPr lang="pt-BR" sz="2000" dirty="0">
+                <a:solidFill>
+                  <a:schemeClr val="tx1"/>
+                </a:solidFill>
+                <a:latin typeface="Times New Roman" panose="02020603050405020304" pitchFamily="18" charset="0"/>
+                <a:cs typeface="Times New Roman" panose="02020603050405020304" pitchFamily="18" charset="0"/>
+              </a:rPr>
+              <a:t>Intel 8051</a:t>
+            </a:r>
+          </a:p>
+          <a:p>
+            <a:pPr algn="just">
+              <a:buFont typeface="Wingdings" panose="05000000000000000000" pitchFamily="2" charset="2"/>
+              <a:buChar char="§"/>
+            </a:pPr>
+            <a:r>
+              <a:rPr lang="pt-BR" sz="2000" dirty="0">
+                <a:solidFill>
+                  <a:schemeClr val="tx1"/>
+                </a:solidFill>
+                <a:latin typeface="Times New Roman" panose="02020603050405020304" pitchFamily="18" charset="0"/>
+                <a:cs typeface="Times New Roman" panose="02020603050405020304" pitchFamily="18" charset="0"/>
+              </a:rPr>
+              <a:t>Microchip PIC</a:t>
+            </a:r>
+          </a:p>
+          <a:p>
+            <a:pPr algn="just">
+              <a:buFont typeface="Wingdings" panose="05000000000000000000" pitchFamily="2" charset="2"/>
+              <a:buChar char="§"/>
+            </a:pPr>
+            <a:r>
+              <a:rPr lang="pt-BR" sz="2000" dirty="0">
+                <a:solidFill>
+                  <a:schemeClr val="tx1"/>
+                </a:solidFill>
+                <a:latin typeface="Times New Roman" panose="02020603050405020304" pitchFamily="18" charset="0"/>
+                <a:cs typeface="Times New Roman" panose="02020603050405020304" pitchFamily="18" charset="0"/>
+              </a:rPr>
+              <a:t>NXP LCP 2000 / 3000</a:t>
+            </a:r>
+          </a:p>
+          <a:p>
+            <a:pPr algn="just">
+              <a:buFont typeface="Wingdings" panose="05000000000000000000" pitchFamily="2" charset="2"/>
+              <a:buChar char="§"/>
+            </a:pPr>
+            <a:r>
+              <a:rPr lang="pt-BR" sz="2000" dirty="0" err="1">
+                <a:solidFill>
+                  <a:schemeClr val="tx1"/>
+                </a:solidFill>
+                <a:latin typeface="Times New Roman" panose="02020603050405020304" pitchFamily="18" charset="0"/>
+                <a:cs typeface="Times New Roman" panose="02020603050405020304" pitchFamily="18" charset="0"/>
+              </a:rPr>
+              <a:t>Paralax</a:t>
+            </a:r>
+            <a:r>
+              <a:rPr lang="pt-BR" sz="2000" dirty="0">
+                <a:solidFill>
+                  <a:schemeClr val="tx1"/>
+                </a:solidFill>
+                <a:latin typeface="Times New Roman" panose="02020603050405020304" pitchFamily="18" charset="0"/>
+                <a:cs typeface="Times New Roman" panose="02020603050405020304" pitchFamily="18" charset="0"/>
+              </a:rPr>
+              <a:t> </a:t>
+            </a:r>
+            <a:r>
+              <a:rPr lang="pt-BR" sz="2000" dirty="0" err="1">
+                <a:solidFill>
+                  <a:schemeClr val="tx1"/>
+                </a:solidFill>
+                <a:latin typeface="Times New Roman" panose="02020603050405020304" pitchFamily="18" charset="0"/>
+                <a:cs typeface="Times New Roman" panose="02020603050405020304" pitchFamily="18" charset="0"/>
+              </a:rPr>
+              <a:t>Propeller</a:t>
+            </a:r>
+            <a:endParaRPr lang="pt-BR" sz="2000" dirty="0">
+              <a:solidFill>
+                <a:schemeClr val="tx1"/>
+              </a:solidFill>
+              <a:latin typeface="Times New Roman" panose="02020603050405020304" pitchFamily="18" charset="0"/>
+              <a:cs typeface="Times New Roman" panose="02020603050405020304" pitchFamily="18" charset="0"/>
+            </a:endParaRPr>
+          </a:p>
+          <a:p>
+            <a:pPr algn="just">
+              <a:buFont typeface="Wingdings" panose="05000000000000000000" pitchFamily="2" charset="2"/>
+              <a:buChar char="§"/>
+            </a:pPr>
+            <a:r>
+              <a:rPr lang="pt-BR" sz="2000" dirty="0">
+                <a:solidFill>
+                  <a:schemeClr val="tx1"/>
+                </a:solidFill>
+                <a:latin typeface="Times New Roman" panose="02020603050405020304" pitchFamily="18" charset="0"/>
+                <a:cs typeface="Times New Roman" panose="02020603050405020304" pitchFamily="18" charset="0"/>
+              </a:rPr>
+              <a:t>Texas </a:t>
+            </a:r>
+            <a:r>
+              <a:rPr lang="pt-BR" sz="2000" dirty="0" err="1">
+                <a:solidFill>
+                  <a:schemeClr val="tx1"/>
+                </a:solidFill>
+                <a:latin typeface="Times New Roman" panose="02020603050405020304" pitchFamily="18" charset="0"/>
+                <a:cs typeface="Times New Roman" panose="02020603050405020304" pitchFamily="18" charset="0"/>
+              </a:rPr>
+              <a:t>Instruments</a:t>
+            </a:r>
+            <a:r>
+              <a:rPr lang="pt-BR" sz="2000" dirty="0">
+                <a:solidFill>
+                  <a:schemeClr val="tx1"/>
+                </a:solidFill>
+                <a:latin typeface="Times New Roman" panose="02020603050405020304" pitchFamily="18" charset="0"/>
+                <a:cs typeface="Times New Roman" panose="02020603050405020304" pitchFamily="18" charset="0"/>
+              </a:rPr>
+              <a:t> MSP430</a:t>
+            </a:r>
+          </a:p>
         </p:txBody>
       </p:sp>
     </p:spTree>
     <p:extLst>
       <p:ext uri="{BB962C8B-B14F-4D97-AF65-F5344CB8AC3E}">
         <p14:creationId xmlns:p14="http://schemas.microsoft.com/office/powerpoint/2010/main" val="799808709"/>
-      </p:ext>
-    </p:extLst>
-  </p:cSld>
-  <p:clrMapOvr>
-    <a:masterClrMapping/>
-  </p:clrMapOvr>
-  <p:transition spd="med"/>
-</p:sld>
-</file>
-
-<file path=ppt/slides/slide2.xml><?xml version="1.0" encoding="utf-8"?>
-<p:sld xmlns:a="http://schemas.openxmlformats.org/drawingml/2006/main" xmlns:r="http://schemas.openxmlformats.org/officeDocument/2006/relationships" xmlns:p="http://schemas.openxmlformats.org/presentationml/2006/main">
-  <p:cSld>
-    <p:spTree>
-      <p:nvGrpSpPr>
-        <p:cNvPr id="1" name=""/>
-        <p:cNvGrpSpPr/>
-        <p:nvPr/>
-      </p:nvGrpSpPr>
-      <p:grpSpPr>
-        <a:xfrm>
-          <a:off x="0" y="0"/>
-          <a:ext cx="0" cy="0"/>
-          <a:chOff x="0" y="0"/>
-          <a:chExt cx="0" cy="0"/>
-        </a:xfrm>
-      </p:grpSpPr>
-      <p:pic>
-        <p:nvPicPr>
-          <p:cNvPr id="112" name="Picture 6" descr="Picture 6"/>
-          <p:cNvPicPr>
-            <a:picLocks noChangeAspect="1"/>
-          </p:cNvPicPr>
-          <p:nvPr/>
-        </p:nvPicPr>
-        <p:blipFill>
-          <a:blip r:embed="rId3"/>
-          <a:stretch>
-            <a:fillRect/>
-          </a:stretch>
-        </p:blipFill>
-        <p:spPr>
-          <a:xfrm>
-            <a:off x="0" y="0"/>
-            <a:ext cx="9144000" cy="5143500"/>
-          </a:xfrm>
-          <a:prstGeom prst="rect">
-            <a:avLst/>
-          </a:prstGeom>
-          <a:ln w="12700">
-            <a:miter lim="400000"/>
-            <a:headEnd/>
-            <a:tailEnd/>
-          </a:ln>
-        </p:spPr>
-      </p:pic>
-      <p:pic>
-        <p:nvPicPr>
-          <p:cNvPr id="114" name="Picture 5" descr="Picture 5"/>
-          <p:cNvPicPr>
-            <a:picLocks noChangeAspect="1"/>
-          </p:cNvPicPr>
-          <p:nvPr/>
-        </p:nvPicPr>
-        <p:blipFill>
-          <a:blip r:embed="rId4"/>
-          <a:stretch>
-            <a:fillRect/>
-          </a:stretch>
-        </p:blipFill>
-        <p:spPr>
-          <a:xfrm>
-            <a:off x="469900" y="0"/>
-            <a:ext cx="4391984" cy="171450"/>
-          </a:xfrm>
-          <a:prstGeom prst="rect">
-            <a:avLst/>
-          </a:prstGeom>
-          <a:ln w="12700">
-            <a:miter lim="400000"/>
-            <a:headEnd/>
-            <a:tailEnd/>
-          </a:ln>
-        </p:spPr>
-      </p:pic>
-      <p:sp>
-        <p:nvSpPr>
-          <p:cNvPr id="3" name="Título 2"/>
-          <p:cNvSpPr>
-            <a:spLocks noGrp="1"/>
-          </p:cNvSpPr>
-          <p:nvPr>
-            <p:ph type="title"/>
-          </p:nvPr>
-        </p:nvSpPr>
-        <p:spPr>
-          <a:xfrm>
-            <a:off x="348258" y="2277667"/>
-            <a:ext cx="8681444" cy="1102519"/>
-          </a:xfrm>
-        </p:spPr>
-        <p:txBody>
-          <a:bodyPr>
-            <a:noAutofit/>
-          </a:bodyPr>
-          <a:lstStyle/>
-          <a:p>
-            <a:pPr algn="l"/>
-            <a:br>
-              <a:rPr lang="pt-BR" b="1" dirty="0">
-                <a:solidFill>
-                  <a:schemeClr val="bg1"/>
-                </a:solidFill>
-              </a:rPr>
-            </a:br>
-            <a:r>
-              <a:rPr lang="pt-BR" b="1" dirty="0">
-                <a:solidFill>
-                  <a:schemeClr val="bg1"/>
-                </a:solidFill>
-              </a:rPr>
-              <a:t>Aula 01</a:t>
-            </a:r>
-            <a:br>
-              <a:rPr lang="pt-BR" b="1" dirty="0">
-                <a:solidFill>
-                  <a:schemeClr val="bg1"/>
-                </a:solidFill>
-              </a:rPr>
-            </a:br>
-            <a:r>
-              <a:rPr lang="pt-BR" b="1" dirty="0">
-                <a:solidFill>
-                  <a:schemeClr val="bg1"/>
-                </a:solidFill>
-              </a:rPr>
-              <a:t>	</a:t>
-            </a:r>
-            <a:r>
-              <a:rPr lang="pt-BR" sz="3600" b="1" dirty="0">
-                <a:solidFill>
-                  <a:schemeClr val="bg1"/>
-                </a:solidFill>
-              </a:rPr>
-              <a:t>Microcontroladores</a:t>
-            </a:r>
-          </a:p>
-        </p:txBody>
-      </p:sp>
-      <p:sp>
-        <p:nvSpPr>
-          <p:cNvPr id="6" name="Título 2"/>
-          <p:cNvSpPr txBox="1"/>
-          <p:nvPr/>
-        </p:nvSpPr>
-        <p:spPr>
-          <a:xfrm>
-            <a:off x="975683" y="3866663"/>
-            <a:ext cx="7772400" cy="1102519"/>
-          </a:xfrm>
-          <a:prstGeom prst="rect">
-            <a:avLst/>
-          </a:prstGeom>
-          <a:ln w="12700">
-            <a:miter lim="400000"/>
-          </a:ln>
-        </p:spPr>
-        <p:txBody>
-          <a:bodyPr lIns="45718" tIns="45718" rIns="45718" bIns="45718" anchor="ctr">
-            <a:noAutofit/>
-          </a:bodyPr>
-          <a:lstStyle>
-            <a:lvl1pPr marL="0" marR="0" indent="0" algn="ctr" defTabSz="457200" rtl="0" latinLnBrk="0">
-              <a:lnSpc>
-                <a:spcPct val="100000"/>
-              </a:lnSpc>
-              <a:spcBef>
-                <a:spcPts val="0"/>
-              </a:spcBef>
-              <a:spcAft>
-                <a:spcPts val="0"/>
-              </a:spcAft>
-              <a:buClrTx/>
-              <a:buSzTx/>
-              <a:buFontTx/>
-              <a:buNone/>
-              <a:defRPr sz="4400" b="0" i="0" u="none" strike="noStrike" cap="none" spc="0" baseline="0">
-                <a:ln>
-                  <a:noFill/>
-                </a:ln>
-                <a:solidFill>
-                  <a:srgbClr val="000000"/>
-                </a:solidFill>
-                <a:uFillTx/>
-                <a:latin typeface="+mj-lt"/>
-                <a:ea typeface="+mj-ea"/>
-                <a:cs typeface="+mj-cs"/>
-                <a:sym typeface="Calibri"/>
-              </a:defRPr>
-            </a:lvl1pPr>
-            <a:lvl2pPr marL="0" marR="0" indent="0" algn="ctr" defTabSz="457200" rtl="0" latinLnBrk="0">
-              <a:lnSpc>
-                <a:spcPct val="100000"/>
-              </a:lnSpc>
-              <a:spcBef>
-                <a:spcPts val="0"/>
-              </a:spcBef>
-              <a:spcAft>
-                <a:spcPts val="0"/>
-              </a:spcAft>
-              <a:buClrTx/>
-              <a:buSzTx/>
-              <a:buFontTx/>
-              <a:buNone/>
-              <a:defRPr sz="4400" b="0" i="0" u="none" strike="noStrike" cap="none" spc="0" baseline="0">
-                <a:ln>
-                  <a:noFill/>
-                </a:ln>
-                <a:solidFill>
-                  <a:srgbClr val="000000"/>
-                </a:solidFill>
-                <a:uFillTx/>
-                <a:latin typeface="+mj-lt"/>
-                <a:ea typeface="+mj-ea"/>
-                <a:cs typeface="+mj-cs"/>
-                <a:sym typeface="Calibri"/>
-              </a:defRPr>
-            </a:lvl2pPr>
-            <a:lvl3pPr marL="0" marR="0" indent="0" algn="ctr" defTabSz="457200" rtl="0" latinLnBrk="0">
-              <a:lnSpc>
-                <a:spcPct val="100000"/>
-              </a:lnSpc>
-              <a:spcBef>
-                <a:spcPts val="0"/>
-              </a:spcBef>
-              <a:spcAft>
-                <a:spcPts val="0"/>
-              </a:spcAft>
-              <a:buClrTx/>
-              <a:buSzTx/>
-              <a:buFontTx/>
-              <a:buNone/>
-              <a:defRPr sz="4400" b="0" i="0" u="none" strike="noStrike" cap="none" spc="0" baseline="0">
-                <a:ln>
-                  <a:noFill/>
-                </a:ln>
-                <a:solidFill>
-                  <a:srgbClr val="000000"/>
-                </a:solidFill>
-                <a:uFillTx/>
-                <a:latin typeface="+mj-lt"/>
-                <a:ea typeface="+mj-ea"/>
-                <a:cs typeface="+mj-cs"/>
-                <a:sym typeface="Calibri"/>
-              </a:defRPr>
-            </a:lvl3pPr>
-            <a:lvl4pPr marL="0" marR="0" indent="0" algn="ctr" defTabSz="457200" rtl="0" latinLnBrk="0">
-              <a:lnSpc>
-                <a:spcPct val="100000"/>
-              </a:lnSpc>
-              <a:spcBef>
-                <a:spcPts val="0"/>
-              </a:spcBef>
-              <a:spcAft>
-                <a:spcPts val="0"/>
-              </a:spcAft>
-              <a:buClrTx/>
-              <a:buSzTx/>
-              <a:buFontTx/>
-              <a:buNone/>
-              <a:defRPr sz="4400" b="0" i="0" u="none" strike="noStrike" cap="none" spc="0" baseline="0">
-                <a:ln>
-                  <a:noFill/>
-                </a:ln>
-                <a:solidFill>
-                  <a:srgbClr val="000000"/>
-                </a:solidFill>
-                <a:uFillTx/>
-                <a:latin typeface="+mj-lt"/>
-                <a:ea typeface="+mj-ea"/>
-                <a:cs typeface="+mj-cs"/>
-                <a:sym typeface="Calibri"/>
-              </a:defRPr>
-            </a:lvl4pPr>
-            <a:lvl5pPr marL="0" marR="0" indent="0" algn="ctr" defTabSz="457200" rtl="0" latinLnBrk="0">
-              <a:lnSpc>
-                <a:spcPct val="100000"/>
-              </a:lnSpc>
-              <a:spcBef>
-                <a:spcPts val="0"/>
-              </a:spcBef>
-              <a:spcAft>
-                <a:spcPts val="0"/>
-              </a:spcAft>
-              <a:buClrTx/>
-              <a:buSzTx/>
-              <a:buFontTx/>
-              <a:buNone/>
-              <a:defRPr sz="4400" b="0" i="0" u="none" strike="noStrike" cap="none" spc="0" baseline="0">
-                <a:ln>
-                  <a:noFill/>
-                </a:ln>
-                <a:solidFill>
-                  <a:srgbClr val="000000"/>
-                </a:solidFill>
-                <a:uFillTx/>
-                <a:latin typeface="+mj-lt"/>
-                <a:ea typeface="+mj-ea"/>
-                <a:cs typeface="+mj-cs"/>
-                <a:sym typeface="Calibri"/>
-              </a:defRPr>
-            </a:lvl5pPr>
-            <a:lvl6pPr marL="0" marR="0" indent="0" algn="ctr" defTabSz="457200" rtl="0" latinLnBrk="0">
-              <a:lnSpc>
-                <a:spcPct val="100000"/>
-              </a:lnSpc>
-              <a:spcBef>
-                <a:spcPts val="0"/>
-              </a:spcBef>
-              <a:spcAft>
-                <a:spcPts val="0"/>
-              </a:spcAft>
-              <a:buClrTx/>
-              <a:buSzTx/>
-              <a:buFontTx/>
-              <a:buNone/>
-              <a:defRPr sz="4400" b="0" i="0" u="none" strike="noStrike" cap="none" spc="0" baseline="0">
-                <a:ln>
-                  <a:noFill/>
-                </a:ln>
-                <a:solidFill>
-                  <a:srgbClr val="000000"/>
-                </a:solidFill>
-                <a:uFillTx/>
-                <a:latin typeface="+mj-lt"/>
-                <a:ea typeface="+mj-ea"/>
-                <a:cs typeface="+mj-cs"/>
-                <a:sym typeface="Calibri"/>
-              </a:defRPr>
-            </a:lvl6pPr>
-            <a:lvl7pPr marL="0" marR="0" indent="0" algn="ctr" defTabSz="457200" rtl="0" latinLnBrk="0">
-              <a:lnSpc>
-                <a:spcPct val="100000"/>
-              </a:lnSpc>
-              <a:spcBef>
-                <a:spcPts val="0"/>
-              </a:spcBef>
-              <a:spcAft>
-                <a:spcPts val="0"/>
-              </a:spcAft>
-              <a:buClrTx/>
-              <a:buSzTx/>
-              <a:buFontTx/>
-              <a:buNone/>
-              <a:defRPr sz="4400" b="0" i="0" u="none" strike="noStrike" cap="none" spc="0" baseline="0">
-                <a:ln>
-                  <a:noFill/>
-                </a:ln>
-                <a:solidFill>
-                  <a:srgbClr val="000000"/>
-                </a:solidFill>
-                <a:uFillTx/>
-                <a:latin typeface="+mj-lt"/>
-                <a:ea typeface="+mj-ea"/>
-                <a:cs typeface="+mj-cs"/>
-                <a:sym typeface="Calibri"/>
-              </a:defRPr>
-            </a:lvl7pPr>
-            <a:lvl8pPr marL="0" marR="0" indent="0" algn="ctr" defTabSz="457200" rtl="0" latinLnBrk="0">
-              <a:lnSpc>
-                <a:spcPct val="100000"/>
-              </a:lnSpc>
-              <a:spcBef>
-                <a:spcPts val="0"/>
-              </a:spcBef>
-              <a:spcAft>
-                <a:spcPts val="0"/>
-              </a:spcAft>
-              <a:buClrTx/>
-              <a:buSzTx/>
-              <a:buFontTx/>
-              <a:buNone/>
-              <a:defRPr sz="4400" b="0" i="0" u="none" strike="noStrike" cap="none" spc="0" baseline="0">
-                <a:ln>
-                  <a:noFill/>
-                </a:ln>
-                <a:solidFill>
-                  <a:srgbClr val="000000"/>
-                </a:solidFill>
-                <a:uFillTx/>
-                <a:latin typeface="+mj-lt"/>
-                <a:ea typeface="+mj-ea"/>
-                <a:cs typeface="+mj-cs"/>
-                <a:sym typeface="Calibri"/>
-              </a:defRPr>
-            </a:lvl8pPr>
-            <a:lvl9pPr marL="0" marR="0" indent="0" algn="ctr" defTabSz="457200" rtl="0" latinLnBrk="0">
-              <a:lnSpc>
-                <a:spcPct val="100000"/>
-              </a:lnSpc>
-              <a:spcBef>
-                <a:spcPts val="0"/>
-              </a:spcBef>
-              <a:spcAft>
-                <a:spcPts val="0"/>
-              </a:spcAft>
-              <a:buClrTx/>
-              <a:buSzTx/>
-              <a:buFontTx/>
-              <a:buNone/>
-              <a:defRPr sz="4400" b="0" i="0" u="none" strike="noStrike" cap="none" spc="0" baseline="0">
-                <a:ln>
-                  <a:noFill/>
-                </a:ln>
-                <a:solidFill>
-                  <a:srgbClr val="000000"/>
-                </a:solidFill>
-                <a:uFillTx/>
-                <a:latin typeface="+mj-lt"/>
-                <a:ea typeface="+mj-ea"/>
-                <a:cs typeface="+mj-cs"/>
-                <a:sym typeface="Calibri"/>
-              </a:defRPr>
-            </a:lvl9pPr>
-          </a:lstStyle>
-          <a:p>
-            <a:pPr algn="r" hangingPunct="1"/>
-            <a:r>
-              <a:rPr lang="pt-BR" sz="2000" b="1" dirty="0">
-                <a:solidFill>
-                  <a:schemeClr val="bg1"/>
-                </a:solidFill>
-              </a:rPr>
-              <a:t>Professor </a:t>
-            </a:r>
-            <a:r>
-              <a:rPr lang="pt-BR" sz="2000" b="1" dirty="0" err="1">
-                <a:solidFill>
-                  <a:schemeClr val="bg1"/>
-                </a:solidFill>
-              </a:rPr>
-              <a:t>MSc</a:t>
-            </a:r>
-            <a:r>
-              <a:rPr lang="pt-BR" sz="2000" b="1" dirty="0">
-                <a:solidFill>
-                  <a:schemeClr val="bg1"/>
-                </a:solidFill>
-              </a:rPr>
-              <a:t>. Heleno Cardoso</a:t>
-            </a:r>
-          </a:p>
-        </p:txBody>
-      </p:sp>
-      <p:pic>
-        <p:nvPicPr>
-          <p:cNvPr id="4" name="Google Shape;62;p1" descr="Imagem">
-            <a:extLst>
-              <a:ext uri="{FF2B5EF4-FFF2-40B4-BE49-F238E27FC236}">
-                <a16:creationId xmlns:a16="http://schemas.microsoft.com/office/drawing/2014/main" id="{652F850C-6AD9-5CD4-839F-152858F13612}"/>
-              </a:ext>
-            </a:extLst>
-          </p:cNvPr>
-          <p:cNvPicPr preferRelativeResize="0"/>
-          <p:nvPr/>
-        </p:nvPicPr>
-        <p:blipFill rotWithShape="1">
-          <a:blip r:embed="rId5">
-            <a:alphaModFix/>
-          </a:blip>
-          <a:srcRect/>
-          <a:stretch/>
-        </p:blipFill>
-        <p:spPr>
-          <a:xfrm>
-            <a:off x="469898" y="343798"/>
-            <a:ext cx="2858518" cy="1338697"/>
-          </a:xfrm>
-          <a:prstGeom prst="rect">
-            <a:avLst/>
-          </a:prstGeom>
-          <a:noFill/>
-          <a:ln>
-            <a:noFill/>
-          </a:ln>
-        </p:spPr>
-      </p:pic>
-    </p:spTree>
-  </p:cSld>
-  <p:clrMapOvr>
-    <a:masterClrMapping/>
-  </p:clrMapOvr>
-  <p:transition spd="med"/>
-</p:sld>
-</file>
-
-<file path=ppt/slides/slide20.xml><?xml version="1.0" encoding="utf-8"?>
-<p:sld xmlns:a="http://schemas.openxmlformats.org/drawingml/2006/main" xmlns:r="http://schemas.openxmlformats.org/officeDocument/2006/relationships" xmlns:p="http://schemas.openxmlformats.org/presentationml/2006/main">
-  <p:cSld>
-    <p:spTree>
-      <p:nvGrpSpPr>
-        <p:cNvPr id="1" name=""/>
-        <p:cNvGrpSpPr/>
-        <p:nvPr/>
-      </p:nvGrpSpPr>
-      <p:grpSpPr>
-        <a:xfrm>
-          <a:off x="0" y="0"/>
-          <a:ext cx="0" cy="0"/>
-          <a:chOff x="0" y="0"/>
-          <a:chExt cx="0" cy="0"/>
-        </a:xfrm>
-      </p:grpSpPr>
-      <p:sp>
-        <p:nvSpPr>
-          <p:cNvPr id="6" name="Title 1"/>
-          <p:cNvSpPr>
-            <a:spLocks noGrp="1"/>
-          </p:cNvSpPr>
-          <p:nvPr>
-            <p:ph type="title"/>
-          </p:nvPr>
-        </p:nvSpPr>
-        <p:spPr>
-          <a:xfrm>
-            <a:off x="457200" y="205980"/>
-            <a:ext cx="8229600" cy="857251"/>
-          </a:xfrm>
-        </p:spPr>
-        <p:txBody>
-          <a:bodyPr>
-            <a:normAutofit/>
-          </a:bodyPr>
-          <a:lstStyle/>
-          <a:p>
-            <a:r>
-              <a:rPr lang="en-US" b="1" dirty="0" err="1">
-                <a:solidFill>
-                  <a:srgbClr val="0070C0"/>
-                </a:solidFill>
-              </a:rPr>
-              <a:t>Leitura</a:t>
-            </a:r>
-            <a:r>
-              <a:rPr lang="en-US" b="1" dirty="0">
-                <a:solidFill>
-                  <a:srgbClr val="0070C0"/>
-                </a:solidFill>
-              </a:rPr>
-              <a:t> </a:t>
-            </a:r>
-            <a:r>
-              <a:rPr lang="en-US" b="1" dirty="0" err="1">
-                <a:solidFill>
-                  <a:srgbClr val="0070C0"/>
-                </a:solidFill>
-              </a:rPr>
-              <a:t>Específica</a:t>
-            </a:r>
-            <a:endParaRPr lang="en-US" b="1" dirty="0">
-              <a:solidFill>
-                <a:srgbClr val="0070C0"/>
-              </a:solidFill>
-            </a:endParaRPr>
-          </a:p>
-        </p:txBody>
-      </p:sp>
-      <p:sp>
-        <p:nvSpPr>
-          <p:cNvPr id="8" name="Text Placeholder 2"/>
-          <p:cNvSpPr>
-            <a:spLocks noGrp="1"/>
-          </p:cNvSpPr>
-          <p:nvPr>
-            <p:ph type="body" sz="half" idx="1"/>
-          </p:nvPr>
-        </p:nvSpPr>
-        <p:spPr>
-          <a:xfrm>
-            <a:off x="142865" y="1200150"/>
-            <a:ext cx="8865056" cy="3737369"/>
-          </a:xfrm>
-        </p:spPr>
-        <p:txBody>
-          <a:bodyPr>
-            <a:noAutofit/>
-          </a:bodyPr>
-          <a:lstStyle/>
-          <a:p>
-            <a:pPr marL="0" indent="0" algn="just">
-              <a:buNone/>
-            </a:pPr>
-            <a:r>
-              <a:rPr lang="pt-BR" sz="2000" dirty="0">
-                <a:latin typeface="Times New Roman" panose="02020603050405020304" pitchFamily="18" charset="0"/>
-                <a:cs typeface="Times New Roman" panose="02020603050405020304" pitchFamily="18" charset="0"/>
-              </a:rPr>
-              <a:t>[1] Programação Microcontroladores.</a:t>
-            </a:r>
-          </a:p>
-          <a:p>
-            <a:pPr marL="0" indent="0" algn="just">
-              <a:buNone/>
-            </a:pPr>
-            <a:r>
-              <a:rPr lang="pt-BR" sz="2000" b="1" dirty="0">
-                <a:solidFill>
-                  <a:srgbClr val="FF0000"/>
-                </a:solidFill>
-                <a:latin typeface="Times New Roman" panose="02020603050405020304" pitchFamily="18" charset="0"/>
-                <a:cs typeface="Times New Roman" panose="02020603050405020304" pitchFamily="18" charset="0"/>
-              </a:rPr>
-              <a:t>Disponível em: </a:t>
-            </a:r>
-            <a:r>
-              <a:rPr lang="pt-BR" sz="2000" dirty="0">
-                <a:latin typeface="Times New Roman" panose="02020603050405020304" pitchFamily="18" charset="0"/>
-                <a:cs typeface="Times New Roman" panose="02020603050405020304" pitchFamily="18" charset="0"/>
-                <a:hlinkClick r:id="rId3"/>
-              </a:rPr>
-              <a:t>https://books.google.com.br/books?hl=pt-BR&amp;lr=&amp;id=ODenKGOHMRkC&amp;oi=fnd&amp;pg=PA9&amp;dq=microcontrolador+&amp;ots=unvT_d386z&amp;sig=nKrTAprr4r1gR94lsFX_g0NKC7o#v=onepage&amp;q=microcontrolador&amp;f=false</a:t>
-            </a:r>
-            <a:endParaRPr lang="pt-BR" sz="2000" dirty="0">
-              <a:latin typeface="Times New Roman" panose="02020603050405020304" pitchFamily="18" charset="0"/>
-              <a:cs typeface="Times New Roman" panose="02020603050405020304" pitchFamily="18" charset="0"/>
-            </a:endParaRPr>
-          </a:p>
-          <a:p>
-            <a:pPr marL="0" indent="0" algn="just">
-              <a:buNone/>
-            </a:pPr>
-            <a:endParaRPr lang="pt-BR" sz="2000" dirty="0">
-              <a:latin typeface="Times New Roman" panose="02020603050405020304" pitchFamily="18" charset="0"/>
-              <a:cs typeface="Times New Roman" panose="02020603050405020304" pitchFamily="18" charset="0"/>
-            </a:endParaRPr>
-          </a:p>
-          <a:p>
-            <a:pPr marL="0" indent="0" algn="just">
-              <a:buNone/>
-            </a:pPr>
-            <a:r>
-              <a:rPr lang="pt-BR" sz="2000" dirty="0">
-                <a:latin typeface="Times New Roman" panose="02020603050405020304" pitchFamily="18" charset="0"/>
-                <a:cs typeface="Times New Roman" panose="02020603050405020304" pitchFamily="18" charset="0"/>
-              </a:rPr>
-              <a:t>[2] Programação Microcontroladores. </a:t>
-            </a:r>
-          </a:p>
-          <a:p>
-            <a:pPr marL="0" indent="0" algn="just">
-              <a:buNone/>
-            </a:pPr>
-            <a:r>
-              <a:rPr lang="pt-BR" sz="2000" b="1" dirty="0">
-                <a:solidFill>
-                  <a:srgbClr val="FF0000"/>
-                </a:solidFill>
-                <a:latin typeface="Times New Roman" panose="02020603050405020304" pitchFamily="18" charset="0"/>
-                <a:cs typeface="Times New Roman" panose="02020603050405020304" pitchFamily="18" charset="0"/>
-              </a:rPr>
-              <a:t>Disponível em: </a:t>
-            </a:r>
-            <a:r>
-              <a:rPr lang="pt-BR" sz="2000" dirty="0">
-                <a:latin typeface="Times New Roman" panose="02020603050405020304" pitchFamily="18" charset="0"/>
-                <a:cs typeface="Times New Roman" panose="02020603050405020304" pitchFamily="18" charset="0"/>
-                <a:hlinkClick r:id="rId4"/>
-              </a:rPr>
-              <a:t>https://books.google.com.br/books?hl=pt-BR&amp;lr=&amp;id=fnTvx-_qwucC&amp;oi=fnd&amp;pg=PA20&amp;dq=microcontrolador+&amp;ots=HiESGOvggU&amp;sig=NYk0RDRRJaZYtzvsjlidzdAdudU#v=onepage&amp;q=microcontrolador&amp;f=false</a:t>
-            </a:r>
-            <a:endParaRPr lang="pt-BR" sz="2000" dirty="0">
-              <a:latin typeface="Times New Roman" panose="02020603050405020304" pitchFamily="18" charset="0"/>
-              <a:cs typeface="Times New Roman" panose="02020603050405020304" pitchFamily="18" charset="0"/>
-            </a:endParaRPr>
-          </a:p>
-          <a:p>
-            <a:pPr marL="0" indent="0" algn="just">
-              <a:buNone/>
-            </a:pPr>
-            <a:endParaRPr lang="pt-BR" sz="2000" dirty="0">
-              <a:latin typeface="Times New Roman" panose="02020603050405020304" pitchFamily="18" charset="0"/>
-              <a:cs typeface="Times New Roman" panose="02020603050405020304" pitchFamily="18" charset="0"/>
-            </a:endParaRPr>
-          </a:p>
-          <a:p>
-            <a:pPr marL="0" indent="0" algn="just">
-              <a:buNone/>
-            </a:pPr>
-            <a:endParaRPr lang="pt-BR" sz="2000" dirty="0">
-              <a:latin typeface="Times New Roman" panose="02020603050405020304" pitchFamily="18" charset="0"/>
-              <a:cs typeface="Times New Roman" panose="02020603050405020304" pitchFamily="18" charset="0"/>
-            </a:endParaRPr>
-          </a:p>
-          <a:p>
-            <a:pPr marL="0" indent="0" algn="just">
-              <a:buNone/>
-            </a:pPr>
-            <a:endParaRPr lang="pt-BR" sz="2000" dirty="0">
-              <a:latin typeface="Times New Roman" panose="02020603050405020304" pitchFamily="18" charset="0"/>
-              <a:cs typeface="Times New Roman" panose="02020603050405020304" pitchFamily="18" charset="0"/>
-            </a:endParaRPr>
-          </a:p>
-          <a:p>
-            <a:pPr marL="0" indent="0" algn="just">
-              <a:buNone/>
-            </a:pPr>
-            <a:endParaRPr lang="pt-BR" sz="2000" dirty="0">
-              <a:latin typeface="Calibri" panose="020F0502020204030204" pitchFamily="34" charset="0"/>
-            </a:endParaRPr>
-          </a:p>
-        </p:txBody>
-      </p:sp>
-    </p:spTree>
-    <p:extLst>
-      <p:ext uri="{BB962C8B-B14F-4D97-AF65-F5344CB8AC3E}">
-        <p14:creationId xmlns:p14="http://schemas.microsoft.com/office/powerpoint/2010/main" val="3680270425"/>
-      </p:ext>
-    </p:extLst>
-  </p:cSld>
-  <p:clrMapOvr>
-    <a:masterClrMapping/>
-  </p:clrMapOvr>
-  <p:transition spd="med"/>
-</p:sld>
-</file>
-
-<file path=ppt/slides/slide21.xml><?xml version="1.0" encoding="utf-8"?>
-<p:sld xmlns:a="http://schemas.openxmlformats.org/drawingml/2006/main" xmlns:r="http://schemas.openxmlformats.org/officeDocument/2006/relationships" xmlns:p="http://schemas.openxmlformats.org/presentationml/2006/main">
-  <p:cSld>
-    <p:spTree>
-      <p:nvGrpSpPr>
-        <p:cNvPr id="1" name=""/>
-        <p:cNvGrpSpPr/>
-        <p:nvPr/>
-      </p:nvGrpSpPr>
-      <p:grpSpPr>
-        <a:xfrm>
-          <a:off x="0" y="0"/>
-          <a:ext cx="0" cy="0"/>
-          <a:chOff x="0" y="0"/>
-          <a:chExt cx="0" cy="0"/>
-        </a:xfrm>
-      </p:grpSpPr>
-      <p:sp>
-        <p:nvSpPr>
-          <p:cNvPr id="6" name="Title 1"/>
-          <p:cNvSpPr>
-            <a:spLocks noGrp="1"/>
-          </p:cNvSpPr>
-          <p:nvPr>
-            <p:ph type="title"/>
-          </p:nvPr>
-        </p:nvSpPr>
-        <p:spPr>
-          <a:xfrm>
-            <a:off x="457200" y="205980"/>
-            <a:ext cx="8229600" cy="857251"/>
-          </a:xfrm>
-        </p:spPr>
-        <p:txBody>
-          <a:bodyPr>
-            <a:normAutofit/>
-          </a:bodyPr>
-          <a:lstStyle/>
-          <a:p>
-            <a:r>
-              <a:rPr lang="en-US" b="1" dirty="0" err="1">
-                <a:solidFill>
-                  <a:srgbClr val="0070C0"/>
-                </a:solidFill>
-              </a:rPr>
-              <a:t>Aprenda</a:t>
-            </a:r>
-            <a:r>
-              <a:rPr lang="en-US" b="1" dirty="0">
-                <a:solidFill>
-                  <a:srgbClr val="0070C0"/>
-                </a:solidFill>
-              </a:rPr>
-              <a:t>+</a:t>
-            </a:r>
-          </a:p>
-        </p:txBody>
-      </p:sp>
-      <p:sp>
-        <p:nvSpPr>
-          <p:cNvPr id="8" name="Text Placeholder 2"/>
-          <p:cNvSpPr>
-            <a:spLocks noGrp="1"/>
-          </p:cNvSpPr>
-          <p:nvPr>
-            <p:ph type="body" sz="half" idx="1"/>
-          </p:nvPr>
-        </p:nvSpPr>
-        <p:spPr>
-          <a:xfrm>
-            <a:off x="142865" y="1200150"/>
-            <a:ext cx="8865056" cy="3737370"/>
-          </a:xfrm>
-        </p:spPr>
-        <p:txBody>
-          <a:bodyPr>
-            <a:noAutofit/>
-          </a:bodyPr>
-          <a:lstStyle/>
-          <a:p>
-            <a:pPr marL="0" indent="0" algn="just">
-              <a:buNone/>
-            </a:pPr>
-            <a:r>
-              <a:rPr lang="pt-BR" sz="2400" dirty="0">
-                <a:latin typeface="Times New Roman" panose="02020603050405020304" pitchFamily="18" charset="0"/>
-                <a:cs typeface="Times New Roman" panose="02020603050405020304" pitchFamily="18" charset="0"/>
-              </a:rPr>
-              <a:t>[1] Programação Microcontroladores.</a:t>
-            </a:r>
-          </a:p>
-          <a:p>
-            <a:pPr marL="0" indent="0" algn="just">
-              <a:buNone/>
-            </a:pPr>
-            <a:r>
-              <a:rPr lang="pt-BR" sz="2400" b="1" dirty="0">
-                <a:solidFill>
-                  <a:srgbClr val="FF0000"/>
-                </a:solidFill>
-                <a:latin typeface="Times New Roman" panose="02020603050405020304" pitchFamily="18" charset="0"/>
-                <a:cs typeface="Times New Roman" panose="02020603050405020304" pitchFamily="18" charset="0"/>
-              </a:rPr>
-              <a:t>Disponível em: </a:t>
-            </a:r>
-            <a:r>
-              <a:rPr lang="pt-BR" sz="2400" dirty="0">
-                <a:latin typeface="Times New Roman" panose="02020603050405020304" pitchFamily="18" charset="0"/>
-                <a:cs typeface="Times New Roman" panose="02020603050405020304" pitchFamily="18" charset="0"/>
-                <a:hlinkClick r:id="rId3"/>
-              </a:rPr>
-              <a:t>https://</a:t>
-            </a:r>
-            <a:endParaRPr lang="pt-BR" sz="2400" dirty="0">
-              <a:latin typeface="Times New Roman" panose="02020603050405020304" pitchFamily="18" charset="0"/>
-              <a:cs typeface="Times New Roman" panose="02020603050405020304" pitchFamily="18" charset="0"/>
-            </a:endParaRPr>
-          </a:p>
-          <a:p>
-            <a:pPr marL="0" indent="0" algn="just">
-              <a:buNone/>
-            </a:pPr>
-            <a:endParaRPr lang="pt-BR" sz="2400" dirty="0">
-              <a:latin typeface="Times New Roman" panose="02020603050405020304" pitchFamily="18" charset="0"/>
-              <a:cs typeface="Times New Roman" panose="02020603050405020304" pitchFamily="18" charset="0"/>
-            </a:endParaRPr>
-          </a:p>
-          <a:p>
-            <a:pPr marL="0" indent="0" algn="just">
-              <a:buNone/>
-            </a:pPr>
-            <a:r>
-              <a:rPr lang="pt-BR" sz="2400" dirty="0">
-                <a:latin typeface="Times New Roman" panose="02020603050405020304" pitchFamily="18" charset="0"/>
-                <a:cs typeface="Times New Roman" panose="02020603050405020304" pitchFamily="18" charset="0"/>
-              </a:rPr>
-              <a:t>[2] Programação Microcontroladores. </a:t>
-            </a:r>
-          </a:p>
-          <a:p>
-            <a:pPr marL="0" indent="0" algn="just">
-              <a:buNone/>
-            </a:pPr>
-            <a:r>
-              <a:rPr lang="pt-BR" sz="2400" b="1" dirty="0">
-                <a:solidFill>
-                  <a:srgbClr val="FF0000"/>
-                </a:solidFill>
-                <a:latin typeface="Times New Roman" panose="02020603050405020304" pitchFamily="18" charset="0"/>
-                <a:cs typeface="Times New Roman" panose="02020603050405020304" pitchFamily="18" charset="0"/>
-              </a:rPr>
-              <a:t>Disponível em: </a:t>
-            </a:r>
-            <a:r>
-              <a:rPr lang="pt-BR" sz="2400" dirty="0">
-                <a:latin typeface="Times New Roman" panose="02020603050405020304" pitchFamily="18" charset="0"/>
-                <a:cs typeface="Times New Roman" panose="02020603050405020304" pitchFamily="18" charset="0"/>
-                <a:hlinkClick r:id="rId4"/>
-              </a:rPr>
-              <a:t>https://</a:t>
-            </a:r>
-            <a:endParaRPr lang="pt-BR" sz="2400" dirty="0">
-              <a:latin typeface="Times New Roman" panose="02020603050405020304" pitchFamily="18" charset="0"/>
-              <a:cs typeface="Times New Roman" panose="02020603050405020304" pitchFamily="18" charset="0"/>
-            </a:endParaRPr>
-          </a:p>
-          <a:p>
-            <a:pPr marL="0" indent="0" algn="just">
-              <a:buNone/>
-            </a:pPr>
-            <a:endParaRPr lang="pt-BR" sz="2400" dirty="0">
-              <a:latin typeface="Times New Roman" panose="02020603050405020304" pitchFamily="18" charset="0"/>
-              <a:cs typeface="Times New Roman" panose="02020603050405020304" pitchFamily="18" charset="0"/>
-            </a:endParaRPr>
-          </a:p>
-        </p:txBody>
-      </p:sp>
-    </p:spTree>
-    <p:extLst>
-      <p:ext uri="{BB962C8B-B14F-4D97-AF65-F5344CB8AC3E}">
-        <p14:creationId xmlns:p14="http://schemas.microsoft.com/office/powerpoint/2010/main" val="2747596967"/>
-      </p:ext>
-    </p:extLst>
-  </p:cSld>
-  <p:clrMapOvr>
-    <a:masterClrMapping/>
-  </p:clrMapOvr>
-  <p:transition spd="med"/>
-</p:sld>
-</file>
-
-<file path=ppt/slides/slide22.xml><?xml version="1.0" encoding="utf-8"?>
-<p:sld xmlns:a="http://schemas.openxmlformats.org/drawingml/2006/main" xmlns:r="http://schemas.openxmlformats.org/officeDocument/2006/relationships" xmlns:p="http://schemas.openxmlformats.org/presentationml/2006/main">
-  <p:cSld>
-    <p:spTree>
-      <p:nvGrpSpPr>
-        <p:cNvPr id="1" name=""/>
-        <p:cNvGrpSpPr/>
-        <p:nvPr/>
-      </p:nvGrpSpPr>
-      <p:grpSpPr>
-        <a:xfrm>
-          <a:off x="0" y="0"/>
-          <a:ext cx="0" cy="0"/>
-          <a:chOff x="0" y="0"/>
-          <a:chExt cx="0" cy="0"/>
-        </a:xfrm>
-      </p:grpSpPr>
-      <p:sp>
-        <p:nvSpPr>
-          <p:cNvPr id="6" name="Title 1"/>
-          <p:cNvSpPr>
-            <a:spLocks noGrp="1"/>
-          </p:cNvSpPr>
-          <p:nvPr>
-            <p:ph type="title"/>
-          </p:nvPr>
-        </p:nvSpPr>
-        <p:spPr>
-          <a:xfrm>
-            <a:off x="457200" y="205980"/>
-            <a:ext cx="8229600" cy="857251"/>
-          </a:xfrm>
-        </p:spPr>
-        <p:txBody>
-          <a:bodyPr>
-            <a:normAutofit/>
-          </a:bodyPr>
-          <a:lstStyle/>
-          <a:p>
-            <a:r>
-              <a:rPr lang="en-US" b="1" dirty="0" err="1">
-                <a:solidFill>
-                  <a:srgbClr val="0070C0"/>
-                </a:solidFill>
-              </a:rPr>
-              <a:t>Dinâmica</a:t>
-            </a:r>
-            <a:r>
-              <a:rPr lang="en-US" b="1" dirty="0">
-                <a:solidFill>
-                  <a:srgbClr val="0070C0"/>
-                </a:solidFill>
-              </a:rPr>
-              <a:t>/</a:t>
-            </a:r>
-            <a:r>
-              <a:rPr lang="en-US" b="1" dirty="0" err="1">
-                <a:solidFill>
-                  <a:srgbClr val="0070C0"/>
-                </a:solidFill>
-              </a:rPr>
-              <a:t>Atividades</a:t>
-            </a:r>
-            <a:endParaRPr lang="en-US" b="1" dirty="0">
-              <a:solidFill>
-                <a:srgbClr val="0070C0"/>
-              </a:solidFill>
-            </a:endParaRPr>
-          </a:p>
-        </p:txBody>
-      </p:sp>
-      <p:sp>
-        <p:nvSpPr>
-          <p:cNvPr id="8" name="Text Placeholder 2"/>
-          <p:cNvSpPr>
-            <a:spLocks noGrp="1"/>
-          </p:cNvSpPr>
-          <p:nvPr>
-            <p:ph type="body" sz="half" idx="1"/>
-          </p:nvPr>
-        </p:nvSpPr>
-        <p:spPr>
-          <a:xfrm>
-            <a:off x="139472" y="1063230"/>
-            <a:ext cx="8865056" cy="3606305"/>
-          </a:xfrm>
-        </p:spPr>
-        <p:txBody>
-          <a:bodyPr>
-            <a:noAutofit/>
-          </a:bodyPr>
-          <a:lstStyle/>
-          <a:p>
-            <a:pPr marL="0" indent="0" algn="just">
-              <a:buNone/>
-            </a:pPr>
-            <a:endParaRPr lang="pt-BR" dirty="0">
-              <a:latin typeface="Times New Roman" panose="02020603050405020304" pitchFamily="18" charset="0"/>
-              <a:cs typeface="Times New Roman" panose="02020603050405020304" pitchFamily="18" charset="0"/>
-            </a:endParaRPr>
-          </a:p>
-          <a:p>
-            <a:pPr algn="just">
-              <a:buFont typeface="Wingdings" panose="05000000000000000000" pitchFamily="2" charset="2"/>
-              <a:buChar char="§"/>
-            </a:pPr>
-            <a:r>
-              <a:rPr lang="pt-BR" dirty="0">
-                <a:latin typeface="Times New Roman" panose="02020603050405020304" pitchFamily="18" charset="0"/>
-                <a:cs typeface="Times New Roman" panose="02020603050405020304" pitchFamily="18" charset="0"/>
-              </a:rPr>
-              <a:t>	Exercícios (Atividade Verificadora </a:t>
-            </a:r>
-            <a:r>
-              <a:rPr lang="pt-BR">
-                <a:latin typeface="Times New Roman" panose="02020603050405020304" pitchFamily="18" charset="0"/>
-                <a:cs typeface="Times New Roman" panose="02020603050405020304" pitchFamily="18" charset="0"/>
-              </a:rPr>
-              <a:t>de Aprendizagem)</a:t>
-            </a:r>
-            <a:endParaRPr lang="pt-BR" dirty="0">
-              <a:latin typeface="Times New Roman" panose="02020603050405020304" pitchFamily="18" charset="0"/>
-              <a:cs typeface="Times New Roman" panose="02020603050405020304" pitchFamily="18" charset="0"/>
-            </a:endParaRPr>
-          </a:p>
-          <a:p>
-            <a:pPr marL="0" indent="0" algn="just">
-              <a:buNone/>
-            </a:pPr>
-            <a:r>
-              <a:rPr lang="pt-BR" dirty="0">
-                <a:latin typeface="Times New Roman" panose="02020603050405020304" pitchFamily="18" charset="0"/>
-                <a:cs typeface="Times New Roman" panose="02020603050405020304" pitchFamily="18" charset="0"/>
-              </a:rPr>
-              <a:t> 	</a:t>
-            </a:r>
-          </a:p>
-          <a:p>
-            <a:pPr algn="just"/>
-            <a:endParaRPr lang="pt-BR" dirty="0">
-              <a:latin typeface="Times New Roman" panose="02020603050405020304" pitchFamily="18" charset="0"/>
-              <a:cs typeface="Times New Roman" panose="02020603050405020304" pitchFamily="18" charset="0"/>
-            </a:endParaRPr>
-          </a:p>
-          <a:p>
-            <a:pPr algn="just"/>
-            <a:endParaRPr lang="pt-BR" dirty="0">
-              <a:latin typeface="Times New Roman" panose="02020603050405020304" pitchFamily="18" charset="0"/>
-              <a:cs typeface="Times New Roman" panose="02020603050405020304" pitchFamily="18" charset="0"/>
-            </a:endParaRPr>
-          </a:p>
-          <a:p>
-            <a:pPr algn="just"/>
-            <a:endParaRPr lang="pt-BR" dirty="0">
-              <a:latin typeface="Calibri" panose="020F0502020204030204" pitchFamily="34" charset="0"/>
-            </a:endParaRPr>
-          </a:p>
-        </p:txBody>
-      </p:sp>
-    </p:spTree>
-    <p:extLst>
-      <p:ext uri="{BB962C8B-B14F-4D97-AF65-F5344CB8AC3E}">
-        <p14:creationId xmlns:p14="http://schemas.microsoft.com/office/powerpoint/2010/main" val="2470652989"/>
       </p:ext>
     </p:extLst>
   </p:cSld>
@@ -8612,6 +8955,1146 @@
         </p:spPr>
         <p:txBody>
           <a:bodyPr>
+            <a:normAutofit fontScale="90000"/>
+          </a:bodyPr>
+          <a:lstStyle/>
+          <a:p>
+            <a:r>
+              <a:rPr lang="pt-BR" b="1" dirty="0">
+                <a:solidFill>
+                  <a:srgbClr val="0070C0"/>
+                </a:solidFill>
+              </a:rPr>
+              <a:t>Diferenças Entre </a:t>
+            </a:r>
+            <a:r>
+              <a:rPr lang="pt-BR" b="1" dirty="0" err="1">
+                <a:solidFill>
+                  <a:srgbClr val="0070C0"/>
+                </a:solidFill>
+              </a:rPr>
+              <a:t>Micropr</a:t>
+            </a:r>
+            <a:r>
+              <a:rPr lang="pt-BR" b="1" dirty="0">
+                <a:solidFill>
+                  <a:srgbClr val="0070C0"/>
+                </a:solidFill>
+              </a:rPr>
+              <a:t>. </a:t>
+            </a:r>
+            <a:r>
+              <a:rPr lang="pt-BR" b="1" dirty="0" err="1">
+                <a:solidFill>
+                  <a:srgbClr val="0070C0"/>
+                </a:solidFill>
+              </a:rPr>
+              <a:t>vs</a:t>
+            </a:r>
+            <a:r>
+              <a:rPr lang="pt-BR" b="1" dirty="0">
+                <a:solidFill>
+                  <a:srgbClr val="0070C0"/>
+                </a:solidFill>
+              </a:rPr>
+              <a:t> </a:t>
+            </a:r>
+            <a:r>
+              <a:rPr lang="pt-BR" b="1" dirty="0" err="1">
+                <a:solidFill>
+                  <a:srgbClr val="0070C0"/>
+                </a:solidFill>
+              </a:rPr>
+              <a:t>Micrcon</a:t>
+            </a:r>
+            <a:r>
+              <a:rPr lang="pt-BR" b="1" dirty="0">
+                <a:solidFill>
+                  <a:srgbClr val="0070C0"/>
+                </a:solidFill>
+              </a:rPr>
+              <a:t>.</a:t>
+            </a:r>
+            <a:endParaRPr lang="en-US" b="1" dirty="0">
+              <a:solidFill>
+                <a:srgbClr val="0070C0"/>
+              </a:solidFill>
+            </a:endParaRPr>
+          </a:p>
+        </p:txBody>
+      </p:sp>
+      <p:sp>
+        <p:nvSpPr>
+          <p:cNvPr id="8" name="Text Placeholder 2"/>
+          <p:cNvSpPr>
+            <a:spLocks noGrp="1"/>
+          </p:cNvSpPr>
+          <p:nvPr>
+            <p:ph type="body" sz="half" idx="1"/>
+          </p:nvPr>
+        </p:nvSpPr>
+        <p:spPr>
+          <a:xfrm>
+            <a:off x="142865" y="1200150"/>
+            <a:ext cx="8865056" cy="3737370"/>
+          </a:xfrm>
+        </p:spPr>
+        <p:txBody>
+          <a:bodyPr>
+            <a:noAutofit/>
+          </a:bodyPr>
+          <a:lstStyle/>
+          <a:p>
+            <a:pPr marL="0" indent="0" algn="just">
+              <a:buNone/>
+            </a:pPr>
+            <a:endParaRPr lang="pt-BR" sz="2000" dirty="0">
+              <a:solidFill>
+                <a:schemeClr val="tx1"/>
+              </a:solidFill>
+              <a:latin typeface="Times New Roman" panose="02020603050405020304" pitchFamily="18" charset="0"/>
+              <a:cs typeface="Times New Roman" panose="02020603050405020304" pitchFamily="18" charset="0"/>
+            </a:endParaRPr>
+          </a:p>
+        </p:txBody>
+      </p:sp>
+      <p:graphicFrame>
+        <p:nvGraphicFramePr>
+          <p:cNvPr id="2" name="Tabela 2">
+            <a:extLst>
+              <a:ext uri="{FF2B5EF4-FFF2-40B4-BE49-F238E27FC236}">
+                <a16:creationId xmlns:a16="http://schemas.microsoft.com/office/drawing/2014/main" id="{457EFFB8-7C72-A215-C9A7-3311E4261FF9}"/>
+              </a:ext>
+            </a:extLst>
+          </p:cNvPr>
+          <p:cNvGraphicFramePr>
+            <a:graphicFrameLocks noGrp="1"/>
+          </p:cNvGraphicFramePr>
+          <p:nvPr>
+            <p:extLst>
+              <p:ext uri="{D42A27DB-BD31-4B8C-83A1-F6EECF244321}">
+                <p14:modId xmlns:p14="http://schemas.microsoft.com/office/powerpoint/2010/main" val="1915230719"/>
+              </p:ext>
+            </p:extLst>
+          </p:nvPr>
+        </p:nvGraphicFramePr>
+        <p:xfrm>
+          <a:off x="136079" y="1227335"/>
+          <a:ext cx="8351330" cy="3596640"/>
+        </p:xfrm>
+        <a:graphic>
+          <a:graphicData uri="http://schemas.openxmlformats.org/drawingml/2006/table">
+            <a:tbl>
+              <a:tblPr firstRow="1" bandRow="1">
+                <a:tableStyleId>{5C22544A-7EE6-4342-B048-85BDC9FD1C3A}</a:tableStyleId>
+              </a:tblPr>
+              <a:tblGrid>
+                <a:gridCol w="4216465">
+                  <a:extLst>
+                    <a:ext uri="{9D8B030D-6E8A-4147-A177-3AD203B41FA5}">
+                      <a16:colId xmlns:a16="http://schemas.microsoft.com/office/drawing/2014/main" val="3591765167"/>
+                    </a:ext>
+                  </a:extLst>
+                </a:gridCol>
+                <a:gridCol w="4134865">
+                  <a:extLst>
+                    <a:ext uri="{9D8B030D-6E8A-4147-A177-3AD203B41FA5}">
+                      <a16:colId xmlns:a16="http://schemas.microsoft.com/office/drawing/2014/main" val="613282524"/>
+                    </a:ext>
+                  </a:extLst>
+                </a:gridCol>
+              </a:tblGrid>
+              <a:tr h="370840">
+                <a:tc>
+                  <a:txBody>
+                    <a:bodyPr/>
+                    <a:lstStyle/>
+                    <a:p>
+                      <a:pPr algn="ctr"/>
+                      <a:r>
+                        <a:rPr lang="pt-BR" dirty="0"/>
+                        <a:t>Microprocessador</a:t>
+                      </a:r>
+                    </a:p>
+                  </a:txBody>
+                  <a:tcPr/>
+                </a:tc>
+                <a:tc>
+                  <a:txBody>
+                    <a:bodyPr/>
+                    <a:lstStyle/>
+                    <a:p>
+                      <a:pPr algn="ctr"/>
+                      <a:r>
+                        <a:rPr lang="pt-BR" dirty="0"/>
+                        <a:t>Microcontrolador</a:t>
+                      </a:r>
+                    </a:p>
+                  </a:txBody>
+                  <a:tcPr/>
+                </a:tc>
+                <a:extLst>
+                  <a:ext uri="{0D108BD9-81ED-4DB2-BD59-A6C34878D82A}">
+                    <a16:rowId xmlns:a16="http://schemas.microsoft.com/office/drawing/2014/main" val="2266671813"/>
+                  </a:ext>
+                </a:extLst>
+              </a:tr>
+              <a:tr h="370840">
+                <a:tc>
+                  <a:txBody>
+                    <a:bodyPr/>
+                    <a:lstStyle/>
+                    <a:p>
+                      <a:r>
+                        <a:rPr lang="pt-BR" dirty="0"/>
+                        <a:t>Consiste em uma CPU que acessa periféricos externos</a:t>
+                      </a:r>
+                    </a:p>
+                  </a:txBody>
+                  <a:tcPr/>
+                </a:tc>
+                <a:tc>
+                  <a:txBody>
+                    <a:bodyPr/>
+                    <a:lstStyle/>
+                    <a:p>
+                      <a:r>
+                        <a:rPr lang="pt-BR" dirty="0"/>
+                        <a:t>Possui CPU, memória, E/S e outros elementos </a:t>
+                      </a:r>
+                      <a:r>
+                        <a:rPr lang="pt-BR" dirty="0" err="1"/>
+                        <a:t>intergrados</a:t>
+                      </a:r>
+                      <a:endParaRPr lang="pt-BR" dirty="0"/>
+                    </a:p>
+                  </a:txBody>
+                  <a:tcPr/>
+                </a:tc>
+                <a:extLst>
+                  <a:ext uri="{0D108BD9-81ED-4DB2-BD59-A6C34878D82A}">
+                    <a16:rowId xmlns:a16="http://schemas.microsoft.com/office/drawing/2014/main" val="120655481"/>
+                  </a:ext>
+                </a:extLst>
+              </a:tr>
+              <a:tr h="370840">
+                <a:tc>
+                  <a:txBody>
+                    <a:bodyPr/>
+                    <a:lstStyle/>
+                    <a:p>
+                      <a:r>
+                        <a:rPr lang="pt-BR" dirty="0"/>
+                        <a:t>Empregados em computadores, como PCs e servidores</a:t>
+                      </a:r>
+                    </a:p>
+                  </a:txBody>
+                  <a:tcPr/>
+                </a:tc>
+                <a:tc>
+                  <a:txBody>
+                    <a:bodyPr/>
+                    <a:lstStyle/>
+                    <a:p>
+                      <a:r>
+                        <a:rPr lang="pt-BR" dirty="0"/>
+                        <a:t>Usados em dispositivos embarcados</a:t>
+                      </a:r>
+                    </a:p>
+                  </a:txBody>
+                  <a:tcPr/>
+                </a:tc>
+                <a:extLst>
+                  <a:ext uri="{0D108BD9-81ED-4DB2-BD59-A6C34878D82A}">
+                    <a16:rowId xmlns:a16="http://schemas.microsoft.com/office/drawing/2014/main" val="3468690728"/>
+                  </a:ext>
+                </a:extLst>
+              </a:tr>
+              <a:tr h="370840">
+                <a:tc>
+                  <a:txBody>
+                    <a:bodyPr/>
+                    <a:lstStyle/>
+                    <a:p>
+                      <a:r>
+                        <a:rPr lang="pt-BR" dirty="0"/>
+                        <a:t>Baseado na arquitetura de Von Neumann</a:t>
+                      </a:r>
+                    </a:p>
+                  </a:txBody>
+                  <a:tcPr/>
+                </a:tc>
+                <a:tc>
+                  <a:txBody>
+                    <a:bodyPr/>
+                    <a:lstStyle/>
+                    <a:p>
+                      <a:r>
+                        <a:rPr lang="pt-BR" dirty="0"/>
+                        <a:t>Baseados em arquitetura Harvard</a:t>
+                      </a:r>
+                    </a:p>
+                  </a:txBody>
+                  <a:tcPr/>
+                </a:tc>
+                <a:extLst>
+                  <a:ext uri="{0D108BD9-81ED-4DB2-BD59-A6C34878D82A}">
+                    <a16:rowId xmlns:a16="http://schemas.microsoft.com/office/drawing/2014/main" val="2213903725"/>
+                  </a:ext>
+                </a:extLst>
+              </a:tr>
+              <a:tr h="370840">
+                <a:tc>
+                  <a:txBody>
+                    <a:bodyPr/>
+                    <a:lstStyle/>
+                    <a:p>
+                      <a:r>
+                        <a:rPr lang="pt-BR" dirty="0"/>
+                        <a:t>Custo elevado devido à sua complexidade</a:t>
+                      </a:r>
+                    </a:p>
+                  </a:txBody>
+                  <a:tcPr/>
+                </a:tc>
+                <a:tc>
+                  <a:txBody>
+                    <a:bodyPr/>
+                    <a:lstStyle/>
+                    <a:p>
+                      <a:r>
+                        <a:rPr lang="pt-BR" dirty="0"/>
+                        <a:t>Custo muito baixo, inclusive do sistema completo</a:t>
+                      </a:r>
+                    </a:p>
+                  </a:txBody>
+                  <a:tcPr/>
+                </a:tc>
+                <a:extLst>
+                  <a:ext uri="{0D108BD9-81ED-4DB2-BD59-A6C34878D82A}">
+                    <a16:rowId xmlns:a16="http://schemas.microsoft.com/office/drawing/2014/main" val="3337313021"/>
+                  </a:ext>
+                </a:extLst>
+              </a:tr>
+              <a:tr h="370840">
+                <a:tc>
+                  <a:txBody>
+                    <a:bodyPr/>
+                    <a:lstStyle/>
+                    <a:p>
+                      <a:r>
+                        <a:rPr lang="pt-BR" dirty="0"/>
+                        <a:t>Sem restrições de memória, pois usa RAM externa</a:t>
+                      </a:r>
+                    </a:p>
+                  </a:txBody>
+                  <a:tcPr/>
+                </a:tc>
+                <a:tc>
+                  <a:txBody>
+                    <a:bodyPr/>
+                    <a:lstStyle/>
+                    <a:p>
+                      <a:r>
+                        <a:rPr lang="pt-BR" dirty="0"/>
+                        <a:t>Possuem pouca memória, interna</a:t>
+                      </a:r>
+                    </a:p>
+                  </a:txBody>
+                  <a:tcPr/>
+                </a:tc>
+                <a:extLst>
+                  <a:ext uri="{0D108BD9-81ED-4DB2-BD59-A6C34878D82A}">
+                    <a16:rowId xmlns:a16="http://schemas.microsoft.com/office/drawing/2014/main" val="570895843"/>
+                  </a:ext>
+                </a:extLst>
+              </a:tr>
+              <a:tr h="370840">
+                <a:tc>
+                  <a:txBody>
+                    <a:bodyPr/>
+                    <a:lstStyle/>
+                    <a:p>
+                      <a:r>
+                        <a:rPr lang="pt-BR" dirty="0"/>
+                        <a:t>Pode ser usado em aplicações dos mais variados tipos (propósito geral), inclusive simultâneas</a:t>
+                      </a:r>
+                    </a:p>
+                  </a:txBody>
+                  <a:tcPr/>
+                </a:tc>
+                <a:tc>
+                  <a:txBody>
+                    <a:bodyPr/>
+                    <a:lstStyle/>
+                    <a:p>
+                      <a:r>
+                        <a:rPr lang="pt-BR" dirty="0"/>
+                        <a:t>Executa aplicações relativamente simples, geralmente por vez</a:t>
+                      </a:r>
+                    </a:p>
+                  </a:txBody>
+                  <a:tcPr/>
+                </a:tc>
+                <a:extLst>
+                  <a:ext uri="{0D108BD9-81ED-4DB2-BD59-A6C34878D82A}">
+                    <a16:rowId xmlns:a16="http://schemas.microsoft.com/office/drawing/2014/main" val="401755566"/>
+                  </a:ext>
+                </a:extLst>
+              </a:tr>
+              <a:tr h="370840">
+                <a:tc>
+                  <a:txBody>
+                    <a:bodyPr/>
+                    <a:lstStyle/>
+                    <a:p>
+                      <a:r>
+                        <a:rPr lang="pt-BR" dirty="0"/>
+                        <a:t>Consumo de energia e dissipação de calor são elevados</a:t>
+                      </a:r>
+                    </a:p>
+                  </a:txBody>
+                  <a:tcPr/>
+                </a:tc>
+                <a:tc>
+                  <a:txBody>
+                    <a:bodyPr/>
+                    <a:lstStyle/>
+                    <a:p>
+                      <a:r>
+                        <a:rPr lang="pt-BR" dirty="0"/>
+                        <a:t>Consumo de energia e dissipação de calor são baixos – pode operar com pilhas</a:t>
+                      </a:r>
+                    </a:p>
+                  </a:txBody>
+                  <a:tcPr/>
+                </a:tc>
+                <a:extLst>
+                  <a:ext uri="{0D108BD9-81ED-4DB2-BD59-A6C34878D82A}">
+                    <a16:rowId xmlns:a16="http://schemas.microsoft.com/office/drawing/2014/main" val="2734804576"/>
+                  </a:ext>
+                </a:extLst>
+              </a:tr>
+              <a:tr h="370840">
+                <a:tc>
+                  <a:txBody>
+                    <a:bodyPr/>
+                    <a:lstStyle/>
+                    <a:p>
+                      <a:r>
+                        <a:rPr lang="pt-BR" dirty="0" err="1"/>
+                        <a:t>Clock</a:t>
+                      </a:r>
+                      <a:r>
+                        <a:rPr lang="pt-BR" dirty="0"/>
+                        <a:t> na casa dos GHz</a:t>
+                      </a:r>
+                    </a:p>
+                  </a:txBody>
+                  <a:tcPr/>
+                </a:tc>
+                <a:tc>
+                  <a:txBody>
+                    <a:bodyPr/>
+                    <a:lstStyle/>
+                    <a:p>
+                      <a:r>
+                        <a:rPr lang="pt-BR" dirty="0" err="1"/>
+                        <a:t>Clock</a:t>
+                      </a:r>
+                      <a:r>
+                        <a:rPr lang="pt-BR" dirty="0"/>
+                        <a:t> na casa dos MHz </a:t>
+                      </a:r>
+                    </a:p>
+                  </a:txBody>
+                  <a:tcPr/>
+                </a:tc>
+                <a:extLst>
+                  <a:ext uri="{0D108BD9-81ED-4DB2-BD59-A6C34878D82A}">
+                    <a16:rowId xmlns:a16="http://schemas.microsoft.com/office/drawing/2014/main" val="2079930009"/>
+                  </a:ext>
+                </a:extLst>
+              </a:tr>
+            </a:tbl>
+          </a:graphicData>
+        </a:graphic>
+      </p:graphicFrame>
+    </p:spTree>
+    <p:extLst>
+      <p:ext uri="{BB962C8B-B14F-4D97-AF65-F5344CB8AC3E}">
+        <p14:creationId xmlns:p14="http://schemas.microsoft.com/office/powerpoint/2010/main" val="1379448954"/>
+      </p:ext>
+    </p:extLst>
+  </p:cSld>
+  <p:clrMapOvr>
+    <a:masterClrMapping/>
+  </p:clrMapOvr>
+  <p:transition spd="med"/>
+</p:sld>
+</file>
+
+<file path=ppt/slides/slide24.xml><?xml version="1.0" encoding="utf-8"?>
+<p:sld xmlns:a="http://schemas.openxmlformats.org/drawingml/2006/main" xmlns:r="http://schemas.openxmlformats.org/officeDocument/2006/relationships" xmlns:p="http://schemas.openxmlformats.org/presentationml/2006/main">
+  <p:cSld>
+    <p:spTree>
+      <p:nvGrpSpPr>
+        <p:cNvPr id="1" name=""/>
+        <p:cNvGrpSpPr/>
+        <p:nvPr/>
+      </p:nvGrpSpPr>
+      <p:grpSpPr>
+        <a:xfrm>
+          <a:off x="0" y="0"/>
+          <a:ext cx="0" cy="0"/>
+          <a:chOff x="0" y="0"/>
+          <a:chExt cx="0" cy="0"/>
+        </a:xfrm>
+      </p:grpSpPr>
+      <p:sp>
+        <p:nvSpPr>
+          <p:cNvPr id="6" name="Title 1"/>
+          <p:cNvSpPr>
+            <a:spLocks noGrp="1"/>
+          </p:cNvSpPr>
+          <p:nvPr>
+            <p:ph type="title"/>
+          </p:nvPr>
+        </p:nvSpPr>
+        <p:spPr>
+          <a:xfrm>
+            <a:off x="457200" y="205980"/>
+            <a:ext cx="8229600" cy="857251"/>
+          </a:xfrm>
+        </p:spPr>
+        <p:txBody>
+          <a:bodyPr>
+            <a:normAutofit/>
+          </a:bodyPr>
+          <a:lstStyle/>
+          <a:p>
+            <a:r>
+              <a:rPr lang="en-US" b="1" dirty="0" err="1">
+                <a:solidFill>
+                  <a:srgbClr val="0070C0"/>
+                </a:solidFill>
+              </a:rPr>
+              <a:t>Leitura</a:t>
+            </a:r>
+            <a:r>
+              <a:rPr lang="en-US" b="1" dirty="0">
+                <a:solidFill>
+                  <a:srgbClr val="0070C0"/>
+                </a:solidFill>
+              </a:rPr>
+              <a:t> </a:t>
+            </a:r>
+            <a:r>
+              <a:rPr lang="en-US" b="1" dirty="0" err="1">
+                <a:solidFill>
+                  <a:srgbClr val="0070C0"/>
+                </a:solidFill>
+              </a:rPr>
+              <a:t>Específica</a:t>
+            </a:r>
+            <a:endParaRPr lang="en-US" b="1" dirty="0">
+              <a:solidFill>
+                <a:srgbClr val="0070C0"/>
+              </a:solidFill>
+            </a:endParaRPr>
+          </a:p>
+        </p:txBody>
+      </p:sp>
+      <p:sp>
+        <p:nvSpPr>
+          <p:cNvPr id="8" name="Text Placeholder 2"/>
+          <p:cNvSpPr>
+            <a:spLocks noGrp="1"/>
+          </p:cNvSpPr>
+          <p:nvPr>
+            <p:ph type="body" sz="half" idx="1"/>
+          </p:nvPr>
+        </p:nvSpPr>
+        <p:spPr>
+          <a:xfrm>
+            <a:off x="142865" y="1200150"/>
+            <a:ext cx="8865056" cy="3737369"/>
+          </a:xfrm>
+        </p:spPr>
+        <p:txBody>
+          <a:bodyPr>
+            <a:noAutofit/>
+          </a:bodyPr>
+          <a:lstStyle/>
+          <a:p>
+            <a:pPr marL="0" indent="0" algn="just">
+              <a:buNone/>
+            </a:pPr>
+            <a:r>
+              <a:rPr lang="pt-BR" sz="2000" dirty="0">
+                <a:latin typeface="Times New Roman" panose="02020603050405020304" pitchFamily="18" charset="0"/>
+                <a:cs typeface="Times New Roman" panose="02020603050405020304" pitchFamily="18" charset="0"/>
+              </a:rPr>
+              <a:t>[1] Programação Microcontroladores.</a:t>
+            </a:r>
+          </a:p>
+          <a:p>
+            <a:pPr marL="0" indent="0" algn="just">
+              <a:buNone/>
+            </a:pPr>
+            <a:r>
+              <a:rPr lang="pt-BR" sz="2000" b="1" dirty="0">
+                <a:solidFill>
+                  <a:srgbClr val="FF0000"/>
+                </a:solidFill>
+                <a:latin typeface="Times New Roman" panose="02020603050405020304" pitchFamily="18" charset="0"/>
+                <a:cs typeface="Times New Roman" panose="02020603050405020304" pitchFamily="18" charset="0"/>
+              </a:rPr>
+              <a:t>Disponível em: </a:t>
+            </a:r>
+            <a:r>
+              <a:rPr lang="pt-BR" sz="2000" dirty="0">
+                <a:latin typeface="Times New Roman" panose="02020603050405020304" pitchFamily="18" charset="0"/>
+                <a:cs typeface="Times New Roman" panose="02020603050405020304" pitchFamily="18" charset="0"/>
+                <a:hlinkClick r:id="rId3"/>
+              </a:rPr>
+              <a:t>https://books.google.com.br/books?hl=pt-BR&amp;lr=&amp;id=ODenKGOHMRkC&amp;oi=fnd&amp;pg=PA9&amp;dq=microcontrolador+&amp;ots=unvT_d386z&amp;sig=nKrTAprr4r1gR94lsFX_g0NKC7o#v=onepage&amp;q=microcontrolador&amp;f=false</a:t>
+            </a:r>
+            <a:endParaRPr lang="pt-BR" sz="2000" dirty="0">
+              <a:latin typeface="Times New Roman" panose="02020603050405020304" pitchFamily="18" charset="0"/>
+              <a:cs typeface="Times New Roman" panose="02020603050405020304" pitchFamily="18" charset="0"/>
+            </a:endParaRPr>
+          </a:p>
+          <a:p>
+            <a:pPr marL="0" indent="0" algn="just">
+              <a:buNone/>
+            </a:pPr>
+            <a:endParaRPr lang="pt-BR" sz="2000" dirty="0">
+              <a:latin typeface="Times New Roman" panose="02020603050405020304" pitchFamily="18" charset="0"/>
+              <a:cs typeface="Times New Roman" panose="02020603050405020304" pitchFamily="18" charset="0"/>
+            </a:endParaRPr>
+          </a:p>
+          <a:p>
+            <a:pPr marL="0" indent="0" algn="just">
+              <a:buNone/>
+            </a:pPr>
+            <a:r>
+              <a:rPr lang="pt-BR" sz="2000" dirty="0">
+                <a:latin typeface="Times New Roman" panose="02020603050405020304" pitchFamily="18" charset="0"/>
+                <a:cs typeface="Times New Roman" panose="02020603050405020304" pitchFamily="18" charset="0"/>
+              </a:rPr>
+              <a:t>[2] Programação Microcontroladores. </a:t>
+            </a:r>
+          </a:p>
+          <a:p>
+            <a:pPr marL="0" indent="0" algn="just">
+              <a:buNone/>
+            </a:pPr>
+            <a:r>
+              <a:rPr lang="pt-BR" sz="2000" b="1" dirty="0">
+                <a:solidFill>
+                  <a:srgbClr val="FF0000"/>
+                </a:solidFill>
+                <a:latin typeface="Times New Roman" panose="02020603050405020304" pitchFamily="18" charset="0"/>
+                <a:cs typeface="Times New Roman" panose="02020603050405020304" pitchFamily="18" charset="0"/>
+              </a:rPr>
+              <a:t>Disponível em: </a:t>
+            </a:r>
+            <a:r>
+              <a:rPr lang="pt-BR" sz="2000" dirty="0">
+                <a:latin typeface="Times New Roman" panose="02020603050405020304" pitchFamily="18" charset="0"/>
+                <a:cs typeface="Times New Roman" panose="02020603050405020304" pitchFamily="18" charset="0"/>
+                <a:hlinkClick r:id="rId4"/>
+              </a:rPr>
+              <a:t>https://books.google.com.br/books?hl=pt-BR&amp;lr=&amp;id=fnTvx-_qwucC&amp;oi=fnd&amp;pg=PA20&amp;dq=microcontrolador+&amp;ots=HiESGOvggU&amp;sig=NYk0RDRRJaZYtzvsjlidzdAdudU#v=onepage&amp;q=microcontrolador&amp;f=false</a:t>
+            </a:r>
+            <a:endParaRPr lang="pt-BR" sz="2000" dirty="0">
+              <a:latin typeface="Times New Roman" panose="02020603050405020304" pitchFamily="18" charset="0"/>
+              <a:cs typeface="Times New Roman" panose="02020603050405020304" pitchFamily="18" charset="0"/>
+            </a:endParaRPr>
+          </a:p>
+          <a:p>
+            <a:pPr marL="0" indent="0" algn="just">
+              <a:buNone/>
+            </a:pPr>
+            <a:endParaRPr lang="pt-BR" sz="2000" dirty="0">
+              <a:latin typeface="Times New Roman" panose="02020603050405020304" pitchFamily="18" charset="0"/>
+              <a:cs typeface="Times New Roman" panose="02020603050405020304" pitchFamily="18" charset="0"/>
+            </a:endParaRPr>
+          </a:p>
+          <a:p>
+            <a:pPr marL="0" indent="0" algn="just">
+              <a:buNone/>
+            </a:pPr>
+            <a:endParaRPr lang="pt-BR" sz="2000" dirty="0">
+              <a:latin typeface="Times New Roman" panose="02020603050405020304" pitchFamily="18" charset="0"/>
+              <a:cs typeface="Times New Roman" panose="02020603050405020304" pitchFamily="18" charset="0"/>
+            </a:endParaRPr>
+          </a:p>
+          <a:p>
+            <a:pPr marL="0" indent="0" algn="just">
+              <a:buNone/>
+            </a:pPr>
+            <a:endParaRPr lang="pt-BR" sz="2000" dirty="0">
+              <a:latin typeface="Times New Roman" panose="02020603050405020304" pitchFamily="18" charset="0"/>
+              <a:cs typeface="Times New Roman" panose="02020603050405020304" pitchFamily="18" charset="0"/>
+            </a:endParaRPr>
+          </a:p>
+          <a:p>
+            <a:pPr marL="0" indent="0" algn="just">
+              <a:buNone/>
+            </a:pPr>
+            <a:endParaRPr lang="pt-BR" sz="2000" dirty="0">
+              <a:latin typeface="Calibri" panose="020F0502020204030204" pitchFamily="34" charset="0"/>
+            </a:endParaRPr>
+          </a:p>
+        </p:txBody>
+      </p:sp>
+    </p:spTree>
+    <p:extLst>
+      <p:ext uri="{BB962C8B-B14F-4D97-AF65-F5344CB8AC3E}">
+        <p14:creationId xmlns:p14="http://schemas.microsoft.com/office/powerpoint/2010/main" val="3680270425"/>
+      </p:ext>
+    </p:extLst>
+  </p:cSld>
+  <p:clrMapOvr>
+    <a:masterClrMapping/>
+  </p:clrMapOvr>
+  <p:transition spd="med"/>
+</p:sld>
+</file>
+
+<file path=ppt/slides/slide25.xml><?xml version="1.0" encoding="utf-8"?>
+<p:sld xmlns:a="http://schemas.openxmlformats.org/drawingml/2006/main" xmlns:r="http://schemas.openxmlformats.org/officeDocument/2006/relationships" xmlns:p="http://schemas.openxmlformats.org/presentationml/2006/main">
+  <p:cSld>
+    <p:spTree>
+      <p:nvGrpSpPr>
+        <p:cNvPr id="1" name=""/>
+        <p:cNvGrpSpPr/>
+        <p:nvPr/>
+      </p:nvGrpSpPr>
+      <p:grpSpPr>
+        <a:xfrm>
+          <a:off x="0" y="0"/>
+          <a:ext cx="0" cy="0"/>
+          <a:chOff x="0" y="0"/>
+          <a:chExt cx="0" cy="0"/>
+        </a:xfrm>
+      </p:grpSpPr>
+      <p:sp>
+        <p:nvSpPr>
+          <p:cNvPr id="6" name="Title 1"/>
+          <p:cNvSpPr>
+            <a:spLocks noGrp="1"/>
+          </p:cNvSpPr>
+          <p:nvPr>
+            <p:ph type="title"/>
+          </p:nvPr>
+        </p:nvSpPr>
+        <p:spPr>
+          <a:xfrm>
+            <a:off x="457200" y="205980"/>
+            <a:ext cx="8229600" cy="857251"/>
+          </a:xfrm>
+        </p:spPr>
+        <p:txBody>
+          <a:bodyPr>
+            <a:normAutofit/>
+          </a:bodyPr>
+          <a:lstStyle/>
+          <a:p>
+            <a:r>
+              <a:rPr lang="en-US" b="1" dirty="0" err="1">
+                <a:solidFill>
+                  <a:srgbClr val="0070C0"/>
+                </a:solidFill>
+              </a:rPr>
+              <a:t>Aprenda</a:t>
+            </a:r>
+            <a:r>
+              <a:rPr lang="en-US" b="1" dirty="0">
+                <a:solidFill>
+                  <a:srgbClr val="0070C0"/>
+                </a:solidFill>
+              </a:rPr>
+              <a:t>+</a:t>
+            </a:r>
+          </a:p>
+        </p:txBody>
+      </p:sp>
+      <p:sp>
+        <p:nvSpPr>
+          <p:cNvPr id="8" name="Text Placeholder 2"/>
+          <p:cNvSpPr>
+            <a:spLocks noGrp="1"/>
+          </p:cNvSpPr>
+          <p:nvPr>
+            <p:ph type="body" sz="half" idx="1"/>
+          </p:nvPr>
+        </p:nvSpPr>
+        <p:spPr>
+          <a:xfrm>
+            <a:off x="142865" y="1200150"/>
+            <a:ext cx="8865056" cy="3737370"/>
+          </a:xfrm>
+        </p:spPr>
+        <p:txBody>
+          <a:bodyPr>
+            <a:noAutofit/>
+          </a:bodyPr>
+          <a:lstStyle/>
+          <a:p>
+            <a:pPr marL="0" indent="0" algn="just">
+              <a:buNone/>
+            </a:pPr>
+            <a:r>
+              <a:rPr lang="pt-BR" sz="2400" dirty="0">
+                <a:latin typeface="Times New Roman" panose="02020603050405020304" pitchFamily="18" charset="0"/>
+                <a:cs typeface="Times New Roman" panose="02020603050405020304" pitchFamily="18" charset="0"/>
+              </a:rPr>
+              <a:t>[1] Programação Microcontroladores</a:t>
+            </a:r>
+          </a:p>
+          <a:p>
+            <a:pPr marL="0" indent="0" algn="just">
+              <a:buNone/>
+            </a:pPr>
+            <a:r>
+              <a:rPr lang="pt-BR" sz="2400" b="1" dirty="0">
+                <a:solidFill>
+                  <a:srgbClr val="FF0000"/>
+                </a:solidFill>
+                <a:latin typeface="Times New Roman" panose="02020603050405020304" pitchFamily="18" charset="0"/>
+                <a:cs typeface="Times New Roman" panose="02020603050405020304" pitchFamily="18" charset="0"/>
+              </a:rPr>
+              <a:t>Disponível em: </a:t>
+            </a:r>
+            <a:r>
+              <a:rPr lang="pt-BR" sz="2400" dirty="0">
+                <a:latin typeface="Times New Roman" panose="02020603050405020304" pitchFamily="18" charset="0"/>
+                <a:cs typeface="Times New Roman" panose="02020603050405020304" pitchFamily="18" charset="0"/>
+                <a:hlinkClick r:id="rId3"/>
+              </a:rPr>
+              <a:t>https://youtu.be/EeRXSKfaYjA</a:t>
+            </a:r>
+            <a:endParaRPr lang="pt-BR" sz="2400" dirty="0">
+              <a:latin typeface="Times New Roman" panose="02020603050405020304" pitchFamily="18" charset="0"/>
+              <a:cs typeface="Times New Roman" panose="02020603050405020304" pitchFamily="18" charset="0"/>
+            </a:endParaRPr>
+          </a:p>
+          <a:p>
+            <a:pPr marL="0" indent="0" algn="just">
+              <a:buNone/>
+            </a:pPr>
+            <a:endParaRPr lang="pt-BR" sz="2400" dirty="0">
+              <a:latin typeface="Times New Roman" panose="02020603050405020304" pitchFamily="18" charset="0"/>
+              <a:cs typeface="Times New Roman" panose="02020603050405020304" pitchFamily="18" charset="0"/>
+            </a:endParaRPr>
+          </a:p>
+          <a:p>
+            <a:pPr marL="0" indent="0" algn="just">
+              <a:buNone/>
+            </a:pPr>
+            <a:r>
+              <a:rPr lang="pt-BR" sz="2400" dirty="0">
+                <a:latin typeface="Times New Roman" panose="02020603050405020304" pitchFamily="18" charset="0"/>
+                <a:cs typeface="Times New Roman" panose="02020603050405020304" pitchFamily="18" charset="0"/>
+              </a:rPr>
+              <a:t>[2] </a:t>
+            </a:r>
+            <a:r>
+              <a:rPr lang="pt-BR" sz="2400" dirty="0" err="1">
+                <a:latin typeface="Times New Roman" panose="02020603050405020304" pitchFamily="18" charset="0"/>
+                <a:cs typeface="Times New Roman" panose="02020603050405020304" pitchFamily="18" charset="0"/>
+              </a:rPr>
+              <a:t>How</a:t>
+            </a:r>
+            <a:r>
+              <a:rPr lang="pt-BR" sz="2400" dirty="0">
+                <a:latin typeface="Times New Roman" panose="02020603050405020304" pitchFamily="18" charset="0"/>
+                <a:cs typeface="Times New Roman" panose="02020603050405020304" pitchFamily="18" charset="0"/>
+              </a:rPr>
+              <a:t> a CPU Works </a:t>
+            </a:r>
+          </a:p>
+          <a:p>
+            <a:pPr marL="0" indent="0" algn="just">
+              <a:buNone/>
+            </a:pPr>
+            <a:r>
+              <a:rPr lang="pt-BR" sz="2400" b="1" dirty="0">
+                <a:solidFill>
+                  <a:srgbClr val="FF0000"/>
+                </a:solidFill>
+                <a:latin typeface="Times New Roman" panose="02020603050405020304" pitchFamily="18" charset="0"/>
+                <a:cs typeface="Times New Roman" panose="02020603050405020304" pitchFamily="18" charset="0"/>
+              </a:rPr>
+              <a:t>Disponível em: </a:t>
+            </a:r>
+            <a:r>
+              <a:rPr lang="pt-BR" sz="2400" dirty="0">
+                <a:latin typeface="Times New Roman" panose="02020603050405020304" pitchFamily="18" charset="0"/>
+                <a:cs typeface="Times New Roman" panose="02020603050405020304" pitchFamily="18" charset="0"/>
+                <a:hlinkClick r:id="rId4"/>
+              </a:rPr>
+              <a:t>https://youtu.be/cNN_tTXABUA</a:t>
+            </a:r>
+            <a:endParaRPr lang="pt-BR" sz="2400" dirty="0">
+              <a:latin typeface="Times New Roman" panose="02020603050405020304" pitchFamily="18" charset="0"/>
+              <a:cs typeface="Times New Roman" panose="02020603050405020304" pitchFamily="18" charset="0"/>
+            </a:endParaRPr>
+          </a:p>
+          <a:p>
+            <a:pPr marL="0" indent="0" algn="just">
+              <a:buNone/>
+            </a:pPr>
+            <a:endParaRPr lang="pt-BR" sz="2400" dirty="0">
+              <a:latin typeface="Times New Roman" panose="02020603050405020304" pitchFamily="18" charset="0"/>
+              <a:cs typeface="Times New Roman" panose="02020603050405020304" pitchFamily="18" charset="0"/>
+            </a:endParaRPr>
+          </a:p>
+        </p:txBody>
+      </p:sp>
+    </p:spTree>
+    <p:extLst>
+      <p:ext uri="{BB962C8B-B14F-4D97-AF65-F5344CB8AC3E}">
+        <p14:creationId xmlns:p14="http://schemas.microsoft.com/office/powerpoint/2010/main" val="2747596967"/>
+      </p:ext>
+    </p:extLst>
+  </p:cSld>
+  <p:clrMapOvr>
+    <a:masterClrMapping/>
+  </p:clrMapOvr>
+  <p:transition spd="med"/>
+</p:sld>
+</file>
+
+<file path=ppt/slides/slide26.xml><?xml version="1.0" encoding="utf-8"?>
+<p:sld xmlns:a="http://schemas.openxmlformats.org/drawingml/2006/main" xmlns:r="http://schemas.openxmlformats.org/officeDocument/2006/relationships" xmlns:p="http://schemas.openxmlformats.org/presentationml/2006/main">
+  <p:cSld>
+    <p:spTree>
+      <p:nvGrpSpPr>
+        <p:cNvPr id="1" name=""/>
+        <p:cNvGrpSpPr/>
+        <p:nvPr/>
+      </p:nvGrpSpPr>
+      <p:grpSpPr>
+        <a:xfrm>
+          <a:off x="0" y="0"/>
+          <a:ext cx="0" cy="0"/>
+          <a:chOff x="0" y="0"/>
+          <a:chExt cx="0" cy="0"/>
+        </a:xfrm>
+      </p:grpSpPr>
+      <p:sp>
+        <p:nvSpPr>
+          <p:cNvPr id="6" name="Title 1"/>
+          <p:cNvSpPr>
+            <a:spLocks noGrp="1"/>
+          </p:cNvSpPr>
+          <p:nvPr>
+            <p:ph type="title"/>
+          </p:nvPr>
+        </p:nvSpPr>
+        <p:spPr>
+          <a:xfrm>
+            <a:off x="457200" y="205980"/>
+            <a:ext cx="8229600" cy="857251"/>
+          </a:xfrm>
+        </p:spPr>
+        <p:txBody>
+          <a:bodyPr>
+            <a:normAutofit/>
+          </a:bodyPr>
+          <a:lstStyle/>
+          <a:p>
+            <a:r>
+              <a:rPr lang="en-US" b="1" dirty="0" err="1">
+                <a:solidFill>
+                  <a:srgbClr val="0070C0"/>
+                </a:solidFill>
+              </a:rPr>
+              <a:t>Dinâmica</a:t>
+            </a:r>
+            <a:r>
+              <a:rPr lang="en-US" b="1" dirty="0">
+                <a:solidFill>
+                  <a:srgbClr val="0070C0"/>
+                </a:solidFill>
+              </a:rPr>
+              <a:t>/</a:t>
+            </a:r>
+            <a:r>
+              <a:rPr lang="en-US" b="1" dirty="0" err="1">
+                <a:solidFill>
+                  <a:srgbClr val="0070C0"/>
+                </a:solidFill>
+              </a:rPr>
+              <a:t>Atividades</a:t>
+            </a:r>
+            <a:endParaRPr lang="en-US" b="1" dirty="0">
+              <a:solidFill>
+                <a:srgbClr val="0070C0"/>
+              </a:solidFill>
+            </a:endParaRPr>
+          </a:p>
+        </p:txBody>
+      </p:sp>
+      <p:sp>
+        <p:nvSpPr>
+          <p:cNvPr id="8" name="Text Placeholder 2"/>
+          <p:cNvSpPr>
+            <a:spLocks noGrp="1"/>
+          </p:cNvSpPr>
+          <p:nvPr>
+            <p:ph type="body" sz="half" idx="1"/>
+          </p:nvPr>
+        </p:nvSpPr>
+        <p:spPr>
+          <a:xfrm>
+            <a:off x="139472" y="1063230"/>
+            <a:ext cx="8865056" cy="3606305"/>
+          </a:xfrm>
+        </p:spPr>
+        <p:txBody>
+          <a:bodyPr>
+            <a:noAutofit/>
+          </a:bodyPr>
+          <a:lstStyle/>
+          <a:p>
+            <a:pPr marL="0" indent="0" algn="just">
+              <a:buNone/>
+            </a:pPr>
+            <a:endParaRPr lang="pt-BR" dirty="0">
+              <a:latin typeface="Times New Roman" panose="02020603050405020304" pitchFamily="18" charset="0"/>
+              <a:cs typeface="Times New Roman" panose="02020603050405020304" pitchFamily="18" charset="0"/>
+            </a:endParaRPr>
+          </a:p>
+          <a:p>
+            <a:pPr algn="just">
+              <a:buFont typeface="Wingdings" panose="05000000000000000000" pitchFamily="2" charset="2"/>
+              <a:buChar char="§"/>
+            </a:pPr>
+            <a:r>
+              <a:rPr lang="pt-BR" dirty="0">
+                <a:latin typeface="Times New Roman" panose="02020603050405020304" pitchFamily="18" charset="0"/>
+                <a:cs typeface="Times New Roman" panose="02020603050405020304" pitchFamily="18" charset="0"/>
+              </a:rPr>
+              <a:t>	Exercícios (Atividade Verificadora de Aprendizagem)</a:t>
+            </a:r>
+          </a:p>
+          <a:p>
+            <a:pPr marL="0" indent="0" algn="just">
+              <a:buNone/>
+            </a:pPr>
+            <a:r>
+              <a:rPr lang="pt-BR" dirty="0">
+                <a:latin typeface="Times New Roman" panose="02020603050405020304" pitchFamily="18" charset="0"/>
+                <a:cs typeface="Times New Roman" panose="02020603050405020304" pitchFamily="18" charset="0"/>
+              </a:rPr>
+              <a:t> </a:t>
+            </a:r>
+            <a:r>
+              <a:rPr lang="pt-BR" sz="2400" dirty="0">
+                <a:latin typeface="Times New Roman" panose="02020603050405020304" pitchFamily="18" charset="0"/>
+                <a:cs typeface="Times New Roman" panose="02020603050405020304" pitchFamily="18" charset="0"/>
+              </a:rPr>
+              <a:t>	</a:t>
+            </a:r>
+          </a:p>
+          <a:p>
+            <a:pPr marL="0" indent="0" algn="just">
+              <a:buNone/>
+            </a:pPr>
+            <a:r>
+              <a:rPr lang="pt-BR" sz="2000" dirty="0">
+                <a:latin typeface="Times New Roman" panose="02020603050405020304" pitchFamily="18" charset="0"/>
+                <a:cs typeface="Times New Roman" panose="02020603050405020304" pitchFamily="18" charset="0"/>
+                <a:hlinkClick r:id="rId3"/>
+              </a:rPr>
+              <a:t>https://quizizz.com/admin/quiz/6087762e9c806b001c65dc74/microcontrolador</a:t>
+            </a:r>
+            <a:endParaRPr lang="pt-BR" sz="2000" dirty="0">
+              <a:latin typeface="Times New Roman" panose="02020603050405020304" pitchFamily="18" charset="0"/>
+              <a:cs typeface="Times New Roman" panose="02020603050405020304" pitchFamily="18" charset="0"/>
+            </a:endParaRPr>
+          </a:p>
+          <a:p>
+            <a:pPr marL="0" indent="0" algn="just">
+              <a:buNone/>
+            </a:pPr>
+            <a:endParaRPr lang="pt-BR" sz="2000" dirty="0">
+              <a:latin typeface="Times New Roman" panose="02020603050405020304" pitchFamily="18" charset="0"/>
+              <a:cs typeface="Times New Roman" panose="02020603050405020304" pitchFamily="18" charset="0"/>
+            </a:endParaRPr>
+          </a:p>
+          <a:p>
+            <a:pPr marL="0" indent="0" algn="just">
+              <a:buNone/>
+            </a:pPr>
+            <a:r>
+              <a:rPr lang="pt-BR" sz="2000" dirty="0">
+                <a:latin typeface="Times New Roman" panose="02020603050405020304" pitchFamily="18" charset="0"/>
+                <a:cs typeface="Times New Roman" panose="02020603050405020304" pitchFamily="18" charset="0"/>
+                <a:hlinkClick r:id="rId4"/>
+              </a:rPr>
+              <a:t>https://quizizz.com/admin/quiz/5aa686b4bc8374001abc8e88/sistemas-embarcados-e-microcontroladores</a:t>
+            </a:r>
+            <a:endParaRPr lang="pt-BR" sz="2000" dirty="0">
+              <a:latin typeface="Calibri" panose="020F0502020204030204" pitchFamily="34" charset="0"/>
+            </a:endParaRPr>
+          </a:p>
+        </p:txBody>
+      </p:sp>
+    </p:spTree>
+    <p:extLst>
+      <p:ext uri="{BB962C8B-B14F-4D97-AF65-F5344CB8AC3E}">
+        <p14:creationId xmlns:p14="http://schemas.microsoft.com/office/powerpoint/2010/main" val="2470652989"/>
+      </p:ext>
+    </p:extLst>
+  </p:cSld>
+  <p:clrMapOvr>
+    <a:masterClrMapping/>
+  </p:clrMapOvr>
+  <p:transition spd="med"/>
+</p:sld>
+</file>
+
+<file path=ppt/slides/slide27.xml><?xml version="1.0" encoding="utf-8"?>
+<p:sld xmlns:a="http://schemas.openxmlformats.org/drawingml/2006/main" xmlns:r="http://schemas.openxmlformats.org/officeDocument/2006/relationships" xmlns:p="http://schemas.openxmlformats.org/presentationml/2006/main">
+  <p:cSld>
+    <p:spTree>
+      <p:nvGrpSpPr>
+        <p:cNvPr id="1" name=""/>
+        <p:cNvGrpSpPr/>
+        <p:nvPr/>
+      </p:nvGrpSpPr>
+      <p:grpSpPr>
+        <a:xfrm>
+          <a:off x="0" y="0"/>
+          <a:ext cx="0" cy="0"/>
+          <a:chOff x="0" y="0"/>
+          <a:chExt cx="0" cy="0"/>
+        </a:xfrm>
+      </p:grpSpPr>
+      <p:sp>
+        <p:nvSpPr>
+          <p:cNvPr id="6" name="Title 1"/>
+          <p:cNvSpPr>
+            <a:spLocks noGrp="1"/>
+          </p:cNvSpPr>
+          <p:nvPr>
+            <p:ph type="title"/>
+          </p:nvPr>
+        </p:nvSpPr>
+        <p:spPr>
+          <a:xfrm>
+            <a:off x="457200" y="205980"/>
+            <a:ext cx="8229600" cy="857251"/>
+          </a:xfrm>
+        </p:spPr>
+        <p:txBody>
+          <a:bodyPr>
             <a:normAutofit/>
           </a:bodyPr>
           <a:lstStyle/>
@@ -8875,7 +10358,7 @@
 </p:sld>
 </file>
 
-<file path=ppt/slides/slide24.xml><?xml version="1.0" encoding="utf-8"?>
+<file path=ppt/slides/slide28.xml><?xml version="1.0" encoding="utf-8"?>
 <p:sld xmlns:a="http://schemas.openxmlformats.org/drawingml/2006/main" xmlns:r="http://schemas.openxmlformats.org/officeDocument/2006/relationships" xmlns:p="http://schemas.openxmlformats.org/presentationml/2006/main">
   <p:cSld>
     <p:spTree>

</xml_diff>

<commit_message>
aula 01 atu 09032023
</commit_message>
<xml_diff>
--- a/01 Classes/Aula 01 - Programação Microcontroladores.pptx
+++ b/01 Classes/Aula 01 - Programação Microcontroladores.pptx
@@ -5,7 +5,7 @@
     <p:sldMasterId id="2147483648" r:id="rId1"/>
   </p:sldMasterIdLst>
   <p:notesMasterIdLst>
-    <p:notesMasterId r:id="rId30"/>
+    <p:notesMasterId r:id="rId31"/>
   </p:notesMasterIdLst>
   <p:sldIdLst>
     <p:sldId id="256" r:id="rId2"/>
@@ -31,11 +31,12 @@
     <p:sldId id="350" r:id="rId22"/>
     <p:sldId id="344" r:id="rId23"/>
     <p:sldId id="360" r:id="rId24"/>
-    <p:sldId id="333" r:id="rId25"/>
-    <p:sldId id="323" r:id="rId26"/>
-    <p:sldId id="334" r:id="rId27"/>
-    <p:sldId id="337" r:id="rId28"/>
-    <p:sldId id="309" r:id="rId29"/>
+    <p:sldId id="361" r:id="rId25"/>
+    <p:sldId id="333" r:id="rId26"/>
+    <p:sldId id="323" r:id="rId27"/>
+    <p:sldId id="334" r:id="rId28"/>
+    <p:sldId id="337" r:id="rId29"/>
+    <p:sldId id="309" r:id="rId30"/>
   </p:sldIdLst>
   <p:sldSz cx="9144000" cy="5143500" type="screen16x9"/>
   <p:notesSz cx="6858000" cy="9144000"/>
@@ -1562,7 +1563,7 @@
     </p:spTree>
     <p:extLst>
       <p:ext uri="{BB962C8B-B14F-4D97-AF65-F5344CB8AC3E}">
-        <p14:creationId xmlns:p14="http://schemas.microsoft.com/office/powerpoint/2010/main" val="585304384"/>
+        <p14:creationId xmlns:p14="http://schemas.microsoft.com/office/powerpoint/2010/main" val="2418988343"/>
       </p:ext>
     </p:extLst>
   </p:cSld>
@@ -1628,7 +1629,7 @@
     </p:spTree>
     <p:extLst>
       <p:ext uri="{BB962C8B-B14F-4D97-AF65-F5344CB8AC3E}">
-        <p14:creationId xmlns:p14="http://schemas.microsoft.com/office/powerpoint/2010/main" val="2709569597"/>
+        <p14:creationId xmlns:p14="http://schemas.microsoft.com/office/powerpoint/2010/main" val="585304384"/>
       </p:ext>
     </p:extLst>
   </p:cSld>
@@ -1694,6 +1695,72 @@
     </p:spTree>
     <p:extLst>
       <p:ext uri="{BB962C8B-B14F-4D97-AF65-F5344CB8AC3E}">
+        <p14:creationId xmlns:p14="http://schemas.microsoft.com/office/powerpoint/2010/main" val="2709569597"/>
+      </p:ext>
+    </p:extLst>
+  </p:cSld>
+  <p:clrMapOvr>
+    <a:masterClrMapping/>
+  </p:clrMapOvr>
+</p:notes>
+</file>
+
+<file path=ppt/notesSlides/notesSlide26.xml><?xml version="1.0" encoding="utf-8"?>
+<p:notes xmlns:a="http://schemas.openxmlformats.org/drawingml/2006/main" xmlns:r="http://schemas.openxmlformats.org/officeDocument/2006/relationships" xmlns:p="http://schemas.openxmlformats.org/presentationml/2006/main">
+  <p:cSld>
+    <p:spTree>
+      <p:nvGrpSpPr>
+        <p:cNvPr id="1" name=""/>
+        <p:cNvGrpSpPr/>
+        <p:nvPr/>
+      </p:nvGrpSpPr>
+      <p:grpSpPr>
+        <a:xfrm>
+          <a:off x="0" y="0"/>
+          <a:ext cx="0" cy="0"/>
+          <a:chOff x="0" y="0"/>
+          <a:chExt cx="0" cy="0"/>
+        </a:xfrm>
+      </p:grpSpPr>
+      <p:sp>
+        <p:nvSpPr>
+          <p:cNvPr id="2" name="Espaço Reservado para Imagem de Slide 1"/>
+          <p:cNvSpPr>
+            <a:spLocks noGrp="1" noRot="1" noChangeAspect="1"/>
+          </p:cNvSpPr>
+          <p:nvPr>
+            <p:ph type="sldImg"/>
+          </p:nvPr>
+        </p:nvSpPr>
+        <p:spPr>
+          <a:xfrm>
+            <a:off x="381000" y="685800"/>
+            <a:ext cx="6096000" cy="3429000"/>
+          </a:xfrm>
+        </p:spPr>
+      </p:sp>
+      <p:sp>
+        <p:nvSpPr>
+          <p:cNvPr id="3" name="Espaço Reservado para Anotações 2"/>
+          <p:cNvSpPr>
+            <a:spLocks noGrp="1"/>
+          </p:cNvSpPr>
+          <p:nvPr>
+            <p:ph type="body" idx="1"/>
+          </p:nvPr>
+        </p:nvSpPr>
+        <p:spPr/>
+        <p:txBody>
+          <a:bodyPr/>
+          <a:lstStyle/>
+          <a:p>
+            <a:endParaRPr lang="pt-BR" dirty="0"/>
+          </a:p>
+        </p:txBody>
+      </p:sp>
+    </p:spTree>
+    <p:extLst>
+      <p:ext uri="{BB962C8B-B14F-4D97-AF65-F5344CB8AC3E}">
         <p14:creationId xmlns:p14="http://schemas.microsoft.com/office/powerpoint/2010/main" val="2296249050"/>
       </p:ext>
     </p:extLst>
@@ -1704,7 +1771,7 @@
 </p:notes>
 </file>
 
-<file path=ppt/notesSlides/notesSlide26.xml><?xml version="1.0" encoding="utf-8"?>
+<file path=ppt/notesSlides/notesSlide27.xml><?xml version="1.0" encoding="utf-8"?>
 <p:notes xmlns:a="http://schemas.openxmlformats.org/drawingml/2006/main" xmlns:r="http://schemas.openxmlformats.org/officeDocument/2006/relationships" xmlns:p="http://schemas.openxmlformats.org/presentationml/2006/main">
   <p:cSld>
     <p:spTree>
@@ -6369,7 +6436,7 @@
                 <a:latin typeface="Times New Roman" panose="02020603050405020304" pitchFamily="18" charset="0"/>
                 <a:cs typeface="Times New Roman" panose="02020603050405020304" pitchFamily="18" charset="0"/>
               </a:rPr>
-              <a:t>Armazena as instruções na memoria</a:t>
+              <a:t>Armazena as instruções na memória</a:t>
             </a:r>
           </a:p>
           <a:p>
@@ -6642,36 +6709,6 @@
           </a:p>
         </p:txBody>
       </p:sp>
-      <p:pic>
-        <p:nvPicPr>
-          <p:cNvPr id="3" name="Imagem 2">
-            <a:extLst>
-              <a:ext uri="{FF2B5EF4-FFF2-40B4-BE49-F238E27FC236}">
-                <a16:creationId xmlns:a16="http://schemas.microsoft.com/office/drawing/2014/main" id="{ED480386-32CC-5368-939B-FF6AD3DB3AF5}"/>
-              </a:ext>
-            </a:extLst>
-          </p:cNvPr>
-          <p:cNvPicPr>
-            <a:picLocks noChangeAspect="1"/>
-          </p:cNvPicPr>
-          <p:nvPr/>
-        </p:nvPicPr>
-        <p:blipFill>
-          <a:blip r:embed="rId3"/>
-          <a:stretch>
-            <a:fillRect/>
-          </a:stretch>
-        </p:blipFill>
-        <p:spPr>
-          <a:xfrm>
-            <a:off x="1643062" y="990600"/>
-            <a:ext cx="5857875" cy="3162300"/>
-          </a:xfrm>
-          <a:prstGeom prst="rect">
-            <a:avLst/>
-          </a:prstGeom>
-        </p:spPr>
-      </p:pic>
     </p:spTree>
     <p:extLst>
       <p:ext uri="{BB962C8B-B14F-4D97-AF65-F5344CB8AC3E}">
@@ -9474,28 +9511,28 @@
           <a:lstStyle/>
           <a:p>
             <a:r>
-              <a:rPr lang="en-US" b="1" dirty="0" err="1">
+              <a:rPr lang="pt-BR" b="1" dirty="0">
                 <a:solidFill>
                   <a:srgbClr val="0070C0"/>
                 </a:solidFill>
               </a:rPr>
-              <a:t>Leitura</a:t>
-            </a:r>
-            <a:r>
-              <a:rPr lang="en-US" b="1" dirty="0">
+              <a:t>Plataformas Dev. para </a:t>
+            </a:r>
+            <a:r>
+              <a:rPr lang="pt-BR" b="1" dirty="0" err="1">
                 <a:solidFill>
                   <a:srgbClr val="0070C0"/>
                 </a:solidFill>
               </a:rPr>
-              <a:t> </a:t>
-            </a:r>
-            <a:r>
-              <a:rPr lang="en-US" b="1" dirty="0" err="1">
+              <a:t>Microcon</a:t>
+            </a:r>
+            <a:r>
+              <a:rPr lang="pt-BR" b="1" dirty="0">
                 <a:solidFill>
                   <a:srgbClr val="0070C0"/>
                 </a:solidFill>
               </a:rPr>
-              <a:t>Específica</a:t>
+              <a:t>.</a:t>
             </a:r>
             <a:endParaRPr lang="en-US" b="1" dirty="0">
               <a:solidFill>
@@ -9518,7 +9555,7 @@
         <p:spPr>
           <a:xfrm>
             <a:off x="142865" y="1200150"/>
-            <a:ext cx="8865056" cy="3737369"/>
+            <a:ext cx="8865056" cy="3737370"/>
           </a:xfrm>
         </p:spPr>
         <p:txBody>
@@ -9527,133 +9564,170 @@
           </a:bodyPr>
           <a:lstStyle/>
           <a:p>
+            <a:pPr algn="just">
+              <a:buFont typeface="Wingdings" panose="05000000000000000000" pitchFamily="2" charset="2"/>
+              <a:buChar char="§"/>
+            </a:pPr>
+            <a:r>
+              <a:rPr lang="pt-BR" sz="2400" dirty="0">
+                <a:solidFill>
+                  <a:schemeClr val="tx1"/>
+                </a:solidFill>
+                <a:latin typeface="Times New Roman" panose="02020603050405020304" pitchFamily="18" charset="0"/>
+                <a:cs typeface="Times New Roman" panose="02020603050405020304" pitchFamily="18" charset="0"/>
+              </a:rPr>
+              <a:t>Plataforma Arduíno e Ferramenta </a:t>
+            </a:r>
+            <a:r>
+              <a:rPr lang="pt-BR" sz="2400" dirty="0" err="1">
+                <a:solidFill>
+                  <a:schemeClr val="tx1"/>
+                </a:solidFill>
+                <a:latin typeface="Times New Roman" panose="02020603050405020304" pitchFamily="18" charset="0"/>
+                <a:cs typeface="Times New Roman" panose="02020603050405020304" pitchFamily="18" charset="0"/>
+              </a:rPr>
+              <a:t>TinkerCAD</a:t>
+            </a:r>
+            <a:endParaRPr lang="pt-BR" sz="2400" dirty="0">
+              <a:solidFill>
+                <a:schemeClr val="tx1"/>
+              </a:solidFill>
+              <a:latin typeface="Times New Roman" panose="02020603050405020304" pitchFamily="18" charset="0"/>
+              <a:cs typeface="Times New Roman" panose="02020603050405020304" pitchFamily="18" charset="0"/>
+            </a:endParaRPr>
+          </a:p>
+          <a:p>
             <a:pPr marL="0" indent="0" algn="just">
               <a:buNone/>
             </a:pPr>
-            <a:r>
-              <a:rPr lang="pt-BR" sz="2000" dirty="0">
-                <a:latin typeface="Times New Roman" panose="02020603050405020304" pitchFamily="18" charset="0"/>
-                <a:cs typeface="Times New Roman" panose="02020603050405020304" pitchFamily="18" charset="0"/>
-              </a:rPr>
-              <a:t>[1] Programação Microcontroladores.</a:t>
+            <a:endParaRPr lang="pt-BR" sz="2400" dirty="0">
+              <a:solidFill>
+                <a:schemeClr val="tx1"/>
+              </a:solidFill>
+              <a:latin typeface="Times New Roman" panose="02020603050405020304" pitchFamily="18" charset="0"/>
+              <a:cs typeface="Times New Roman" panose="02020603050405020304" pitchFamily="18" charset="0"/>
+            </a:endParaRPr>
+          </a:p>
+          <a:p>
+            <a:pPr algn="just">
+              <a:buFont typeface="Wingdings" panose="05000000000000000000" pitchFamily="2" charset="2"/>
+              <a:buChar char="§"/>
+            </a:pPr>
+            <a:r>
+              <a:rPr lang="pt-BR" sz="2400" dirty="0">
+                <a:solidFill>
+                  <a:schemeClr val="tx1"/>
+                </a:solidFill>
+                <a:latin typeface="Times New Roman" panose="02020603050405020304" pitchFamily="18" charset="0"/>
+                <a:cs typeface="Times New Roman" panose="02020603050405020304" pitchFamily="18" charset="0"/>
+              </a:rPr>
+              <a:t>Ferramenta </a:t>
+            </a:r>
+            <a:r>
+              <a:rPr lang="pt-BR" sz="2400" dirty="0" err="1">
+                <a:solidFill>
+                  <a:schemeClr val="tx1"/>
+                </a:solidFill>
+                <a:latin typeface="Times New Roman" panose="02020603050405020304" pitchFamily="18" charset="0"/>
+                <a:cs typeface="Times New Roman" panose="02020603050405020304" pitchFamily="18" charset="0"/>
+              </a:rPr>
+              <a:t>PICSimlab</a:t>
+            </a:r>
+            <a:r>
+              <a:rPr lang="pt-BR" sz="2400" dirty="0">
+                <a:solidFill>
+                  <a:schemeClr val="tx1"/>
+                </a:solidFill>
+                <a:latin typeface="Times New Roman" panose="02020603050405020304" pitchFamily="18" charset="0"/>
+                <a:cs typeface="Times New Roman" panose="02020603050405020304" pitchFamily="18" charset="0"/>
+              </a:rPr>
+              <a:t>, microcontroladores PIC</a:t>
             </a:r>
           </a:p>
           <a:p>
             <a:pPr marL="0" indent="0" algn="just">
               <a:buNone/>
             </a:pPr>
-            <a:r>
-              <a:rPr lang="pt-BR" sz="2000" b="1" dirty="0">
-                <a:solidFill>
-                  <a:srgbClr val="FF0000"/>
-                </a:solidFill>
-                <a:latin typeface="Times New Roman" panose="02020603050405020304" pitchFamily="18" charset="0"/>
-                <a:cs typeface="Times New Roman" panose="02020603050405020304" pitchFamily="18" charset="0"/>
-              </a:rPr>
-              <a:t>Disponível em: </a:t>
-            </a:r>
-            <a:r>
-              <a:rPr lang="pt-BR" sz="2000" dirty="0">
-                <a:latin typeface="Times New Roman" panose="02020603050405020304" pitchFamily="18" charset="0"/>
-                <a:cs typeface="Times New Roman" panose="02020603050405020304" pitchFamily="18" charset="0"/>
-                <a:hlinkClick r:id="rId3"/>
-              </a:rPr>
-              <a:t>https://books.google.com.br/books?hl=pt-BR&amp;lr=&amp;id=ODenKGOHMRkC&amp;oi=fnd&amp;pg=PA9&amp;dq=microcontrolador+&amp;ots=unvT_d386z&amp;sig=nKrTAprr4r1gR94lsFX_g0NKC7o#v=onepage&amp;q=microcontrolador&amp;f=false</a:t>
-            </a:r>
-            <a:endParaRPr lang="pt-BR" sz="2000" dirty="0">
+            <a:endParaRPr lang="pt-BR" sz="2400" dirty="0">
+              <a:solidFill>
+                <a:schemeClr val="tx1"/>
+              </a:solidFill>
               <a:latin typeface="Times New Roman" panose="02020603050405020304" pitchFamily="18" charset="0"/>
               <a:cs typeface="Times New Roman" panose="02020603050405020304" pitchFamily="18" charset="0"/>
             </a:endParaRPr>
           </a:p>
           <a:p>
-            <a:pPr marL="0" indent="0" algn="just">
-              <a:buNone/>
+            <a:pPr algn="just">
+              <a:buFont typeface="Wingdings" panose="05000000000000000000" pitchFamily="2" charset="2"/>
+              <a:buChar char="§"/>
             </a:pPr>
-            <a:endParaRPr lang="pt-BR" sz="2000" dirty="0">
-              <a:latin typeface="Times New Roman" panose="02020603050405020304" pitchFamily="18" charset="0"/>
-              <a:cs typeface="Times New Roman" panose="02020603050405020304" pitchFamily="18" charset="0"/>
-            </a:endParaRPr>
-          </a:p>
-          <a:p>
-            <a:pPr marL="0" indent="0" algn="just">
-              <a:buNone/>
-            </a:pPr>
-            <a:r>
-              <a:rPr lang="pt-BR" sz="2000" dirty="0">
-                <a:latin typeface="Times New Roman" panose="02020603050405020304" pitchFamily="18" charset="0"/>
-                <a:cs typeface="Times New Roman" panose="02020603050405020304" pitchFamily="18" charset="0"/>
-              </a:rPr>
-              <a:t>[2] Programação Microcontroladores. </a:t>
-            </a:r>
-          </a:p>
-          <a:p>
-            <a:pPr marL="0" indent="0" algn="just">
-              <a:buNone/>
-            </a:pPr>
-            <a:r>
-              <a:rPr lang="pt-BR" sz="2000" b="1" dirty="0">
+            <a:r>
+              <a:rPr lang="pt-BR" sz="2400" dirty="0">
+                <a:solidFill>
+                  <a:schemeClr val="tx1"/>
+                </a:solidFill>
+                <a:latin typeface="Times New Roman" panose="02020603050405020304" pitchFamily="18" charset="0"/>
+                <a:cs typeface="Times New Roman" panose="02020603050405020304" pitchFamily="18" charset="0"/>
+              </a:rPr>
+              <a:t>Plataforma </a:t>
+            </a:r>
+            <a:r>
+              <a:rPr lang="pt-BR" sz="2400" dirty="0" err="1">
+                <a:solidFill>
+                  <a:schemeClr val="tx1"/>
+                </a:solidFill>
+                <a:latin typeface="Times New Roman" panose="02020603050405020304" pitchFamily="18" charset="0"/>
+                <a:cs typeface="Times New Roman" panose="02020603050405020304" pitchFamily="18" charset="0"/>
+              </a:rPr>
+              <a:t>Raspberry</a:t>
+            </a:r>
+            <a:r>
+              <a:rPr lang="pt-BR" sz="2400" dirty="0">
+                <a:solidFill>
+                  <a:schemeClr val="tx1"/>
+                </a:solidFill>
+                <a:latin typeface="Times New Roman" panose="02020603050405020304" pitchFamily="18" charset="0"/>
+                <a:cs typeface="Times New Roman" panose="02020603050405020304" pitchFamily="18" charset="0"/>
+              </a:rPr>
+              <a:t> PI (</a:t>
+            </a:r>
+            <a:r>
+              <a:rPr lang="pt-BR" sz="2400" dirty="0" err="1">
+                <a:solidFill>
+                  <a:schemeClr val="tx1"/>
+                </a:solidFill>
+                <a:latin typeface="Times New Roman" panose="02020603050405020304" pitchFamily="18" charset="0"/>
+                <a:cs typeface="Times New Roman" panose="02020603050405020304" pitchFamily="18" charset="0"/>
+              </a:rPr>
+              <a:t>RPi</a:t>
+            </a:r>
+            <a:r>
+              <a:rPr lang="pt-BR" sz="2400" dirty="0">
+                <a:solidFill>
+                  <a:schemeClr val="tx1"/>
+                </a:solidFill>
+                <a:latin typeface="Times New Roman" panose="02020603050405020304" pitchFamily="18" charset="0"/>
+                <a:cs typeface="Times New Roman" panose="02020603050405020304" pitchFamily="18" charset="0"/>
+              </a:rPr>
+              <a:t>) - </a:t>
+            </a:r>
+            <a:r>
+              <a:rPr lang="pt-BR" sz="2400" b="1" dirty="0">
                 <a:solidFill>
                   <a:srgbClr val="FF0000"/>
                 </a:solidFill>
                 <a:latin typeface="Times New Roman" panose="02020603050405020304" pitchFamily="18" charset="0"/>
                 <a:cs typeface="Times New Roman" panose="02020603050405020304" pitchFamily="18" charset="0"/>
               </a:rPr>
-              <a:t>Disponível em: </a:t>
-            </a:r>
-            <a:r>
-              <a:rPr lang="pt-BR" sz="2000" dirty="0">
-                <a:latin typeface="Times New Roman" panose="02020603050405020304" pitchFamily="18" charset="0"/>
-                <a:cs typeface="Times New Roman" panose="02020603050405020304" pitchFamily="18" charset="0"/>
-                <a:hlinkClick r:id="rId4"/>
-              </a:rPr>
-              <a:t>https://books.google.com.br/books?hl=pt-BR&amp;lr=&amp;id=fnTvx-_qwucC&amp;oi=fnd&amp;pg=PA20&amp;dq=microcontrolador+&amp;ots=HiESGOvggU&amp;sig=NYk0RDRRJaZYtzvsjlidzdAdudU#v=onepage&amp;q=microcontrolador&amp;f=false</a:t>
-            </a:r>
-            <a:endParaRPr lang="pt-BR" sz="2000" dirty="0">
-              <a:latin typeface="Times New Roman" panose="02020603050405020304" pitchFamily="18" charset="0"/>
-              <a:cs typeface="Times New Roman" panose="02020603050405020304" pitchFamily="18" charset="0"/>
-            </a:endParaRPr>
-          </a:p>
-          <a:p>
-            <a:pPr marL="0" indent="0" algn="just">
-              <a:buNone/>
-            </a:pPr>
-            <a:endParaRPr lang="pt-BR" sz="2000" dirty="0">
-              <a:latin typeface="Times New Roman" panose="02020603050405020304" pitchFamily="18" charset="0"/>
-              <a:cs typeface="Times New Roman" panose="02020603050405020304" pitchFamily="18" charset="0"/>
-            </a:endParaRPr>
-          </a:p>
-          <a:p>
-            <a:pPr marL="0" indent="0" algn="just">
-              <a:buNone/>
-            </a:pPr>
-            <a:endParaRPr lang="pt-BR" sz="2000" dirty="0">
-              <a:latin typeface="Times New Roman" panose="02020603050405020304" pitchFamily="18" charset="0"/>
-              <a:cs typeface="Times New Roman" panose="02020603050405020304" pitchFamily="18" charset="0"/>
-            </a:endParaRPr>
-          </a:p>
-          <a:p>
-            <a:pPr marL="0" indent="0" algn="just">
-              <a:buNone/>
-            </a:pPr>
-            <a:endParaRPr lang="pt-BR" sz="2000" dirty="0">
-              <a:latin typeface="Times New Roman" panose="02020603050405020304" pitchFamily="18" charset="0"/>
-              <a:cs typeface="Times New Roman" panose="02020603050405020304" pitchFamily="18" charset="0"/>
-            </a:endParaRPr>
-          </a:p>
-          <a:p>
-            <a:pPr marL="0" indent="0" algn="just">
-              <a:buNone/>
-            </a:pPr>
-            <a:endParaRPr lang="pt-BR" sz="2000" dirty="0">
-              <a:latin typeface="Calibri" panose="020F0502020204030204" pitchFamily="34" charset="0"/>
-            </a:endParaRPr>
+              <a:t>Linux</a:t>
+            </a:r>
           </a:p>
         </p:txBody>
       </p:sp>
     </p:spTree>
     <p:extLst>
       <p:ext uri="{BB962C8B-B14F-4D97-AF65-F5344CB8AC3E}">
-        <p14:creationId xmlns:p14="http://schemas.microsoft.com/office/powerpoint/2010/main" val="3680270425"/>
+        <p14:creationId xmlns:p14="http://schemas.microsoft.com/office/powerpoint/2010/main" val="2959507899"/>
       </p:ext>
     </p:extLst>
   </p:cSld>
@@ -9709,7 +9783,7 @@
                   <a:srgbClr val="0070C0"/>
                 </a:solidFill>
               </a:rPr>
-              <a:t>Aprenda</a:t>
+              <a:t>Leitura</a:t>
             </a:r>
             <a:r>
               <a:rPr lang="en-US" b="1" dirty="0">
@@ -9717,8 +9791,21 @@
                   <a:srgbClr val="0070C0"/>
                 </a:solidFill>
               </a:rPr>
-              <a:t>+</a:t>
-            </a:r>
+              <a:t> </a:t>
+            </a:r>
+            <a:r>
+              <a:rPr lang="en-US" b="1" dirty="0" err="1">
+                <a:solidFill>
+                  <a:srgbClr val="0070C0"/>
+                </a:solidFill>
+              </a:rPr>
+              <a:t>Específica</a:t>
+            </a:r>
+            <a:endParaRPr lang="en-US" b="1" dirty="0">
+              <a:solidFill>
+                <a:srgbClr val="0070C0"/>
+              </a:solidFill>
+            </a:endParaRPr>
           </a:p>
         </p:txBody>
       </p:sp>
@@ -9735,7 +9822,7 @@
         <p:spPr>
           <a:xfrm>
             <a:off x="142865" y="1200150"/>
-            <a:ext cx="8865056" cy="3737370"/>
+            <a:ext cx="8865056" cy="3737369"/>
           </a:xfrm>
         </p:spPr>
         <p:txBody>
@@ -9748,11 +9835,11 @@
               <a:buNone/>
             </a:pPr>
             <a:r>
-              <a:rPr lang="pt-BR" sz="2400" dirty="0">
-                <a:latin typeface="Times New Roman" panose="02020603050405020304" pitchFamily="18" charset="0"/>
-                <a:cs typeface="Times New Roman" panose="02020603050405020304" pitchFamily="18" charset="0"/>
-              </a:rPr>
-              <a:t>[1] Programação Microcontroladores</a:t>
+              <a:rPr lang="pt-BR" sz="2000" dirty="0">
+                <a:latin typeface="Times New Roman" panose="02020603050405020304" pitchFamily="18" charset="0"/>
+                <a:cs typeface="Times New Roman" panose="02020603050405020304" pitchFamily="18" charset="0"/>
+              </a:rPr>
+              <a:t>[1] Programação Microcontroladores.</a:t>
             </a:r>
           </a:p>
           <a:p>
@@ -9760,7 +9847,7 @@
               <a:buNone/>
             </a:pPr>
             <a:r>
-              <a:rPr lang="pt-BR" sz="2400" b="1" dirty="0">
+              <a:rPr lang="pt-BR" sz="2000" b="1" dirty="0">
                 <a:solidFill>
                   <a:srgbClr val="FF0000"/>
                 </a:solidFill>
@@ -9770,14 +9857,14 @@
               <a:t>Disponível em: </a:t>
             </a:r>
             <a:r>
-              <a:rPr lang="pt-BR" sz="2400" dirty="0">
+              <a:rPr lang="pt-BR" sz="2000" dirty="0">
                 <a:latin typeface="Times New Roman" panose="02020603050405020304" pitchFamily="18" charset="0"/>
                 <a:cs typeface="Times New Roman" panose="02020603050405020304" pitchFamily="18" charset="0"/>
                 <a:hlinkClick r:id="rId3"/>
               </a:rPr>
-              <a:t>https://youtu.be/EeRXSKfaYjA</a:t>
-            </a:r>
-            <a:endParaRPr lang="pt-BR" sz="2400" dirty="0">
+              <a:t>https://books.google.com.br/books?hl=pt-BR&amp;lr=&amp;id=ODenKGOHMRkC&amp;oi=fnd&amp;pg=PA9&amp;dq=microcontrolador+&amp;ots=unvT_d386z&amp;sig=nKrTAprr4r1gR94lsFX_g0NKC7o#v=onepage&amp;q=microcontrolador&amp;f=false</a:t>
+            </a:r>
+            <a:endParaRPr lang="pt-BR" sz="2000" dirty="0">
               <a:latin typeface="Times New Roman" panose="02020603050405020304" pitchFamily="18" charset="0"/>
               <a:cs typeface="Times New Roman" panose="02020603050405020304" pitchFamily="18" charset="0"/>
             </a:endParaRPr>
@@ -9786,7 +9873,7 @@
             <a:pPr marL="0" indent="0" algn="just">
               <a:buNone/>
             </a:pPr>
-            <a:endParaRPr lang="pt-BR" sz="2400" dirty="0">
+            <a:endParaRPr lang="pt-BR" sz="2000" dirty="0">
               <a:latin typeface="Times New Roman" panose="02020603050405020304" pitchFamily="18" charset="0"/>
               <a:cs typeface="Times New Roman" panose="02020603050405020304" pitchFamily="18" charset="0"/>
             </a:endParaRPr>
@@ -9796,25 +9883,11 @@
               <a:buNone/>
             </a:pPr>
             <a:r>
-              <a:rPr lang="pt-BR" sz="2400" dirty="0">
-                <a:latin typeface="Times New Roman" panose="02020603050405020304" pitchFamily="18" charset="0"/>
-                <a:cs typeface="Times New Roman" panose="02020603050405020304" pitchFamily="18" charset="0"/>
-              </a:rPr>
-              <a:t>[2] </a:t>
-            </a:r>
-            <a:r>
-              <a:rPr lang="pt-BR" sz="2400" dirty="0" err="1">
-                <a:latin typeface="Times New Roman" panose="02020603050405020304" pitchFamily="18" charset="0"/>
-                <a:cs typeface="Times New Roman" panose="02020603050405020304" pitchFamily="18" charset="0"/>
-              </a:rPr>
-              <a:t>How</a:t>
-            </a:r>
-            <a:r>
-              <a:rPr lang="pt-BR" sz="2400" dirty="0">
-                <a:latin typeface="Times New Roman" panose="02020603050405020304" pitchFamily="18" charset="0"/>
-                <a:cs typeface="Times New Roman" panose="02020603050405020304" pitchFamily="18" charset="0"/>
-              </a:rPr>
-              <a:t> a CPU Works </a:t>
+              <a:rPr lang="pt-BR" sz="2000" dirty="0">
+                <a:latin typeface="Times New Roman" panose="02020603050405020304" pitchFamily="18" charset="0"/>
+                <a:cs typeface="Times New Roman" panose="02020603050405020304" pitchFamily="18" charset="0"/>
+              </a:rPr>
+              <a:t>[2] Programação Microcontroladores. </a:t>
             </a:r>
           </a:p>
           <a:p>
@@ -9822,7 +9895,7 @@
               <a:buNone/>
             </a:pPr>
             <a:r>
-              <a:rPr lang="pt-BR" sz="2400" b="1" dirty="0">
+              <a:rPr lang="pt-BR" sz="2000" b="1" dirty="0">
                 <a:solidFill>
                   <a:srgbClr val="FF0000"/>
                 </a:solidFill>
@@ -9832,14 +9905,14 @@
               <a:t>Disponível em: </a:t>
             </a:r>
             <a:r>
-              <a:rPr lang="pt-BR" sz="2400" dirty="0">
+              <a:rPr lang="pt-BR" sz="2000" dirty="0">
                 <a:latin typeface="Times New Roman" panose="02020603050405020304" pitchFamily="18" charset="0"/>
                 <a:cs typeface="Times New Roman" panose="02020603050405020304" pitchFamily="18" charset="0"/>
                 <a:hlinkClick r:id="rId4"/>
               </a:rPr>
-              <a:t>https://youtu.be/cNN_tTXABUA</a:t>
-            </a:r>
-            <a:endParaRPr lang="pt-BR" sz="2400" dirty="0">
+              <a:t>https://books.google.com.br/books?hl=pt-BR&amp;lr=&amp;id=fnTvx-_qwucC&amp;oi=fnd&amp;pg=PA20&amp;dq=microcontrolador+&amp;ots=HiESGOvggU&amp;sig=NYk0RDRRJaZYtzvsjlidzdAdudU#v=onepage&amp;q=microcontrolador&amp;f=false</a:t>
+            </a:r>
+            <a:endParaRPr lang="pt-BR" sz="2000" dirty="0">
               <a:latin typeface="Times New Roman" panose="02020603050405020304" pitchFamily="18" charset="0"/>
               <a:cs typeface="Times New Roman" panose="02020603050405020304" pitchFamily="18" charset="0"/>
             </a:endParaRPr>
@@ -9848,9 +9921,35 @@
             <a:pPr marL="0" indent="0" algn="just">
               <a:buNone/>
             </a:pPr>
-            <a:endParaRPr lang="pt-BR" sz="2400" dirty="0">
+            <a:endParaRPr lang="pt-BR" sz="2000" dirty="0">
               <a:latin typeface="Times New Roman" panose="02020603050405020304" pitchFamily="18" charset="0"/>
               <a:cs typeface="Times New Roman" panose="02020603050405020304" pitchFamily="18" charset="0"/>
+            </a:endParaRPr>
+          </a:p>
+          <a:p>
+            <a:pPr marL="0" indent="0" algn="just">
+              <a:buNone/>
+            </a:pPr>
+            <a:endParaRPr lang="pt-BR" sz="2000" dirty="0">
+              <a:latin typeface="Times New Roman" panose="02020603050405020304" pitchFamily="18" charset="0"/>
+              <a:cs typeface="Times New Roman" panose="02020603050405020304" pitchFamily="18" charset="0"/>
+            </a:endParaRPr>
+          </a:p>
+          <a:p>
+            <a:pPr marL="0" indent="0" algn="just">
+              <a:buNone/>
+            </a:pPr>
+            <a:endParaRPr lang="pt-BR" sz="2000" dirty="0">
+              <a:latin typeface="Times New Roman" panose="02020603050405020304" pitchFamily="18" charset="0"/>
+              <a:cs typeface="Times New Roman" panose="02020603050405020304" pitchFamily="18" charset="0"/>
+            </a:endParaRPr>
+          </a:p>
+          <a:p>
+            <a:pPr marL="0" indent="0" algn="just">
+              <a:buNone/>
+            </a:pPr>
+            <a:endParaRPr lang="pt-BR" sz="2000" dirty="0">
+              <a:latin typeface="Calibri" panose="020F0502020204030204" pitchFamily="34" charset="0"/>
             </a:endParaRPr>
           </a:p>
         </p:txBody>
@@ -9858,7 +9957,7 @@
     </p:spTree>
     <p:extLst>
       <p:ext uri="{BB962C8B-B14F-4D97-AF65-F5344CB8AC3E}">
-        <p14:creationId xmlns:p14="http://schemas.microsoft.com/office/powerpoint/2010/main" val="2747596967"/>
+        <p14:creationId xmlns:p14="http://schemas.microsoft.com/office/powerpoint/2010/main" val="3680270425"/>
       </p:ext>
     </p:extLst>
   </p:cSld>
@@ -9914,7 +10013,7 @@
                   <a:srgbClr val="0070C0"/>
                 </a:solidFill>
               </a:rPr>
-              <a:t>Dinâmica</a:t>
+              <a:t>Aprenda</a:t>
             </a:r>
             <a:r>
               <a:rPr lang="en-US" b="1" dirty="0">
@@ -9922,21 +10021,8 @@
                   <a:srgbClr val="0070C0"/>
                 </a:solidFill>
               </a:rPr>
-              <a:t>/</a:t>
-            </a:r>
-            <a:r>
-              <a:rPr lang="en-US" b="1" dirty="0" err="1">
-                <a:solidFill>
-                  <a:srgbClr val="0070C0"/>
-                </a:solidFill>
-              </a:rPr>
-              <a:t>Atividades</a:t>
-            </a:r>
-            <a:endParaRPr lang="en-US" b="1" dirty="0">
-              <a:solidFill>
-                <a:srgbClr val="0070C0"/>
-              </a:solidFill>
-            </a:endParaRPr>
+              <a:t>+</a:t>
+            </a:r>
           </a:p>
         </p:txBody>
       </p:sp>
@@ -9952,8 +10038,8 @@
         </p:nvSpPr>
         <p:spPr>
           <a:xfrm>
-            <a:off x="139472" y="1063230"/>
-            <a:ext cx="8865056" cy="3606305"/>
+            <a:off x="142865" y="1200150"/>
+            <a:ext cx="8865056" cy="3737370"/>
           </a:xfrm>
         </p:spPr>
         <p:txBody>
@@ -9965,56 +10051,99 @@
             <a:pPr marL="0" indent="0" algn="just">
               <a:buNone/>
             </a:pPr>
-            <a:endParaRPr lang="pt-BR" dirty="0">
+            <a:r>
+              <a:rPr lang="pt-BR" sz="2400" dirty="0">
+                <a:latin typeface="Times New Roman" panose="02020603050405020304" pitchFamily="18" charset="0"/>
+                <a:cs typeface="Times New Roman" panose="02020603050405020304" pitchFamily="18" charset="0"/>
+              </a:rPr>
+              <a:t>[1] Programação Microcontroladores</a:t>
+            </a:r>
+          </a:p>
+          <a:p>
+            <a:pPr marL="0" indent="0" algn="just">
+              <a:buNone/>
+            </a:pPr>
+            <a:r>
+              <a:rPr lang="pt-BR" sz="2400" b="1" dirty="0">
+                <a:solidFill>
+                  <a:srgbClr val="FF0000"/>
+                </a:solidFill>
+                <a:latin typeface="Times New Roman" panose="02020603050405020304" pitchFamily="18" charset="0"/>
+                <a:cs typeface="Times New Roman" panose="02020603050405020304" pitchFamily="18" charset="0"/>
+              </a:rPr>
+              <a:t>Disponível em: </a:t>
+            </a:r>
+            <a:r>
+              <a:rPr lang="pt-BR" sz="2400" dirty="0">
+                <a:latin typeface="Times New Roman" panose="02020603050405020304" pitchFamily="18" charset="0"/>
+                <a:cs typeface="Times New Roman" panose="02020603050405020304" pitchFamily="18" charset="0"/>
+                <a:hlinkClick r:id="rId3"/>
+              </a:rPr>
+              <a:t>https://youtu.be/EeRXSKfaYjA</a:t>
+            </a:r>
+            <a:endParaRPr lang="pt-BR" sz="2400" dirty="0">
               <a:latin typeface="Times New Roman" panose="02020603050405020304" pitchFamily="18" charset="0"/>
               <a:cs typeface="Times New Roman" panose="02020603050405020304" pitchFamily="18" charset="0"/>
             </a:endParaRPr>
           </a:p>
           <a:p>
-            <a:pPr algn="just">
-              <a:buFont typeface="Wingdings" panose="05000000000000000000" pitchFamily="2" charset="2"/>
-              <a:buChar char="§"/>
-            </a:pPr>
-            <a:r>
-              <a:rPr lang="pt-BR" dirty="0">
-                <a:latin typeface="Times New Roman" panose="02020603050405020304" pitchFamily="18" charset="0"/>
-                <a:cs typeface="Times New Roman" panose="02020603050405020304" pitchFamily="18" charset="0"/>
-              </a:rPr>
-              <a:t>	Exercícios (Atividade Verificadora de Aprendizagem)</a:t>
-            </a:r>
-          </a:p>
-          <a:p>
             <a:pPr marL="0" indent="0" algn="just">
               <a:buNone/>
             </a:pPr>
-            <a:r>
-              <a:rPr lang="pt-BR" dirty="0">
-                <a:latin typeface="Times New Roman" panose="02020603050405020304" pitchFamily="18" charset="0"/>
-                <a:cs typeface="Times New Roman" panose="02020603050405020304" pitchFamily="18" charset="0"/>
-              </a:rPr>
-              <a:t> </a:t>
-            </a:r>
-            <a:r>
-              <a:rPr lang="pt-BR" sz="2400" dirty="0">
-                <a:latin typeface="Times New Roman" panose="02020603050405020304" pitchFamily="18" charset="0"/>
-                <a:cs typeface="Times New Roman" panose="02020603050405020304" pitchFamily="18" charset="0"/>
-              </a:rPr>
-              <a:t>	</a:t>
-            </a:r>
+            <a:endParaRPr lang="pt-BR" sz="2400" dirty="0">
+              <a:latin typeface="Times New Roman" panose="02020603050405020304" pitchFamily="18" charset="0"/>
+              <a:cs typeface="Times New Roman" panose="02020603050405020304" pitchFamily="18" charset="0"/>
+            </a:endParaRPr>
           </a:p>
           <a:p>
             <a:pPr marL="0" indent="0" algn="just">
               <a:buNone/>
             </a:pPr>
             <a:r>
-              <a:rPr lang="pt-BR" sz="2000" dirty="0">
-                <a:latin typeface="Times New Roman" panose="02020603050405020304" pitchFamily="18" charset="0"/>
-                <a:cs typeface="Times New Roman" panose="02020603050405020304" pitchFamily="18" charset="0"/>
-                <a:hlinkClick r:id="rId3"/>
-              </a:rPr>
-              <a:t>https://quizizz.com/admin/quiz/6087762e9c806b001c65dc74/microcontrolador</a:t>
-            </a:r>
-            <a:endParaRPr lang="pt-BR" sz="2000" dirty="0">
+              <a:rPr lang="pt-BR" sz="2400" dirty="0">
+                <a:latin typeface="Times New Roman" panose="02020603050405020304" pitchFamily="18" charset="0"/>
+                <a:cs typeface="Times New Roman" panose="02020603050405020304" pitchFamily="18" charset="0"/>
+              </a:rPr>
+              <a:t>[2] </a:t>
+            </a:r>
+            <a:r>
+              <a:rPr lang="pt-BR" sz="2400" dirty="0" err="1">
+                <a:latin typeface="Times New Roman" panose="02020603050405020304" pitchFamily="18" charset="0"/>
+                <a:cs typeface="Times New Roman" panose="02020603050405020304" pitchFamily="18" charset="0"/>
+              </a:rPr>
+              <a:t>How</a:t>
+            </a:r>
+            <a:r>
+              <a:rPr lang="pt-BR" sz="2400" dirty="0">
+                <a:latin typeface="Times New Roman" panose="02020603050405020304" pitchFamily="18" charset="0"/>
+                <a:cs typeface="Times New Roman" panose="02020603050405020304" pitchFamily="18" charset="0"/>
+              </a:rPr>
+              <a:t> a CPU Works </a:t>
+            </a:r>
+          </a:p>
+          <a:p>
+            <a:pPr marL="0" indent="0" algn="just">
+              <a:buNone/>
+            </a:pPr>
+            <a:r>
+              <a:rPr lang="pt-BR" sz="2400" b="1" dirty="0">
+                <a:solidFill>
+                  <a:srgbClr val="FF0000"/>
+                </a:solidFill>
+                <a:latin typeface="Times New Roman" panose="02020603050405020304" pitchFamily="18" charset="0"/>
+                <a:cs typeface="Times New Roman" panose="02020603050405020304" pitchFamily="18" charset="0"/>
+              </a:rPr>
+              <a:t>Disponível em: </a:t>
+            </a:r>
+            <a:r>
+              <a:rPr lang="pt-BR" sz="2400" dirty="0">
+                <a:latin typeface="Times New Roman" panose="02020603050405020304" pitchFamily="18" charset="0"/>
+                <a:cs typeface="Times New Roman" panose="02020603050405020304" pitchFamily="18" charset="0"/>
+                <a:hlinkClick r:id="rId4"/>
+              </a:rPr>
+              <a:t>https://youtu.be/cNN_tTXABUA</a:t>
+            </a:r>
+            <a:endParaRPr lang="pt-BR" sz="2400" dirty="0">
               <a:latin typeface="Times New Roman" panose="02020603050405020304" pitchFamily="18" charset="0"/>
               <a:cs typeface="Times New Roman" panose="02020603050405020304" pitchFamily="18" charset="0"/>
             </a:endParaRPr>
@@ -10023,25 +10152,9 @@
             <a:pPr marL="0" indent="0" algn="just">
               <a:buNone/>
             </a:pPr>
-            <a:endParaRPr lang="pt-BR" sz="2000" dirty="0">
+            <a:endParaRPr lang="pt-BR" sz="2400" dirty="0">
               <a:latin typeface="Times New Roman" panose="02020603050405020304" pitchFamily="18" charset="0"/>
               <a:cs typeface="Times New Roman" panose="02020603050405020304" pitchFamily="18" charset="0"/>
-            </a:endParaRPr>
-          </a:p>
-          <a:p>
-            <a:pPr marL="0" indent="0" algn="just">
-              <a:buNone/>
-            </a:pPr>
-            <a:r>
-              <a:rPr lang="pt-BR" sz="2000" dirty="0">
-                <a:latin typeface="Times New Roman" panose="02020603050405020304" pitchFamily="18" charset="0"/>
-                <a:cs typeface="Times New Roman" panose="02020603050405020304" pitchFamily="18" charset="0"/>
-                <a:hlinkClick r:id="rId4"/>
-              </a:rPr>
-              <a:t>https://quizizz.com/admin/quiz/5aa686b4bc8374001abc8e88/sistemas-embarcados-e-microcontroladores</a:t>
-            </a:r>
-            <a:endParaRPr lang="pt-BR" sz="2000" dirty="0">
-              <a:latin typeface="Calibri" panose="020F0502020204030204" pitchFamily="34" charset="0"/>
             </a:endParaRPr>
           </a:p>
         </p:txBody>
@@ -10049,7 +10162,7 @@
     </p:spTree>
     <p:extLst>
       <p:ext uri="{BB962C8B-B14F-4D97-AF65-F5344CB8AC3E}">
-        <p14:creationId xmlns:p14="http://schemas.microsoft.com/office/powerpoint/2010/main" val="2470652989"/>
+        <p14:creationId xmlns:p14="http://schemas.microsoft.com/office/powerpoint/2010/main" val="2747596967"/>
       </p:ext>
     </p:extLst>
   </p:cSld>
@@ -10105,6 +10218,197 @@
                   <a:srgbClr val="0070C0"/>
                 </a:solidFill>
               </a:rPr>
+              <a:t>Dinâmica</a:t>
+            </a:r>
+            <a:r>
+              <a:rPr lang="en-US" b="1" dirty="0">
+                <a:solidFill>
+                  <a:srgbClr val="0070C0"/>
+                </a:solidFill>
+              </a:rPr>
+              <a:t>/</a:t>
+            </a:r>
+            <a:r>
+              <a:rPr lang="en-US" b="1" dirty="0" err="1">
+                <a:solidFill>
+                  <a:srgbClr val="0070C0"/>
+                </a:solidFill>
+              </a:rPr>
+              <a:t>Atividades</a:t>
+            </a:r>
+            <a:endParaRPr lang="en-US" b="1" dirty="0">
+              <a:solidFill>
+                <a:srgbClr val="0070C0"/>
+              </a:solidFill>
+            </a:endParaRPr>
+          </a:p>
+        </p:txBody>
+      </p:sp>
+      <p:sp>
+        <p:nvSpPr>
+          <p:cNvPr id="8" name="Text Placeholder 2"/>
+          <p:cNvSpPr>
+            <a:spLocks noGrp="1"/>
+          </p:cNvSpPr>
+          <p:nvPr>
+            <p:ph type="body" sz="half" idx="1"/>
+          </p:nvPr>
+        </p:nvSpPr>
+        <p:spPr>
+          <a:xfrm>
+            <a:off x="139472" y="1063230"/>
+            <a:ext cx="8865056" cy="3606305"/>
+          </a:xfrm>
+        </p:spPr>
+        <p:txBody>
+          <a:bodyPr>
+            <a:noAutofit/>
+          </a:bodyPr>
+          <a:lstStyle/>
+          <a:p>
+            <a:pPr marL="0" indent="0" algn="just">
+              <a:buNone/>
+            </a:pPr>
+            <a:endParaRPr lang="pt-BR" dirty="0">
+              <a:latin typeface="Times New Roman" panose="02020603050405020304" pitchFamily="18" charset="0"/>
+              <a:cs typeface="Times New Roman" panose="02020603050405020304" pitchFamily="18" charset="0"/>
+            </a:endParaRPr>
+          </a:p>
+          <a:p>
+            <a:pPr algn="just">
+              <a:buFont typeface="Wingdings" panose="05000000000000000000" pitchFamily="2" charset="2"/>
+              <a:buChar char="§"/>
+            </a:pPr>
+            <a:r>
+              <a:rPr lang="pt-BR" dirty="0">
+                <a:latin typeface="Times New Roman" panose="02020603050405020304" pitchFamily="18" charset="0"/>
+                <a:cs typeface="Times New Roman" panose="02020603050405020304" pitchFamily="18" charset="0"/>
+              </a:rPr>
+              <a:t>	Exercícios (Atividade Verificadora de Aprendizagem)</a:t>
+            </a:r>
+          </a:p>
+          <a:p>
+            <a:pPr marL="0" indent="0" algn="just">
+              <a:buNone/>
+            </a:pPr>
+            <a:r>
+              <a:rPr lang="pt-BR" dirty="0">
+                <a:latin typeface="Times New Roman" panose="02020603050405020304" pitchFamily="18" charset="0"/>
+                <a:cs typeface="Times New Roman" panose="02020603050405020304" pitchFamily="18" charset="0"/>
+              </a:rPr>
+              <a:t> </a:t>
+            </a:r>
+            <a:r>
+              <a:rPr lang="pt-BR" sz="2400" dirty="0">
+                <a:latin typeface="Times New Roman" panose="02020603050405020304" pitchFamily="18" charset="0"/>
+                <a:cs typeface="Times New Roman" panose="02020603050405020304" pitchFamily="18" charset="0"/>
+              </a:rPr>
+              <a:t>	</a:t>
+            </a:r>
+          </a:p>
+          <a:p>
+            <a:pPr marL="0" indent="0" algn="just">
+              <a:buNone/>
+            </a:pPr>
+            <a:r>
+              <a:rPr lang="pt-BR" sz="2000" dirty="0">
+                <a:latin typeface="Times New Roman" panose="02020603050405020304" pitchFamily="18" charset="0"/>
+                <a:cs typeface="Times New Roman" panose="02020603050405020304" pitchFamily="18" charset="0"/>
+                <a:hlinkClick r:id="rId3"/>
+              </a:rPr>
+              <a:t>https://quizizz.com/admin/quiz/6087762e9c806b001c65dc74/microcontrolador</a:t>
+            </a:r>
+            <a:endParaRPr lang="pt-BR" sz="2000" dirty="0">
+              <a:latin typeface="Times New Roman" panose="02020603050405020304" pitchFamily="18" charset="0"/>
+              <a:cs typeface="Times New Roman" panose="02020603050405020304" pitchFamily="18" charset="0"/>
+            </a:endParaRPr>
+          </a:p>
+          <a:p>
+            <a:pPr marL="0" indent="0" algn="just">
+              <a:buNone/>
+            </a:pPr>
+            <a:endParaRPr lang="pt-BR" sz="2000" dirty="0">
+              <a:latin typeface="Times New Roman" panose="02020603050405020304" pitchFamily="18" charset="0"/>
+              <a:cs typeface="Times New Roman" panose="02020603050405020304" pitchFamily="18" charset="0"/>
+            </a:endParaRPr>
+          </a:p>
+          <a:p>
+            <a:pPr marL="0" indent="0" algn="just">
+              <a:buNone/>
+            </a:pPr>
+            <a:r>
+              <a:rPr lang="pt-BR" sz="2000" dirty="0">
+                <a:latin typeface="Times New Roman" panose="02020603050405020304" pitchFamily="18" charset="0"/>
+                <a:cs typeface="Times New Roman" panose="02020603050405020304" pitchFamily="18" charset="0"/>
+                <a:hlinkClick r:id="rId4"/>
+              </a:rPr>
+              <a:t>https://quizizz.com/admin/quiz/5aa686b4bc8374001abc8e88/sistemas-embarcados-e-microcontroladores</a:t>
+            </a:r>
+            <a:endParaRPr lang="pt-BR" sz="2000" dirty="0">
+              <a:latin typeface="Calibri" panose="020F0502020204030204" pitchFamily="34" charset="0"/>
+            </a:endParaRPr>
+          </a:p>
+        </p:txBody>
+      </p:sp>
+    </p:spTree>
+    <p:extLst>
+      <p:ext uri="{BB962C8B-B14F-4D97-AF65-F5344CB8AC3E}">
+        <p14:creationId xmlns:p14="http://schemas.microsoft.com/office/powerpoint/2010/main" val="2470652989"/>
+      </p:ext>
+    </p:extLst>
+  </p:cSld>
+  <p:clrMapOvr>
+    <a:masterClrMapping/>
+  </p:clrMapOvr>
+  <p:transition spd="med"/>
+</p:sld>
+</file>
+
+<file path=ppt/slides/slide28.xml><?xml version="1.0" encoding="utf-8"?>
+<p:sld xmlns:a="http://schemas.openxmlformats.org/drawingml/2006/main" xmlns:r="http://schemas.openxmlformats.org/officeDocument/2006/relationships" xmlns:p="http://schemas.openxmlformats.org/presentationml/2006/main">
+  <p:cSld>
+    <p:spTree>
+      <p:nvGrpSpPr>
+        <p:cNvPr id="1" name=""/>
+        <p:cNvGrpSpPr/>
+        <p:nvPr/>
+      </p:nvGrpSpPr>
+      <p:grpSpPr>
+        <a:xfrm>
+          <a:off x="0" y="0"/>
+          <a:ext cx="0" cy="0"/>
+          <a:chOff x="0" y="0"/>
+          <a:chExt cx="0" cy="0"/>
+        </a:xfrm>
+      </p:grpSpPr>
+      <p:sp>
+        <p:nvSpPr>
+          <p:cNvPr id="6" name="Title 1"/>
+          <p:cNvSpPr>
+            <a:spLocks noGrp="1"/>
+          </p:cNvSpPr>
+          <p:nvPr>
+            <p:ph type="title"/>
+          </p:nvPr>
+        </p:nvSpPr>
+        <p:spPr>
+          <a:xfrm>
+            <a:off x="457200" y="205980"/>
+            <a:ext cx="8229600" cy="857251"/>
+          </a:xfrm>
+        </p:spPr>
+        <p:txBody>
+          <a:bodyPr>
+            <a:normAutofit/>
+          </a:bodyPr>
+          <a:lstStyle/>
+          <a:p>
+            <a:r>
+              <a:rPr lang="en-US" b="1" dirty="0" err="1">
+                <a:solidFill>
+                  <a:srgbClr val="0070C0"/>
+                </a:solidFill>
+              </a:rPr>
               <a:t>Referências</a:t>
             </a:r>
             <a:r>
@@ -10358,7 +10662,7 @@
 </p:sld>
 </file>
 
-<file path=ppt/slides/slide28.xml><?xml version="1.0" encoding="utf-8"?>
+<file path=ppt/slides/slide29.xml><?xml version="1.0" encoding="utf-8"?>
 <p:sld xmlns:a="http://schemas.openxmlformats.org/drawingml/2006/main" xmlns:r="http://schemas.openxmlformats.org/officeDocument/2006/relationships" xmlns:p="http://schemas.openxmlformats.org/presentationml/2006/main">
   <p:cSld>
     <p:spTree>

</xml_diff>